<commit_message>
[mod] Make a report about comparing storage between API.
</commit_message>
<xml_diff>
--- a/Doc/Note/Vulkan/Vulkan-Photo.pptx
+++ b/Doc/Note/Vulkan/Vulkan-Photo.pptx
@@ -1,6 +1,6 @@
 
 <file path=ppt/presentation.xml><?xml version="1.0" encoding="utf-8"?>
-<p:presentation xmlns:a="http://schemas.openxmlformats.org/drawingml/2006/main" xmlns:r="http://schemas.openxmlformats.org/officeDocument/2006/relationships" xmlns:p="http://schemas.openxmlformats.org/presentationml/2006/main" saveSubsetFonts="1">
+<p:presentation xmlns:a="http://schemas.openxmlformats.org/drawingml/2006/main" xmlns:r="http://schemas.openxmlformats.org/officeDocument/2006/relationships" xmlns:p="http://schemas.openxmlformats.org/presentationml/2006/main" saveSubsetFonts="1" bookmarkIdSeed="2">
   <p:sldMasterIdLst>
     <p:sldMasterId id="2147483648" r:id="rId1"/>
   </p:sldMasterIdLst>
@@ -104,6 +104,11 @@
       </a:defRPr>
     </a:lvl9pPr>
   </p:defaultTextStyle>
+  <p:extLst>
+    <p:ext uri="{EFAFB233-063F-42B5-8137-9DF3F51BA10A}">
+      <p15:sldGuideLst xmlns:p15="http://schemas.microsoft.com/office/powerpoint/2012/main"/>
+    </p:ext>
+  </p:extLst>
 </p:presentation>
 </file>
 
@@ -254,7 +259,7 @@
           <a:p>
             <a:fld id="{B89D0E2C-28B2-4FE5-AFE8-C384F27AF9B3}" type="datetimeFigureOut">
               <a:rPr lang="zh-TW" altLang="en-US" smtClean="0"/>
-              <a:t>2019/7/14</a:t>
+              <a:t>2019/7/15</a:t>
             </a:fld>
             <a:endParaRPr lang="zh-TW" altLang="en-US"/>
           </a:p>
@@ -452,7 +457,7 @@
           <a:p>
             <a:fld id="{B89D0E2C-28B2-4FE5-AFE8-C384F27AF9B3}" type="datetimeFigureOut">
               <a:rPr lang="zh-TW" altLang="en-US" smtClean="0"/>
-              <a:t>2019/7/14</a:t>
+              <a:t>2019/7/15</a:t>
             </a:fld>
             <a:endParaRPr lang="zh-TW" altLang="en-US"/>
           </a:p>
@@ -660,7 +665,7 @@
           <a:p>
             <a:fld id="{B89D0E2C-28B2-4FE5-AFE8-C384F27AF9B3}" type="datetimeFigureOut">
               <a:rPr lang="zh-TW" altLang="en-US" smtClean="0"/>
-              <a:t>2019/7/14</a:t>
+              <a:t>2019/7/15</a:t>
             </a:fld>
             <a:endParaRPr lang="zh-TW" altLang="en-US"/>
           </a:p>
@@ -858,7 +863,7 @@
           <a:p>
             <a:fld id="{B89D0E2C-28B2-4FE5-AFE8-C384F27AF9B3}" type="datetimeFigureOut">
               <a:rPr lang="zh-TW" altLang="en-US" smtClean="0"/>
-              <a:t>2019/7/14</a:t>
+              <a:t>2019/7/15</a:t>
             </a:fld>
             <a:endParaRPr lang="zh-TW" altLang="en-US"/>
           </a:p>
@@ -1133,7 +1138,7 @@
           <a:p>
             <a:fld id="{B89D0E2C-28B2-4FE5-AFE8-C384F27AF9B3}" type="datetimeFigureOut">
               <a:rPr lang="zh-TW" altLang="en-US" smtClean="0"/>
-              <a:t>2019/7/14</a:t>
+              <a:t>2019/7/15</a:t>
             </a:fld>
             <a:endParaRPr lang="zh-TW" altLang="en-US"/>
           </a:p>
@@ -1398,7 +1403,7 @@
           <a:p>
             <a:fld id="{B89D0E2C-28B2-4FE5-AFE8-C384F27AF9B3}" type="datetimeFigureOut">
               <a:rPr lang="zh-TW" altLang="en-US" smtClean="0"/>
-              <a:t>2019/7/14</a:t>
+              <a:t>2019/7/15</a:t>
             </a:fld>
             <a:endParaRPr lang="zh-TW" altLang="en-US"/>
           </a:p>
@@ -1810,7 +1815,7 @@
           <a:p>
             <a:fld id="{B89D0E2C-28B2-4FE5-AFE8-C384F27AF9B3}" type="datetimeFigureOut">
               <a:rPr lang="zh-TW" altLang="en-US" smtClean="0"/>
-              <a:t>2019/7/14</a:t>
+              <a:t>2019/7/15</a:t>
             </a:fld>
             <a:endParaRPr lang="zh-TW" altLang="en-US"/>
           </a:p>
@@ -1951,7 +1956,7 @@
           <a:p>
             <a:fld id="{B89D0E2C-28B2-4FE5-AFE8-C384F27AF9B3}" type="datetimeFigureOut">
               <a:rPr lang="zh-TW" altLang="en-US" smtClean="0"/>
-              <a:t>2019/7/14</a:t>
+              <a:t>2019/7/15</a:t>
             </a:fld>
             <a:endParaRPr lang="zh-TW" altLang="en-US"/>
           </a:p>
@@ -2064,7 +2069,7 @@
           <a:p>
             <a:fld id="{B89D0E2C-28B2-4FE5-AFE8-C384F27AF9B3}" type="datetimeFigureOut">
               <a:rPr lang="zh-TW" altLang="en-US" smtClean="0"/>
-              <a:t>2019/7/14</a:t>
+              <a:t>2019/7/15</a:t>
             </a:fld>
             <a:endParaRPr lang="zh-TW" altLang="en-US"/>
           </a:p>
@@ -2375,7 +2380,7 @@
           <a:p>
             <a:fld id="{B89D0E2C-28B2-4FE5-AFE8-C384F27AF9B3}" type="datetimeFigureOut">
               <a:rPr lang="zh-TW" altLang="en-US" smtClean="0"/>
-              <a:t>2019/7/14</a:t>
+              <a:t>2019/7/15</a:t>
             </a:fld>
             <a:endParaRPr lang="zh-TW" altLang="en-US"/>
           </a:p>
@@ -2663,7 +2668,7 @@
           <a:p>
             <a:fld id="{B89D0E2C-28B2-4FE5-AFE8-C384F27AF9B3}" type="datetimeFigureOut">
               <a:rPr lang="zh-TW" altLang="en-US" smtClean="0"/>
-              <a:t>2019/7/14</a:t>
+              <a:t>2019/7/15</a:t>
             </a:fld>
             <a:endParaRPr lang="zh-TW" altLang="en-US"/>
           </a:p>
@@ -2904,7 +2909,7 @@
           <a:p>
             <a:fld id="{B89D0E2C-28B2-4FE5-AFE8-C384F27AF9B3}" type="datetimeFigureOut">
               <a:rPr lang="zh-TW" altLang="en-US" smtClean="0"/>
-              <a:t>2019/7/14</a:t>
+              <a:t>2019/7/15</a:t>
             </a:fld>
             <a:endParaRPr lang="zh-TW" altLang="en-US"/>
           </a:p>
@@ -3323,10 +3328,10 @@
       </p:grpSpPr>
       <p:grpSp>
         <p:nvGrpSpPr>
-          <p:cNvPr id="31" name="群組 30">
-            <a:extLst>
-              <a:ext uri="{FF2B5EF4-FFF2-40B4-BE49-F238E27FC236}">
-                <a16:creationId xmlns:a16="http://schemas.microsoft.com/office/drawing/2014/main" id="{EE07B2F0-4513-42D6-AAD7-0B9E44AB6F0D}"/>
+          <p:cNvPr id="22" name="群組 21">
+            <a:extLst>
+              <a:ext uri="{FF2B5EF4-FFF2-40B4-BE49-F238E27FC236}">
+                <a16:creationId xmlns:a16="http://schemas.microsoft.com/office/drawing/2014/main" id="{677AD761-E075-4096-9A7A-93B7989C7AA3}"/>
               </a:ext>
             </a:extLst>
           </p:cNvPr>
@@ -3335,18 +3340,18 @@
         </p:nvGrpSpPr>
         <p:grpSpPr>
           <a:xfrm>
-            <a:off x="434110" y="1311203"/>
-            <a:ext cx="2189018" cy="2071449"/>
-            <a:chOff x="2096654" y="1311203"/>
-            <a:chExt cx="2189018" cy="2071449"/>
+            <a:off x="0" y="99054"/>
+            <a:ext cx="5803900" cy="2769235"/>
+            <a:chOff x="-40581" y="-138538"/>
+            <a:chExt cx="5803914" cy="2769235"/>
           </a:xfrm>
         </p:grpSpPr>
         <p:sp>
           <p:nvSpPr>
-            <p:cNvPr id="4" name="矩形 3">
+            <p:cNvPr id="23" name="矩形 22">
               <a:extLst>
                 <a:ext uri="{FF2B5EF4-FFF2-40B4-BE49-F238E27FC236}">
-                  <a16:creationId xmlns:a16="http://schemas.microsoft.com/office/drawing/2014/main" id="{5319ECBE-C7B5-4797-9819-03C4BCC9EFA9}"/>
+                  <a16:creationId xmlns:a16="http://schemas.microsoft.com/office/drawing/2014/main" id="{1CD22B56-A701-46FD-8B8F-E879DE675A1A}"/>
                 </a:ext>
               </a:extLst>
             </p:cNvPr>
@@ -3355,8 +3360,815 @@
           </p:nvSpPr>
           <p:spPr>
             <a:xfrm>
-              <a:off x="2096654" y="1311203"/>
+              <a:off x="-13" y="-124884"/>
+              <a:ext cx="2881717" cy="2755303"/>
+            </a:xfrm>
+            <a:prstGeom prst="rect">
+              <a:avLst/>
+            </a:prstGeom>
+            <a:noFill/>
+            <a:ln w="38100">
+              <a:solidFill>
+                <a:schemeClr val="tx1"/>
+              </a:solidFill>
+            </a:ln>
+          </p:spPr>
+          <p:style>
+            <a:lnRef idx="2">
+              <a:schemeClr val="accent1">
+                <a:shade val="50000"/>
+              </a:schemeClr>
+            </a:lnRef>
+            <a:fillRef idx="1">
+              <a:schemeClr val="accent1"/>
+            </a:fillRef>
+            <a:effectRef idx="0">
+              <a:schemeClr val="accent1"/>
+            </a:effectRef>
+            <a:fontRef idx="minor">
+              <a:schemeClr val="lt1"/>
+            </a:fontRef>
+          </p:style>
+          <p:txBody>
+            <a:bodyPr rot="0" spcFirstLastPara="0" vert="horz" wrap="square" lIns="91440" tIns="45720" rIns="91440" bIns="45720" numCol="1" spcCol="0" rtlCol="0" fromWordArt="0" anchor="ctr" anchorCtr="0" forceAA="0" compatLnSpc="1">
+              <a:prstTxWarp prst="textNoShape">
+                <a:avLst/>
+              </a:prstTxWarp>
+              <a:noAutofit/>
+            </a:bodyPr>
+            <a:lstStyle/>
+            <a:p>
+              <a:endParaRPr lang="zh-TW" altLang="en-US"/>
+            </a:p>
+          </p:txBody>
+        </p:sp>
+        <p:sp>
+          <p:nvSpPr>
+            <p:cNvPr id="24" name="矩形 23">
+              <a:extLst>
+                <a:ext uri="{FF2B5EF4-FFF2-40B4-BE49-F238E27FC236}">
+                  <a16:creationId xmlns:a16="http://schemas.microsoft.com/office/drawing/2014/main" id="{C655E111-7F70-481E-98E9-3C70B39E015F}"/>
+                </a:ext>
+              </a:extLst>
+            </p:cNvPr>
+            <p:cNvSpPr/>
+            <p:nvPr/>
+          </p:nvSpPr>
+          <p:spPr>
+            <a:xfrm>
+              <a:off x="2881616" y="-124886"/>
+              <a:ext cx="2881717" cy="2755583"/>
+            </a:xfrm>
+            <a:prstGeom prst="rect">
+              <a:avLst/>
+            </a:prstGeom>
+            <a:noFill/>
+            <a:ln w="38100">
+              <a:solidFill>
+                <a:schemeClr val="tx1"/>
+              </a:solidFill>
+            </a:ln>
+          </p:spPr>
+          <p:style>
+            <a:lnRef idx="2">
+              <a:schemeClr val="accent1">
+                <a:shade val="50000"/>
+              </a:schemeClr>
+            </a:lnRef>
+            <a:fillRef idx="1">
+              <a:schemeClr val="accent1"/>
+            </a:fillRef>
+            <a:effectRef idx="0">
+              <a:schemeClr val="accent1"/>
+            </a:effectRef>
+            <a:fontRef idx="minor">
+              <a:schemeClr val="lt1"/>
+            </a:fontRef>
+          </p:style>
+          <p:txBody>
+            <a:bodyPr rot="0" spcFirstLastPara="0" vert="horz" wrap="square" lIns="91440" tIns="45720" rIns="91440" bIns="45720" numCol="1" spcCol="0" rtlCol="0" fromWordArt="0" anchor="ctr" anchorCtr="0" forceAA="0" compatLnSpc="1">
+              <a:prstTxWarp prst="textNoShape">
+                <a:avLst/>
+              </a:prstTxWarp>
+              <a:noAutofit/>
+            </a:bodyPr>
+            <a:lstStyle/>
+            <a:p>
+              <a:endParaRPr lang="zh-TW" altLang="en-US"/>
+            </a:p>
+          </p:txBody>
+        </p:sp>
+        <p:sp>
+          <p:nvSpPr>
+            <p:cNvPr id="25" name="文字方塊 35">
+              <a:extLst>
+                <a:ext uri="{FF2B5EF4-FFF2-40B4-BE49-F238E27FC236}">
+                  <a16:creationId xmlns:a16="http://schemas.microsoft.com/office/drawing/2014/main" id="{D5E20F62-7539-4C18-9DAE-556FFB155982}"/>
+                </a:ext>
+              </a:extLst>
+            </p:cNvPr>
+            <p:cNvSpPr txBox="1"/>
+            <p:nvPr/>
+          </p:nvSpPr>
+          <p:spPr>
+            <a:xfrm>
+              <a:off x="-40581" y="-138538"/>
+              <a:ext cx="818515" cy="320040"/>
+            </a:xfrm>
+            <a:prstGeom prst="rect">
+              <a:avLst/>
+            </a:prstGeom>
+            <a:noFill/>
+          </p:spPr>
+          <p:txBody>
+            <a:bodyPr wrap="square" rtlCol="0">
+              <a:spAutoFit/>
+            </a:bodyPr>
+            <a:lstStyle/>
+            <a:p>
+              <a:pPr algn="ctr">
+                <a:spcAft>
+                  <a:spcPts val="0"/>
+                </a:spcAft>
+              </a:pPr>
+              <a:r>
+                <a:rPr lang="en-US" sz="1000" kern="1200">
+                  <a:solidFill>
+                    <a:srgbClr val="000000"/>
+                  </a:solidFill>
+                  <a:effectLst/>
+                  <a:latin typeface="Calibri" panose="020F0502020204030204" pitchFamily="34" charset="0"/>
+                  <a:ea typeface="新細明體" panose="02020500000000000000" pitchFamily="18" charset="-120"/>
+                  <a:cs typeface="Times New Roman" panose="02020603050405020304" pitchFamily="18" charset="0"/>
+                </a:rPr>
+                <a:t>App Control</a:t>
+              </a:r>
+              <a:endParaRPr lang="zh-TW" sz="1200" kern="100">
+                <a:effectLst/>
+                <a:latin typeface="Calibri" panose="020F0502020204030204" pitchFamily="34" charset="0"/>
+                <a:ea typeface="新細明體" panose="02020500000000000000" pitchFamily="18" charset="-120"/>
+                <a:cs typeface="Times New Roman" panose="02020603050405020304" pitchFamily="18" charset="0"/>
+              </a:endParaRPr>
+            </a:p>
+          </p:txBody>
+        </p:sp>
+        <p:sp>
+          <p:nvSpPr>
+            <p:cNvPr id="26" name="文字方塊 36">
+              <a:extLst>
+                <a:ext uri="{FF2B5EF4-FFF2-40B4-BE49-F238E27FC236}">
+                  <a16:creationId xmlns:a16="http://schemas.microsoft.com/office/drawing/2014/main" id="{08004940-6C7D-4954-BBCF-80D9E8EA0C67}"/>
+                </a:ext>
+              </a:extLst>
+            </p:cNvPr>
+            <p:cNvSpPr txBox="1"/>
+            <p:nvPr/>
+          </p:nvSpPr>
+          <p:spPr>
+            <a:xfrm>
+              <a:off x="2790115" y="-138532"/>
+              <a:ext cx="1126490" cy="320039"/>
+            </a:xfrm>
+            <a:prstGeom prst="rect">
+              <a:avLst/>
+            </a:prstGeom>
+            <a:noFill/>
+          </p:spPr>
+          <p:txBody>
+            <a:bodyPr wrap="square" rtlCol="0">
+              <a:spAutoFit/>
+            </a:bodyPr>
+            <a:lstStyle/>
+            <a:p>
+              <a:pPr algn="ctr">
+                <a:spcAft>
+                  <a:spcPts val="0"/>
+                </a:spcAft>
+              </a:pPr>
+              <a:r>
+                <a:rPr lang="en-US" sz="1000" kern="1200">
+                  <a:solidFill>
+                    <a:srgbClr val="000000"/>
+                  </a:solidFill>
+                  <a:effectLst/>
+                  <a:latin typeface="Calibri" panose="020F0502020204030204" pitchFamily="34" charset="0"/>
+                  <a:ea typeface="新細明體" panose="02020500000000000000" pitchFamily="18" charset="-120"/>
+                  <a:cs typeface="Times New Roman" panose="02020603050405020304" pitchFamily="18" charset="0"/>
+                </a:rPr>
+                <a:t>Driver Control</a:t>
+              </a:r>
+              <a:endParaRPr lang="zh-TW" sz="1200" kern="100">
+                <a:effectLst/>
+                <a:latin typeface="Calibri" panose="020F0502020204030204" pitchFamily="34" charset="0"/>
+                <a:ea typeface="新細明體" panose="02020500000000000000" pitchFamily="18" charset="-120"/>
+                <a:cs typeface="Times New Roman" panose="02020603050405020304" pitchFamily="18" charset="0"/>
+              </a:endParaRPr>
+            </a:p>
+          </p:txBody>
+        </p:sp>
+        <p:sp>
+          <p:nvSpPr>
+            <p:cNvPr id="27" name="矩形 26">
+              <a:extLst>
+                <a:ext uri="{FF2B5EF4-FFF2-40B4-BE49-F238E27FC236}">
+                  <a16:creationId xmlns:a16="http://schemas.microsoft.com/office/drawing/2014/main" id="{593B1AC8-2BA4-4629-A20F-3D317229169E}"/>
+                </a:ext>
+              </a:extLst>
+            </p:cNvPr>
+            <p:cNvSpPr/>
+            <p:nvPr/>
+          </p:nvSpPr>
+          <p:spPr>
+            <a:xfrm>
+              <a:off x="3519005" y="944052"/>
+              <a:ext cx="1680001" cy="598056"/>
+            </a:xfrm>
+            <a:prstGeom prst="rect">
+              <a:avLst/>
+            </a:prstGeom>
+            <a:ln>
+              <a:noFill/>
+            </a:ln>
+          </p:spPr>
+          <p:style>
+            <a:lnRef idx="2">
+              <a:schemeClr val="accent1">
+                <a:shade val="50000"/>
+              </a:schemeClr>
+            </a:lnRef>
+            <a:fillRef idx="1">
+              <a:schemeClr val="accent1"/>
+            </a:fillRef>
+            <a:effectRef idx="0">
+              <a:schemeClr val="accent1"/>
+            </a:effectRef>
+            <a:fontRef idx="minor">
+              <a:schemeClr val="lt1"/>
+            </a:fontRef>
+          </p:style>
+          <p:txBody>
+            <a:bodyPr rot="0" spcFirstLastPara="0" vert="horz" wrap="square" lIns="91440" tIns="45720" rIns="91440" bIns="45720" numCol="1" spcCol="0" rtlCol="0" fromWordArt="0" anchor="ctr" anchorCtr="0" forceAA="0" compatLnSpc="1">
+              <a:prstTxWarp prst="textNoShape">
+                <a:avLst/>
+              </a:prstTxWarp>
+              <a:noAutofit/>
+            </a:bodyPr>
+            <a:lstStyle/>
+            <a:p>
+              <a:pPr algn="ctr">
+                <a:spcAft>
+                  <a:spcPts val="0"/>
+                </a:spcAft>
+              </a:pPr>
+              <a:r>
+                <a:rPr lang="en-US" sz="1000" kern="1200">
+                  <a:solidFill>
+                    <a:srgbClr val="000000"/>
+                  </a:solidFill>
+                  <a:effectLst/>
+                  <a:ea typeface="新細明體" panose="02020500000000000000" pitchFamily="18" charset="-120"/>
+                  <a:cs typeface="Times New Roman" panose="02020603050405020304" pitchFamily="18" charset="0"/>
+                </a:rPr>
+                <a:t>System Memory</a:t>
+              </a:r>
+              <a:endParaRPr lang="zh-TW" sz="1200" kern="100">
+                <a:effectLst/>
+                <a:ea typeface="新細明體" panose="02020500000000000000" pitchFamily="18" charset="-120"/>
+                <a:cs typeface="Times New Roman" panose="02020603050405020304" pitchFamily="18" charset="0"/>
+              </a:endParaRPr>
+            </a:p>
+          </p:txBody>
+        </p:sp>
+        <p:sp>
+          <p:nvSpPr>
+            <p:cNvPr id="28" name="矩形 27">
+              <a:extLst>
+                <a:ext uri="{FF2B5EF4-FFF2-40B4-BE49-F238E27FC236}">
+                  <a16:creationId xmlns:a16="http://schemas.microsoft.com/office/drawing/2014/main" id="{705CFAEE-D37B-4CEA-942C-262BAC9CA5AD}"/>
+                </a:ext>
+              </a:extLst>
+            </p:cNvPr>
+            <p:cNvSpPr/>
+            <p:nvPr/>
+          </p:nvSpPr>
+          <p:spPr>
+            <a:xfrm>
+              <a:off x="3529398" y="1764304"/>
+              <a:ext cx="1669621" cy="598056"/>
+            </a:xfrm>
+            <a:prstGeom prst="rect">
+              <a:avLst/>
+            </a:prstGeom>
+            <a:solidFill>
+              <a:schemeClr val="accent2"/>
+            </a:solidFill>
+            <a:ln>
+              <a:noFill/>
+            </a:ln>
+          </p:spPr>
+          <p:style>
+            <a:lnRef idx="2">
+              <a:schemeClr val="accent1">
+                <a:shade val="50000"/>
+              </a:schemeClr>
+            </a:lnRef>
+            <a:fillRef idx="1">
+              <a:schemeClr val="accent1"/>
+            </a:fillRef>
+            <a:effectRef idx="0">
+              <a:schemeClr val="accent1"/>
+            </a:effectRef>
+            <a:fontRef idx="minor">
+              <a:schemeClr val="lt1"/>
+            </a:fontRef>
+          </p:style>
+          <p:txBody>
+            <a:bodyPr rot="0" spcFirstLastPara="0" vert="horz" wrap="square" lIns="91440" tIns="45720" rIns="91440" bIns="45720" numCol="1" spcCol="0" rtlCol="0" fromWordArt="0" anchor="ctr" anchorCtr="0" forceAA="0" compatLnSpc="1">
+              <a:prstTxWarp prst="textNoShape">
+                <a:avLst/>
+              </a:prstTxWarp>
+              <a:noAutofit/>
+            </a:bodyPr>
+            <a:lstStyle/>
+            <a:p>
+              <a:pPr algn="ctr">
+                <a:spcAft>
+                  <a:spcPts val="0"/>
+                </a:spcAft>
+              </a:pPr>
+              <a:r>
+                <a:rPr lang="en-US" sz="1000" kern="1200">
+                  <a:solidFill>
+                    <a:srgbClr val="000000"/>
+                  </a:solidFill>
+                  <a:effectLst/>
+                  <a:ea typeface="新細明體" panose="02020500000000000000" pitchFamily="18" charset="-120"/>
+                  <a:cs typeface="Times New Roman" panose="02020603050405020304" pitchFamily="18" charset="0"/>
+                </a:rPr>
+                <a:t> Local Video Memory</a:t>
+              </a:r>
+              <a:endParaRPr lang="zh-TW" sz="1200" kern="100">
+                <a:effectLst/>
+                <a:ea typeface="新細明體" panose="02020500000000000000" pitchFamily="18" charset="-120"/>
+                <a:cs typeface="Times New Roman" panose="02020603050405020304" pitchFamily="18" charset="0"/>
+              </a:endParaRPr>
+            </a:p>
+          </p:txBody>
+        </p:sp>
+        <p:cxnSp>
+          <p:nvCxnSpPr>
+            <p:cNvPr id="29" name="直線單箭頭接點 28">
+              <a:extLst>
+                <a:ext uri="{FF2B5EF4-FFF2-40B4-BE49-F238E27FC236}">
+                  <a16:creationId xmlns:a16="http://schemas.microsoft.com/office/drawing/2014/main" id="{62222B00-4E84-4A90-BEA4-9AB53E4FF512}"/>
+                </a:ext>
+              </a:extLst>
+            </p:cNvPr>
+            <p:cNvCxnSpPr>
+              <a:cxnSpLocks/>
+              <a:stCxn id="27" idx="2"/>
+              <a:endCxn id="28" idx="0"/>
+            </p:cNvCxnSpPr>
+            <p:nvPr/>
+          </p:nvCxnSpPr>
+          <p:spPr>
+            <a:xfrm>
+              <a:off x="4359006" y="1542108"/>
+              <a:ext cx="5203" cy="222196"/>
+            </a:xfrm>
+            <a:prstGeom prst="straightConnector1">
+              <a:avLst/>
+            </a:prstGeom>
+            <a:ln w="25400">
+              <a:solidFill>
+                <a:schemeClr val="tx1"/>
+              </a:solidFill>
+              <a:tailEnd type="triangle"/>
+            </a:ln>
+          </p:spPr>
+          <p:style>
+            <a:lnRef idx="1">
+              <a:schemeClr val="accent1"/>
+            </a:lnRef>
+            <a:fillRef idx="0">
+              <a:schemeClr val="accent1"/>
+            </a:fillRef>
+            <a:effectRef idx="0">
+              <a:schemeClr val="accent1"/>
+            </a:effectRef>
+            <a:fontRef idx="minor">
+              <a:schemeClr val="tx1"/>
+            </a:fontRef>
+          </p:style>
+        </p:cxnSp>
+        <p:sp>
+          <p:nvSpPr>
+            <p:cNvPr id="30" name="矩形 29">
+              <a:extLst>
+                <a:ext uri="{FF2B5EF4-FFF2-40B4-BE49-F238E27FC236}">
+                  <a16:creationId xmlns:a16="http://schemas.microsoft.com/office/drawing/2014/main" id="{F5049C11-3FFC-4708-A425-6AAD08EE0A1B}"/>
+                </a:ext>
+              </a:extLst>
+            </p:cNvPr>
+            <p:cNvSpPr/>
+            <p:nvPr/>
+          </p:nvSpPr>
+          <p:spPr>
+            <a:xfrm>
+              <a:off x="415888" y="1052248"/>
               <a:ext cx="2189018" cy="536067"/>
+            </a:xfrm>
+            <a:prstGeom prst="rect">
+              <a:avLst/>
+            </a:prstGeom>
+            <a:noFill/>
+            <a:ln w="12700">
+              <a:solidFill>
+                <a:schemeClr val="accent1"/>
+              </a:solidFill>
+              <a:prstDash val="dash"/>
+            </a:ln>
+          </p:spPr>
+          <p:style>
+            <a:lnRef idx="2">
+              <a:schemeClr val="accent1">
+                <a:shade val="50000"/>
+              </a:schemeClr>
+            </a:lnRef>
+            <a:fillRef idx="1">
+              <a:schemeClr val="accent1"/>
+            </a:fillRef>
+            <a:effectRef idx="0">
+              <a:schemeClr val="accent1"/>
+            </a:effectRef>
+            <a:fontRef idx="minor">
+              <a:schemeClr val="lt1"/>
+            </a:fontRef>
+          </p:style>
+          <p:txBody>
+            <a:bodyPr rot="0" spcFirstLastPara="0" vert="horz" wrap="square" lIns="91440" tIns="45720" rIns="91440" bIns="45720" numCol="1" spcCol="0" rtlCol="0" fromWordArt="0" anchor="ctr" anchorCtr="0" forceAA="0" compatLnSpc="1">
+              <a:prstTxWarp prst="textNoShape">
+                <a:avLst/>
+              </a:prstTxWarp>
+              <a:noAutofit/>
+            </a:bodyPr>
+            <a:lstStyle/>
+            <a:p>
+              <a:pPr algn="ctr">
+                <a:spcAft>
+                  <a:spcPts val="0"/>
+                </a:spcAft>
+              </a:pPr>
+              <a:r>
+                <a:rPr lang="en-US" sz="1000" kern="1200">
+                  <a:solidFill>
+                    <a:srgbClr val="000000"/>
+                  </a:solidFill>
+                  <a:effectLst/>
+                  <a:ea typeface="新細明體" panose="02020500000000000000" pitchFamily="18" charset="-120"/>
+                  <a:cs typeface="Times New Roman" panose="02020603050405020304" pitchFamily="18" charset="0"/>
+                </a:rPr>
+                <a:t>Parse or prepare data and save it at the allocated space.</a:t>
+              </a:r>
+              <a:endParaRPr lang="zh-TW" sz="1200" kern="100">
+                <a:effectLst/>
+                <a:ea typeface="新細明體" panose="02020500000000000000" pitchFamily="18" charset="-120"/>
+                <a:cs typeface="Times New Roman" panose="02020603050405020304" pitchFamily="18" charset="0"/>
+              </a:endParaRPr>
+            </a:p>
+          </p:txBody>
+        </p:sp>
+        <p:cxnSp>
+          <p:nvCxnSpPr>
+            <p:cNvPr id="33" name="直線單箭頭接點 32">
+              <a:extLst>
+                <a:ext uri="{FF2B5EF4-FFF2-40B4-BE49-F238E27FC236}">
+                  <a16:creationId xmlns:a16="http://schemas.microsoft.com/office/drawing/2014/main" id="{98D0467B-CEFB-4ED9-B899-1F0C3D522951}"/>
+                </a:ext>
+              </a:extLst>
+            </p:cNvPr>
+            <p:cNvCxnSpPr>
+              <a:cxnSpLocks/>
+              <a:stCxn id="30" idx="3"/>
+              <a:endCxn id="27" idx="1"/>
+            </p:cNvCxnSpPr>
+            <p:nvPr/>
+          </p:nvCxnSpPr>
+          <p:spPr>
+            <a:xfrm flipV="1">
+              <a:off x="2604906" y="1243080"/>
+              <a:ext cx="914099" cy="77202"/>
+            </a:xfrm>
+            <a:prstGeom prst="straightConnector1">
+              <a:avLst/>
+            </a:prstGeom>
+            <a:ln w="9525">
+              <a:solidFill>
+                <a:schemeClr val="tx1"/>
+              </a:solidFill>
+              <a:prstDash val="sysDash"/>
+              <a:tailEnd type="triangle"/>
+            </a:ln>
+          </p:spPr>
+          <p:style>
+            <a:lnRef idx="1">
+              <a:schemeClr val="accent1"/>
+            </a:lnRef>
+            <a:fillRef idx="0">
+              <a:schemeClr val="accent1"/>
+            </a:fillRef>
+            <a:effectRef idx="0">
+              <a:schemeClr val="accent1"/>
+            </a:effectRef>
+            <a:fontRef idx="minor">
+              <a:schemeClr val="tx1"/>
+            </a:fontRef>
+          </p:style>
+        </p:cxnSp>
+        <p:cxnSp>
+          <p:nvCxnSpPr>
+            <p:cNvPr id="35" name="直線單箭頭接點 34">
+              <a:extLst>
+                <a:ext uri="{FF2B5EF4-FFF2-40B4-BE49-F238E27FC236}">
+                  <a16:creationId xmlns:a16="http://schemas.microsoft.com/office/drawing/2014/main" id="{E0DA3599-A8A0-45E6-BF24-273411760A07}"/>
+                </a:ext>
+              </a:extLst>
+            </p:cNvPr>
+            <p:cNvCxnSpPr>
+              <a:cxnSpLocks/>
+              <a:stCxn id="40" idx="3"/>
+            </p:cNvCxnSpPr>
+            <p:nvPr/>
+          </p:nvCxnSpPr>
+          <p:spPr>
+            <a:xfrm flipV="1">
+              <a:off x="2604900" y="1628847"/>
+              <a:ext cx="1728626" cy="363050"/>
+            </a:xfrm>
+            <a:prstGeom prst="straightConnector1">
+              <a:avLst/>
+            </a:prstGeom>
+            <a:ln w="9525">
+              <a:solidFill>
+                <a:schemeClr val="tx1"/>
+              </a:solidFill>
+              <a:prstDash val="sysDash"/>
+              <a:tailEnd type="triangle"/>
+            </a:ln>
+          </p:spPr>
+          <p:style>
+            <a:lnRef idx="1">
+              <a:schemeClr val="accent1"/>
+            </a:lnRef>
+            <a:fillRef idx="0">
+              <a:schemeClr val="accent1"/>
+            </a:fillRef>
+            <a:effectRef idx="0">
+              <a:schemeClr val="accent1"/>
+            </a:effectRef>
+            <a:fontRef idx="minor">
+              <a:schemeClr val="tx1"/>
+            </a:fontRef>
+          </p:style>
+        </p:cxnSp>
+        <p:sp>
+          <p:nvSpPr>
+            <p:cNvPr id="40" name="矩形 39">
+              <a:extLst>
+                <a:ext uri="{FF2B5EF4-FFF2-40B4-BE49-F238E27FC236}">
+                  <a16:creationId xmlns:a16="http://schemas.microsoft.com/office/drawing/2014/main" id="{EC452C01-5DD3-4871-AB8A-EE90C8E65C5A}"/>
+                </a:ext>
+              </a:extLst>
+            </p:cNvPr>
+            <p:cNvSpPr/>
+            <p:nvPr/>
+          </p:nvSpPr>
+          <p:spPr>
+            <a:xfrm>
+              <a:off x="415888" y="1723863"/>
+              <a:ext cx="2189018" cy="536067"/>
+            </a:xfrm>
+            <a:prstGeom prst="rect">
+              <a:avLst/>
+            </a:prstGeom>
+            <a:noFill/>
+            <a:ln w="12700">
+              <a:solidFill>
+                <a:schemeClr val="accent1"/>
+              </a:solidFill>
+              <a:prstDash val="dash"/>
+            </a:ln>
+          </p:spPr>
+          <p:style>
+            <a:lnRef idx="2">
+              <a:schemeClr val="accent1">
+                <a:shade val="50000"/>
+              </a:schemeClr>
+            </a:lnRef>
+            <a:fillRef idx="1">
+              <a:schemeClr val="accent1"/>
+            </a:fillRef>
+            <a:effectRef idx="0">
+              <a:schemeClr val="accent1"/>
+            </a:effectRef>
+            <a:fontRef idx="minor">
+              <a:schemeClr val="lt1"/>
+            </a:fontRef>
+          </p:style>
+          <p:txBody>
+            <a:bodyPr rot="0" spcFirstLastPara="0" vert="horz" wrap="square" lIns="91440" tIns="45720" rIns="91440" bIns="45720" numCol="1" spcCol="0" rtlCol="0" fromWordArt="0" anchor="ctr" anchorCtr="0" forceAA="0" compatLnSpc="1">
+              <a:prstTxWarp prst="textNoShape">
+                <a:avLst/>
+              </a:prstTxWarp>
+              <a:noAutofit/>
+            </a:bodyPr>
+            <a:lstStyle/>
+            <a:p>
+              <a:pPr algn="ctr">
+                <a:spcAft>
+                  <a:spcPts val="0"/>
+                </a:spcAft>
+              </a:pPr>
+              <a:r>
+                <a:rPr lang="en-US" sz="1000" kern="1200">
+                  <a:solidFill>
+                    <a:srgbClr val="000000"/>
+                  </a:solidFill>
+                  <a:effectLst/>
+                  <a:ea typeface="新細明體" panose="02020500000000000000" pitchFamily="18" charset="-120"/>
+                  <a:cs typeface="Times New Roman" panose="02020603050405020304" pitchFamily="18" charset="0"/>
+                </a:rPr>
+                <a:t>Record graphics API for buffer copying and then submit to queue. </a:t>
+              </a:r>
+              <a:endParaRPr lang="zh-TW" sz="1200" kern="100">
+                <a:effectLst/>
+                <a:ea typeface="新細明體" panose="02020500000000000000" pitchFamily="18" charset="-120"/>
+                <a:cs typeface="Times New Roman" panose="02020603050405020304" pitchFamily="18" charset="0"/>
+              </a:endParaRPr>
+            </a:p>
+          </p:txBody>
+        </p:sp>
+        <p:sp>
+          <p:nvSpPr>
+            <p:cNvPr id="42" name="矩形 41">
+              <a:extLst>
+                <a:ext uri="{FF2B5EF4-FFF2-40B4-BE49-F238E27FC236}">
+                  <a16:creationId xmlns:a16="http://schemas.microsoft.com/office/drawing/2014/main" id="{5A4154BA-927A-4FCE-BEF1-7619FA4F7BD5}"/>
+                </a:ext>
+              </a:extLst>
+            </p:cNvPr>
+            <p:cNvSpPr/>
+            <p:nvPr/>
+          </p:nvSpPr>
+          <p:spPr>
+            <a:xfrm>
+              <a:off x="442424" y="361667"/>
+              <a:ext cx="2189018" cy="536067"/>
+            </a:xfrm>
+            <a:prstGeom prst="rect">
+              <a:avLst/>
+            </a:prstGeom>
+            <a:noFill/>
+            <a:ln w="12700">
+              <a:solidFill>
+                <a:schemeClr val="accent1"/>
+              </a:solidFill>
+              <a:prstDash val="dash"/>
+            </a:ln>
+          </p:spPr>
+          <p:style>
+            <a:lnRef idx="2">
+              <a:schemeClr val="accent1">
+                <a:shade val="50000"/>
+              </a:schemeClr>
+            </a:lnRef>
+            <a:fillRef idx="1">
+              <a:schemeClr val="accent1"/>
+            </a:fillRef>
+            <a:effectRef idx="0">
+              <a:schemeClr val="accent1"/>
+            </a:effectRef>
+            <a:fontRef idx="minor">
+              <a:schemeClr val="lt1"/>
+            </a:fontRef>
+          </p:style>
+          <p:txBody>
+            <a:bodyPr rot="0" spcFirstLastPara="0" vert="horz" wrap="square" lIns="91440" tIns="45720" rIns="91440" bIns="45720" numCol="1" spcCol="0" rtlCol="0" fromWordArt="0" anchor="ctr" anchorCtr="0" forceAA="0" compatLnSpc="1">
+              <a:prstTxWarp prst="textNoShape">
+                <a:avLst/>
+              </a:prstTxWarp>
+              <a:noAutofit/>
+            </a:bodyPr>
+            <a:lstStyle/>
+            <a:p>
+              <a:pPr algn="ctr">
+                <a:spcAft>
+                  <a:spcPts val="0"/>
+                </a:spcAft>
+              </a:pPr>
+              <a:r>
+                <a:rPr lang="en-US" sz="1000" kern="1200">
+                  <a:solidFill>
+                    <a:srgbClr val="000000"/>
+                  </a:solidFill>
+                  <a:effectLst/>
+                  <a:ea typeface="新細明體" panose="02020500000000000000" pitchFamily="18" charset="-120"/>
+                  <a:cs typeface="Times New Roman" panose="02020603050405020304" pitchFamily="18" charset="0"/>
+                </a:rPr>
+                <a:t>Allocate system memory(host visible memory) with target size and map it for get address.</a:t>
+              </a:r>
+              <a:endParaRPr lang="zh-TW" sz="1200" kern="100">
+                <a:effectLst/>
+                <a:ea typeface="新細明體" panose="02020500000000000000" pitchFamily="18" charset="-120"/>
+                <a:cs typeface="Times New Roman" panose="02020603050405020304" pitchFamily="18" charset="0"/>
+              </a:endParaRPr>
+            </a:p>
+          </p:txBody>
+        </p:sp>
+        <p:cxnSp>
+          <p:nvCxnSpPr>
+            <p:cNvPr id="43" name="直線單箭頭接點 42">
+              <a:extLst>
+                <a:ext uri="{FF2B5EF4-FFF2-40B4-BE49-F238E27FC236}">
+                  <a16:creationId xmlns:a16="http://schemas.microsoft.com/office/drawing/2014/main" id="{733D9AB1-9CAB-44AB-9427-9B8AF8BBE6DD}"/>
+                </a:ext>
+              </a:extLst>
+            </p:cNvPr>
+            <p:cNvCxnSpPr>
+              <a:cxnSpLocks/>
+              <a:stCxn id="42" idx="3"/>
+              <a:endCxn id="27" idx="1"/>
+            </p:cNvCxnSpPr>
+            <p:nvPr/>
+          </p:nvCxnSpPr>
+          <p:spPr>
+            <a:xfrm>
+              <a:off x="2631442" y="629701"/>
+              <a:ext cx="887563" cy="613379"/>
+            </a:xfrm>
+            <a:prstGeom prst="straightConnector1">
+              <a:avLst/>
+            </a:prstGeom>
+            <a:ln w="9525">
+              <a:solidFill>
+                <a:schemeClr val="tx1"/>
+              </a:solidFill>
+              <a:prstDash val="sysDash"/>
+              <a:tailEnd type="triangle"/>
+            </a:ln>
+          </p:spPr>
+          <p:style>
+            <a:lnRef idx="1">
+              <a:schemeClr val="accent1"/>
+            </a:lnRef>
+            <a:fillRef idx="0">
+              <a:schemeClr val="accent1"/>
+            </a:fillRef>
+            <a:effectRef idx="0">
+              <a:schemeClr val="accent1"/>
+            </a:effectRef>
+            <a:fontRef idx="minor">
+              <a:schemeClr val="tx1"/>
+            </a:fontRef>
+          </p:style>
+        </p:cxnSp>
+      </p:grpSp>
+      <p:grpSp>
+        <p:nvGrpSpPr>
+          <p:cNvPr id="53" name="群組 52">
+            <a:extLst>
+              <a:ext uri="{FF2B5EF4-FFF2-40B4-BE49-F238E27FC236}">
+                <a16:creationId xmlns:a16="http://schemas.microsoft.com/office/drawing/2014/main" id="{3F9229ED-E6CA-4C68-9E82-33D5CE399050}"/>
+              </a:ext>
+            </a:extLst>
+          </p:cNvPr>
+          <p:cNvGrpSpPr/>
+          <p:nvPr/>
+        </p:nvGrpSpPr>
+        <p:grpSpPr>
+          <a:xfrm>
+            <a:off x="4307626" y="4039340"/>
+            <a:ext cx="5519955" cy="1649537"/>
+            <a:chOff x="4307626" y="4039340"/>
+            <a:chExt cx="5519955" cy="1649537"/>
+          </a:xfrm>
+        </p:grpSpPr>
+        <p:sp>
+          <p:nvSpPr>
+            <p:cNvPr id="3" name="矩形 2">
+              <a:extLst>
+                <a:ext uri="{FF2B5EF4-FFF2-40B4-BE49-F238E27FC236}">
+                  <a16:creationId xmlns:a16="http://schemas.microsoft.com/office/drawing/2014/main" id="{FFDD7E79-4AC5-45B9-B2E6-2ACC5D7A8074}"/>
+                </a:ext>
+              </a:extLst>
+            </p:cNvPr>
+            <p:cNvSpPr/>
+            <p:nvPr/>
+          </p:nvSpPr>
+          <p:spPr>
+            <a:xfrm>
+              <a:off x="7998691" y="4039340"/>
+              <a:ext cx="1828890" cy="550415"/>
             </a:xfrm>
             <a:prstGeom prst="rect">
               <a:avLst/>
@@ -3395,63 +4207,22 @@
                     <a:schemeClr val="tx1"/>
                   </a:solidFill>
                 </a:rPr>
-                <a:t>Allocated System Memory(host visible memory) with target size.</a:t>
+                <a:t>Device local</a:t>
               </a:r>
+              <a:endParaRPr lang="zh-TW" altLang="en-US" sz="1000" dirty="0">
+                <a:solidFill>
+                  <a:schemeClr val="tx1"/>
+                </a:solidFill>
+              </a:endParaRPr>
             </a:p>
           </p:txBody>
         </p:sp>
-        <p:cxnSp>
-          <p:nvCxnSpPr>
-            <p:cNvPr id="6" name="直線單箭頭接點 5">
+        <p:sp>
+          <p:nvSpPr>
+            <p:cNvPr id="45" name="矩形 44">
               <a:extLst>
                 <a:ext uri="{FF2B5EF4-FFF2-40B4-BE49-F238E27FC236}">
-                  <a16:creationId xmlns:a16="http://schemas.microsoft.com/office/drawing/2014/main" id="{CF8C2A2D-F9FF-4F21-BBF5-D7E040C34825}"/>
-                </a:ext>
-              </a:extLst>
-            </p:cNvPr>
-            <p:cNvCxnSpPr>
-              <a:cxnSpLocks/>
-              <a:stCxn id="4" idx="2"/>
-              <a:endCxn id="8" idx="0"/>
-            </p:cNvCxnSpPr>
-            <p:nvPr/>
-          </p:nvCxnSpPr>
-          <p:spPr>
-            <a:xfrm>
-              <a:off x="3191163" y="1847270"/>
-              <a:ext cx="0" cy="231624"/>
-            </a:xfrm>
-            <a:prstGeom prst="straightConnector1">
-              <a:avLst/>
-            </a:prstGeom>
-            <a:ln w="38100">
-              <a:solidFill>
-                <a:schemeClr val="tx1"/>
-              </a:solidFill>
-              <a:tailEnd type="triangle"/>
-            </a:ln>
-          </p:spPr>
-          <p:style>
-            <a:lnRef idx="1">
-              <a:schemeClr val="accent1"/>
-            </a:lnRef>
-            <a:fillRef idx="0">
-              <a:schemeClr val="accent1"/>
-            </a:fillRef>
-            <a:effectRef idx="0">
-              <a:schemeClr val="accent1"/>
-            </a:effectRef>
-            <a:fontRef idx="minor">
-              <a:schemeClr val="tx1"/>
-            </a:fontRef>
-          </p:style>
-        </p:cxnSp>
-        <p:sp>
-          <p:nvSpPr>
-            <p:cNvPr id="8" name="矩形 7">
-              <a:extLst>
-                <a:ext uri="{FF2B5EF4-FFF2-40B4-BE49-F238E27FC236}">
-                  <a16:creationId xmlns:a16="http://schemas.microsoft.com/office/drawing/2014/main" id="{F0CC4257-218C-4F65-89BF-0477230E123F}"/>
+                  <a16:creationId xmlns:a16="http://schemas.microsoft.com/office/drawing/2014/main" id="{BE163FF4-991D-4E9C-9D2D-EAC7802627B6}"/>
                 </a:ext>
               </a:extLst>
             </p:cNvPr>
@@ -3460,8 +4231,8 @@
           </p:nvSpPr>
           <p:spPr>
             <a:xfrm>
-              <a:off x="2096654" y="2078894"/>
-              <a:ext cx="2189018" cy="536067"/>
+              <a:off x="7998689" y="5138462"/>
+              <a:ext cx="1828890" cy="550415"/>
             </a:xfrm>
             <a:prstGeom prst="rect">
               <a:avLst/>
@@ -3500,63 +4271,76 @@
                     <a:schemeClr val="tx1"/>
                   </a:solidFill>
                 </a:rPr>
-                <a:t>Parse or prepare data and save it at the allocated space.</a:t>
+                <a:t>Host visible</a:t>
               </a:r>
+              <a:r>
+                <a:rPr lang="zh-TW" altLang="en-US" sz="1000" dirty="0">
+                  <a:solidFill>
+                    <a:schemeClr val="tx1"/>
+                  </a:solidFill>
+                </a:rPr>
+                <a:t> </a:t>
+              </a:r>
+              <a:r>
+                <a:rPr lang="en-US" altLang="zh-TW" sz="1000" dirty="0">
+                  <a:solidFill>
+                    <a:schemeClr val="tx1"/>
+                  </a:solidFill>
+                </a:rPr>
+                <a:t>+</a:t>
+              </a:r>
+              <a:r>
+                <a:rPr lang="zh-TW" altLang="en-US" sz="1000" dirty="0">
+                  <a:solidFill>
+                    <a:schemeClr val="tx1"/>
+                  </a:solidFill>
+                </a:rPr>
+                <a:t> </a:t>
+              </a:r>
+              <a:br>
+                <a:rPr lang="en-US" altLang="zh-TW" sz="1000" dirty="0">
+                  <a:solidFill>
+                    <a:schemeClr val="tx1"/>
+                  </a:solidFill>
+                </a:rPr>
+              </a:br>
+              <a:r>
+                <a:rPr lang="en-US" altLang="zh-TW" sz="1000" dirty="0">
+                  <a:solidFill>
+                    <a:schemeClr val="tx1"/>
+                  </a:solidFill>
+                </a:rPr>
+                <a:t>Host coherent +</a:t>
+              </a:r>
+              <a:br>
+                <a:rPr lang="en-US" altLang="zh-TW" sz="1000" dirty="0">
+                  <a:solidFill>
+                    <a:schemeClr val="tx1"/>
+                  </a:solidFill>
+                </a:rPr>
+              </a:br>
+              <a:r>
+                <a:rPr lang="en-US" altLang="zh-TW" sz="1000" dirty="0">
+                  <a:solidFill>
+                    <a:schemeClr val="tx1"/>
+                  </a:solidFill>
+                </a:rPr>
+                <a:t>Host cached</a:t>
+              </a:r>
+              <a:endParaRPr lang="zh-TW" altLang="en-US" sz="1000" dirty="0">
+                <a:solidFill>
+                  <a:schemeClr val="tx1"/>
+                </a:solidFill>
+              </a:endParaRPr>
             </a:p>
           </p:txBody>
         </p:sp>
-        <p:cxnSp>
-          <p:nvCxnSpPr>
-            <p:cNvPr id="11" name="直線單箭頭接點 10">
+        <p:sp>
+          <p:nvSpPr>
+            <p:cNvPr id="46" name="矩形 45">
               <a:extLst>
                 <a:ext uri="{FF2B5EF4-FFF2-40B4-BE49-F238E27FC236}">
-                  <a16:creationId xmlns:a16="http://schemas.microsoft.com/office/drawing/2014/main" id="{24D3522F-E3B7-4C9E-AF9F-EDF26B7BD9DE}"/>
-                </a:ext>
-              </a:extLst>
-            </p:cNvPr>
-            <p:cNvCxnSpPr>
-              <a:cxnSpLocks/>
-              <a:stCxn id="8" idx="2"/>
-              <a:endCxn id="19" idx="0"/>
-            </p:cNvCxnSpPr>
-            <p:nvPr/>
-          </p:nvCxnSpPr>
-          <p:spPr>
-            <a:xfrm>
-              <a:off x="3191163" y="2614961"/>
-              <a:ext cx="0" cy="231624"/>
-            </a:xfrm>
-            <a:prstGeom prst="straightConnector1">
-              <a:avLst/>
-            </a:prstGeom>
-            <a:ln w="38100">
-              <a:solidFill>
-                <a:schemeClr val="tx1"/>
-              </a:solidFill>
-              <a:tailEnd type="triangle"/>
-            </a:ln>
-          </p:spPr>
-          <p:style>
-            <a:lnRef idx="1">
-              <a:schemeClr val="accent1"/>
-            </a:lnRef>
-            <a:fillRef idx="0">
-              <a:schemeClr val="accent1"/>
-            </a:fillRef>
-            <a:effectRef idx="0">
-              <a:schemeClr val="accent1"/>
-            </a:effectRef>
-            <a:fontRef idx="minor">
-              <a:schemeClr val="tx1"/>
-            </a:fontRef>
-          </p:style>
-        </p:cxnSp>
-        <p:sp>
-          <p:nvSpPr>
-            <p:cNvPr id="19" name="矩形 18">
-              <a:extLst>
-                <a:ext uri="{FF2B5EF4-FFF2-40B4-BE49-F238E27FC236}">
-                  <a16:creationId xmlns:a16="http://schemas.microsoft.com/office/drawing/2014/main" id="{6B6A1091-EA44-4A6D-B001-B86AB2F09889}"/>
+                  <a16:creationId xmlns:a16="http://schemas.microsoft.com/office/drawing/2014/main" id="{ACAFE331-13B1-46A3-B028-E50B95D89D18}"/>
                 </a:ext>
               </a:extLst>
             </p:cNvPr>
@@ -3565,8 +4349,8 @@
           </p:nvSpPr>
           <p:spPr>
             <a:xfrm>
-              <a:off x="2096654" y="2846585"/>
-              <a:ext cx="2189018" cy="536067"/>
+              <a:off x="7994074" y="4588901"/>
+              <a:ext cx="1828890" cy="550415"/>
             </a:xfrm>
             <a:prstGeom prst="rect">
               <a:avLst/>
@@ -3605,38 +4389,22 @@
                     <a:schemeClr val="tx1"/>
                   </a:solidFill>
                 </a:rPr>
-                <a:t>Record graphics API for buffer copying and then submit to queue. </a:t>
+                <a:t>Host visible</a:t>
               </a:r>
+              <a:endParaRPr lang="zh-TW" altLang="en-US" sz="1000" dirty="0">
+                <a:solidFill>
+                  <a:schemeClr val="tx1"/>
+                </a:solidFill>
+              </a:endParaRPr>
             </a:p>
           </p:txBody>
         </p:sp>
-      </p:grpSp>
-      <p:grpSp>
-        <p:nvGrpSpPr>
-          <p:cNvPr id="71" name="群組 70">
-            <a:extLst>
-              <a:ext uri="{FF2B5EF4-FFF2-40B4-BE49-F238E27FC236}">
-                <a16:creationId xmlns:a16="http://schemas.microsoft.com/office/drawing/2014/main" id="{677AD761-E075-4096-9A7A-93B7989C7AA3}"/>
-              </a:ext>
-            </a:extLst>
-          </p:cNvPr>
-          <p:cNvGrpSpPr/>
-          <p:nvPr/>
-        </p:nvGrpSpPr>
-        <p:grpSpPr>
-          <a:xfrm>
-            <a:off x="3629931" y="1508306"/>
-            <a:ext cx="8255078" cy="2631729"/>
-            <a:chOff x="3629931" y="1508306"/>
-            <a:chExt cx="8255078" cy="2631729"/>
-          </a:xfrm>
-        </p:grpSpPr>
         <p:sp>
           <p:nvSpPr>
-            <p:cNvPr id="32" name="矩形 31">
+            <p:cNvPr id="50" name="矩形 49">
               <a:extLst>
                 <a:ext uri="{FF2B5EF4-FFF2-40B4-BE49-F238E27FC236}">
-                  <a16:creationId xmlns:a16="http://schemas.microsoft.com/office/drawing/2014/main" id="{1CD22B56-A701-46FD-8B8F-E879DE675A1A}"/>
+                  <a16:creationId xmlns:a16="http://schemas.microsoft.com/office/drawing/2014/main" id="{BB66F52D-598F-4FB3-838D-E9AA82574BC9}"/>
                 </a:ext>
               </a:extLst>
             </p:cNvPr>
@@ -3645,8 +4413,8 @@
           </p:nvSpPr>
           <p:spPr>
             <a:xfrm>
-              <a:off x="3629931" y="2086328"/>
-              <a:ext cx="2881717" cy="2053245"/>
+              <a:off x="4307627" y="4314547"/>
+              <a:ext cx="2674013" cy="550415"/>
             </a:xfrm>
             <a:prstGeom prst="rect">
               <a:avLst/>
@@ -3679,20 +4447,58 @@
             <a:lstStyle/>
             <a:p>
               <a:pPr algn="ctr"/>
-              <a:endParaRPr lang="zh-TW" altLang="en-US" dirty="0">
-                <a:solidFill>
-                  <a:schemeClr val="tx1"/>
-                </a:solidFill>
-              </a:endParaRPr>
+              <a:r>
+                <a:rPr lang="en-US" altLang="zh-TW" sz="1000" dirty="0">
+                  <a:solidFill>
+                    <a:schemeClr val="tx1"/>
+                  </a:solidFill>
+                </a:rPr>
+                <a:t>Heap 0 </a:t>
+              </a:r>
+              <a:br>
+                <a:rPr lang="en-US" altLang="zh-TW" sz="1000" dirty="0">
+                  <a:solidFill>
+                    <a:schemeClr val="tx1"/>
+                  </a:solidFill>
+                </a:rPr>
+              </a:br>
+              <a:r>
+                <a:rPr lang="en-US" altLang="zh-TW" sz="1000" dirty="0">
+                  <a:solidFill>
+                    <a:srgbClr val="000000"/>
+                  </a:solidFill>
+                  <a:ea typeface="細明體" panose="02020509000000000000" pitchFamily="49" charset="-120"/>
+                  <a:cs typeface="Consolas" panose="020B0609020204030204" pitchFamily="49" charset="0"/>
+                </a:rPr>
+                <a:t>V</a:t>
+              </a:r>
+              <a:r>
+                <a:rPr lang="en-US" altLang="zh-TW" sz="1000" dirty="0" bmk="">
+                  <a:solidFill>
+                    <a:srgbClr val="000000"/>
+                  </a:solidFill>
+                  <a:ea typeface="細明體" panose="02020509000000000000" pitchFamily="49" charset="-120"/>
+                  <a:cs typeface="Consolas" panose="020B0609020204030204" pitchFamily="49" charset="0"/>
+                </a:rPr>
+                <a:t>K_MEMORY_HEAP_DEVICE_LOCAL_BIT</a:t>
+              </a:r>
+              <a:r>
+                <a:rPr lang="en-US" altLang="zh-TW" sz="1000" dirty="0">
+                  <a:solidFill>
+                    <a:schemeClr val="tx1"/>
+                  </a:solidFill>
+                </a:rPr>
+                <a:t> </a:t>
+              </a:r>
             </a:p>
           </p:txBody>
         </p:sp>
         <p:sp>
           <p:nvSpPr>
-            <p:cNvPr id="34" name="矩形 33">
+            <p:cNvPr id="51" name="矩形 50">
               <a:extLst>
                 <a:ext uri="{FF2B5EF4-FFF2-40B4-BE49-F238E27FC236}">
-                  <a16:creationId xmlns:a16="http://schemas.microsoft.com/office/drawing/2014/main" id="{C655E111-7F70-481E-98E9-3C70B39E015F}"/>
+                  <a16:creationId xmlns:a16="http://schemas.microsoft.com/office/drawing/2014/main" id="{9012951A-550E-478F-9464-8759AEB1E55A}"/>
                 </a:ext>
               </a:extLst>
             </p:cNvPr>
@@ -3701,8 +4507,8 @@
           </p:nvSpPr>
           <p:spPr>
             <a:xfrm>
-              <a:off x="6511648" y="2086790"/>
-              <a:ext cx="2881717" cy="2053245"/>
+              <a:off x="4307626" y="5125941"/>
+              <a:ext cx="2674013" cy="550415"/>
             </a:xfrm>
             <a:prstGeom prst="rect">
               <a:avLst/>
@@ -3735,218 +4541,31 @@
             <a:lstStyle/>
             <a:p>
               <a:pPr algn="ctr"/>
-              <a:endParaRPr lang="zh-TW" altLang="en-US"/>
-            </a:p>
-          </p:txBody>
-        </p:sp>
-        <p:sp>
-          <p:nvSpPr>
-            <p:cNvPr id="36" name="文字方塊 35">
-              <a:extLst>
-                <a:ext uri="{FF2B5EF4-FFF2-40B4-BE49-F238E27FC236}">
-                  <a16:creationId xmlns:a16="http://schemas.microsoft.com/office/drawing/2014/main" id="{D5E20F62-7539-4C18-9DAE-556FFB155982}"/>
-                </a:ext>
-              </a:extLst>
-            </p:cNvPr>
-            <p:cNvSpPr txBox="1"/>
-            <p:nvPr/>
-          </p:nvSpPr>
-          <p:spPr>
-            <a:xfrm>
-              <a:off x="4571999" y="2188716"/>
-              <a:ext cx="1016000" cy="246221"/>
-            </a:xfrm>
-            <a:prstGeom prst="rect">
-              <a:avLst/>
-            </a:prstGeom>
-            <a:noFill/>
-          </p:spPr>
-          <p:txBody>
-            <a:bodyPr wrap="square" rtlCol="0">
-              <a:spAutoFit/>
-            </a:bodyPr>
-            <a:lstStyle/>
-            <a:p>
-              <a:pPr algn="ctr"/>
               <a:r>
                 <a:rPr lang="en-US" altLang="zh-TW" sz="1000" dirty="0">
                   <a:solidFill>
                     <a:schemeClr val="tx1"/>
                   </a:solidFill>
                 </a:rPr>
-                <a:t>App Control</a:t>
+                <a:t>Heap 1 </a:t>
               </a:r>
-              <a:endParaRPr lang="zh-TW" altLang="en-US" sz="1000" dirty="0">
-                <a:solidFill>
-                  <a:schemeClr val="tx1"/>
-                </a:solidFill>
-              </a:endParaRPr>
-            </a:p>
-          </p:txBody>
-        </p:sp>
-        <p:sp>
-          <p:nvSpPr>
-            <p:cNvPr id="37" name="文字方塊 36">
-              <a:extLst>
-                <a:ext uri="{FF2B5EF4-FFF2-40B4-BE49-F238E27FC236}">
-                  <a16:creationId xmlns:a16="http://schemas.microsoft.com/office/drawing/2014/main" id="{08004940-6C7D-4954-BBCF-80D9E8EA0C67}"/>
-                </a:ext>
-              </a:extLst>
-            </p:cNvPr>
-            <p:cNvSpPr txBox="1"/>
-            <p:nvPr/>
-          </p:nvSpPr>
-          <p:spPr>
-            <a:xfrm>
-              <a:off x="7389073" y="2188715"/>
-              <a:ext cx="1126865" cy="246221"/>
-            </a:xfrm>
-            <a:prstGeom prst="rect">
-              <a:avLst/>
-            </a:prstGeom>
-            <a:noFill/>
-          </p:spPr>
-          <p:txBody>
-            <a:bodyPr wrap="square" rtlCol="0">
-              <a:spAutoFit/>
-            </a:bodyPr>
-            <a:lstStyle/>
-            <a:p>
-              <a:pPr algn="ctr"/>
-              <a:r>
+              <a:br>
                 <a:rPr lang="en-US" altLang="zh-TW" sz="1000" dirty="0">
                   <a:solidFill>
                     <a:schemeClr val="tx1"/>
                   </a:solidFill>
                 </a:rPr>
-                <a:t>Device Control</a:t>
-              </a:r>
-              <a:endParaRPr lang="zh-TW" altLang="en-US" sz="1000" dirty="0">
-                <a:solidFill>
-                  <a:schemeClr val="tx1"/>
-                </a:solidFill>
-              </a:endParaRPr>
-            </a:p>
-          </p:txBody>
-        </p:sp>
-        <p:sp>
-          <p:nvSpPr>
-            <p:cNvPr id="38" name="矩形 37">
-              <a:extLst>
-                <a:ext uri="{FF2B5EF4-FFF2-40B4-BE49-F238E27FC236}">
-                  <a16:creationId xmlns:a16="http://schemas.microsoft.com/office/drawing/2014/main" id="{593B1AC8-2BA4-4629-A20F-3D317229169E}"/>
-                </a:ext>
-              </a:extLst>
-            </p:cNvPr>
-            <p:cNvSpPr/>
-            <p:nvPr/>
-          </p:nvSpPr>
-          <p:spPr>
-            <a:xfrm>
-              <a:off x="7148945" y="2459182"/>
-              <a:ext cx="1669621" cy="598056"/>
-            </a:xfrm>
-            <a:prstGeom prst="rect">
-              <a:avLst/>
-            </a:prstGeom>
-            <a:ln>
-              <a:noFill/>
-            </a:ln>
-          </p:spPr>
-          <p:style>
-            <a:lnRef idx="2">
-              <a:schemeClr val="accent1">
-                <a:shade val="50000"/>
-              </a:schemeClr>
-            </a:lnRef>
-            <a:fillRef idx="1">
-              <a:schemeClr val="accent1"/>
-            </a:fillRef>
-            <a:effectRef idx="0">
-              <a:schemeClr val="accent1"/>
-            </a:effectRef>
-            <a:fontRef idx="minor">
-              <a:schemeClr val="lt1"/>
-            </a:fontRef>
-          </p:style>
-          <p:txBody>
-            <a:bodyPr rtlCol="0" anchor="ctr"/>
-            <a:lstStyle/>
-            <a:p>
-              <a:pPr algn="ctr"/>
+              </a:br>
               <a:r>
                 <a:rPr lang="en-US" altLang="zh-TW" sz="1000" dirty="0">
                   <a:solidFill>
-                    <a:schemeClr val="tx1"/>
+                    <a:srgbClr val="000000"/>
                   </a:solidFill>
+                  <a:ea typeface="細明體" panose="02020509000000000000" pitchFamily="49" charset="-120"/>
                 </a:rPr>
-                <a:t>Driver System Memory</a:t>
+                <a:t>0</a:t>
               </a:r>
-              <a:endParaRPr lang="zh-TW" altLang="en-US" sz="1000" dirty="0">
-                <a:solidFill>
-                  <a:schemeClr val="tx1"/>
-                </a:solidFill>
-              </a:endParaRPr>
-            </a:p>
-          </p:txBody>
-        </p:sp>
-        <p:sp>
-          <p:nvSpPr>
-            <p:cNvPr id="39" name="矩形 38">
-              <a:extLst>
-                <a:ext uri="{FF2B5EF4-FFF2-40B4-BE49-F238E27FC236}">
-                  <a16:creationId xmlns:a16="http://schemas.microsoft.com/office/drawing/2014/main" id="{705CFAEE-D37B-4CEA-942C-262BAC9CA5AD}"/>
-                </a:ext>
-              </a:extLst>
-            </p:cNvPr>
-            <p:cNvSpPr/>
-            <p:nvPr/>
-          </p:nvSpPr>
-          <p:spPr>
-            <a:xfrm>
-              <a:off x="7159329" y="3272610"/>
-              <a:ext cx="1669621" cy="598056"/>
-            </a:xfrm>
-            <a:prstGeom prst="rect">
-              <a:avLst/>
-            </a:prstGeom>
-            <a:solidFill>
-              <a:schemeClr val="accent2"/>
-            </a:solidFill>
-            <a:ln>
-              <a:noFill/>
-            </a:ln>
-          </p:spPr>
-          <p:style>
-            <a:lnRef idx="2">
-              <a:schemeClr val="accent1">
-                <a:shade val="50000"/>
-              </a:schemeClr>
-            </a:lnRef>
-            <a:fillRef idx="1">
-              <a:schemeClr val="accent1"/>
-            </a:fillRef>
-            <a:effectRef idx="0">
-              <a:schemeClr val="accent1"/>
-            </a:effectRef>
-            <a:fontRef idx="minor">
-              <a:schemeClr val="lt1"/>
-            </a:fontRef>
-          </p:style>
-          <p:txBody>
-            <a:bodyPr rtlCol="0" anchor="ctr"/>
-            <a:lstStyle/>
-            <a:p>
-              <a:pPr algn="ctr"/>
-              <a:r>
-                <a:rPr lang="en-US" altLang="zh-TW" sz="1000" dirty="0">
-                  <a:solidFill>
-                    <a:schemeClr val="tx1"/>
-                  </a:solidFill>
-                </a:rPr>
-                <a:t> Local Video Memory</a:t>
-              </a:r>
-              <a:endParaRPr lang="zh-TW" altLang="en-US" sz="1000" dirty="0">
+              <a:endParaRPr lang="en-US" altLang="zh-TW" sz="1000" dirty="0">
                 <a:solidFill>
                   <a:schemeClr val="tx1"/>
                 </a:solidFill>
@@ -3956,29 +4575,28 @@
         </p:sp>
         <p:cxnSp>
           <p:nvCxnSpPr>
-            <p:cNvPr id="41" name="直線單箭頭接點 40">
+            <p:cNvPr id="14" name="直線單箭頭接點 13">
               <a:extLst>
                 <a:ext uri="{FF2B5EF4-FFF2-40B4-BE49-F238E27FC236}">
-                  <a16:creationId xmlns:a16="http://schemas.microsoft.com/office/drawing/2014/main" id="{62222B00-4E84-4A90-BEA4-9AB53E4FF512}"/>
+                  <a16:creationId xmlns:a16="http://schemas.microsoft.com/office/drawing/2014/main" id="{4FB8EBAA-F4EC-47ED-9056-64D509A67100}"/>
                 </a:ext>
               </a:extLst>
             </p:cNvPr>
             <p:cNvCxnSpPr>
-              <a:cxnSpLocks/>
-              <a:stCxn id="38" idx="2"/>
-              <a:endCxn id="39" idx="0"/>
+              <a:stCxn id="3" idx="1"/>
+              <a:endCxn id="50" idx="3"/>
             </p:cNvCxnSpPr>
             <p:nvPr/>
           </p:nvCxnSpPr>
           <p:spPr>
-            <a:xfrm>
-              <a:off x="7983756" y="3057238"/>
-              <a:ext cx="10384" cy="215372"/>
+            <a:xfrm flipH="1">
+              <a:off x="6981640" y="4314548"/>
+              <a:ext cx="1017051" cy="275207"/>
             </a:xfrm>
             <a:prstGeom prst="straightConnector1">
               <a:avLst/>
             </a:prstGeom>
-            <a:ln w="25400">
+            <a:ln w="38100">
               <a:solidFill>
                 <a:schemeClr val="tx1"/>
               </a:solidFill>
@@ -4000,95 +4618,34 @@
             </a:fontRef>
           </p:style>
         </p:cxnSp>
-        <p:sp>
-          <p:nvSpPr>
-            <p:cNvPr id="47" name="矩形 46">
+        <p:cxnSp>
+          <p:nvCxnSpPr>
+            <p:cNvPr id="52" name="直線單箭頭接點 51">
               <a:extLst>
                 <a:ext uri="{FF2B5EF4-FFF2-40B4-BE49-F238E27FC236}">
-                  <a16:creationId xmlns:a16="http://schemas.microsoft.com/office/drawing/2014/main" id="{F5049C11-3FFC-4708-A425-6AAD08EE0A1B}"/>
-                </a:ext>
-              </a:extLst>
-            </p:cNvPr>
-            <p:cNvSpPr/>
-            <p:nvPr/>
-          </p:nvSpPr>
-          <p:spPr>
-            <a:xfrm>
-              <a:off x="9695991" y="2086328"/>
-              <a:ext cx="2189018" cy="536067"/>
-            </a:xfrm>
-            <a:prstGeom prst="rect">
-              <a:avLst/>
-            </a:prstGeom>
-            <a:noFill/>
-            <a:ln w="12700">
-              <a:solidFill>
-                <a:schemeClr val="accent1"/>
-              </a:solidFill>
-              <a:prstDash val="dash"/>
-            </a:ln>
-          </p:spPr>
-          <p:style>
-            <a:lnRef idx="2">
-              <a:schemeClr val="accent1">
-                <a:shade val="50000"/>
-              </a:schemeClr>
-            </a:lnRef>
-            <a:fillRef idx="1">
-              <a:schemeClr val="accent1"/>
-            </a:fillRef>
-            <a:effectRef idx="0">
-              <a:schemeClr val="accent1"/>
-            </a:effectRef>
-            <a:fontRef idx="minor">
-              <a:schemeClr val="lt1"/>
-            </a:fontRef>
-          </p:style>
-          <p:txBody>
-            <a:bodyPr rtlCol="0" anchor="ctr"/>
-            <a:lstStyle/>
-            <a:p>
-              <a:pPr algn="ctr"/>
-              <a:r>
-                <a:rPr lang="en-US" altLang="zh-TW" sz="1000" dirty="0">
-                  <a:solidFill>
-                    <a:schemeClr val="tx1"/>
-                  </a:solidFill>
-                </a:rPr>
-                <a:t>Parse or prepare data and save it at the allocated space.</a:t>
-              </a:r>
-            </a:p>
-          </p:txBody>
-        </p:sp>
-        <p:cxnSp>
-          <p:nvCxnSpPr>
-            <p:cNvPr id="49" name="直線單箭頭接點 48">
-              <a:extLst>
-                <a:ext uri="{FF2B5EF4-FFF2-40B4-BE49-F238E27FC236}">
-                  <a16:creationId xmlns:a16="http://schemas.microsoft.com/office/drawing/2014/main" id="{98D0467B-CEFB-4ED9-B899-1F0C3D522951}"/>
+                  <a16:creationId xmlns:a16="http://schemas.microsoft.com/office/drawing/2014/main" id="{01E2454F-6E6F-4E77-AFB0-DAC5B803692F}"/>
                 </a:ext>
               </a:extLst>
             </p:cNvPr>
             <p:cNvCxnSpPr>
               <a:cxnSpLocks/>
-              <a:stCxn id="47" idx="1"/>
-              <a:endCxn id="38" idx="3"/>
+              <a:stCxn id="46" idx="1"/>
+              <a:endCxn id="51" idx="3"/>
             </p:cNvCxnSpPr>
             <p:nvPr/>
           </p:nvCxnSpPr>
           <p:spPr>
             <a:xfrm flipH="1">
-              <a:off x="8818566" y="2354362"/>
-              <a:ext cx="877425" cy="403848"/>
+              <a:off x="6981639" y="4864109"/>
+              <a:ext cx="1012435" cy="537040"/>
             </a:xfrm>
             <a:prstGeom prst="straightConnector1">
               <a:avLst/>
             </a:prstGeom>
-            <a:ln w="9525">
+            <a:ln w="38100">
               <a:solidFill>
                 <a:schemeClr val="tx1"/>
               </a:solidFill>
-              <a:prstDash val="sysDash"/>
               <a:tailEnd type="triangle"/>
             </a:ln>
           </p:spPr>
@@ -4109,198 +4666,32 @@
         </p:cxnSp>
         <p:cxnSp>
           <p:nvCxnSpPr>
-            <p:cNvPr id="59" name="直線單箭頭接點 58">
+            <p:cNvPr id="54" name="直線單箭頭接點 53">
               <a:extLst>
                 <a:ext uri="{FF2B5EF4-FFF2-40B4-BE49-F238E27FC236}">
-                  <a16:creationId xmlns:a16="http://schemas.microsoft.com/office/drawing/2014/main" id="{E0DA3599-A8A0-45E6-BF24-273411760A07}"/>
+                  <a16:creationId xmlns:a16="http://schemas.microsoft.com/office/drawing/2014/main" id="{4E4F9EA3-FFA4-47AF-9F8A-31D32D675499}"/>
                 </a:ext>
               </a:extLst>
             </p:cNvPr>
             <p:cNvCxnSpPr>
               <a:cxnSpLocks/>
-              <a:stCxn id="62" idx="1"/>
+              <a:stCxn id="45" idx="1"/>
+              <a:endCxn id="51" idx="3"/>
             </p:cNvCxnSpPr>
             <p:nvPr/>
           </p:nvCxnSpPr>
           <p:spPr>
-            <a:xfrm flipH="1">
-              <a:off x="7994139" y="3123833"/>
-              <a:ext cx="1701852" cy="0"/>
+            <a:xfrm flipH="1" flipV="1">
+              <a:off x="6981639" y="5401149"/>
+              <a:ext cx="1017050" cy="12521"/>
             </a:xfrm>
             <a:prstGeom prst="straightConnector1">
               <a:avLst/>
             </a:prstGeom>
-            <a:ln w="9525">
+            <a:ln w="38100">
               <a:solidFill>
                 <a:schemeClr val="tx1"/>
               </a:solidFill>
-              <a:prstDash val="sysDash"/>
-              <a:tailEnd type="triangle"/>
-            </a:ln>
-          </p:spPr>
-          <p:style>
-            <a:lnRef idx="1">
-              <a:schemeClr val="accent1"/>
-            </a:lnRef>
-            <a:fillRef idx="0">
-              <a:schemeClr val="accent1"/>
-            </a:fillRef>
-            <a:effectRef idx="0">
-              <a:schemeClr val="accent1"/>
-            </a:effectRef>
-            <a:fontRef idx="minor">
-              <a:schemeClr val="tx1"/>
-            </a:fontRef>
-          </p:style>
-        </p:cxnSp>
-        <p:sp>
-          <p:nvSpPr>
-            <p:cNvPr id="62" name="矩形 61">
-              <a:extLst>
-                <a:ext uri="{FF2B5EF4-FFF2-40B4-BE49-F238E27FC236}">
-                  <a16:creationId xmlns:a16="http://schemas.microsoft.com/office/drawing/2014/main" id="{EC452C01-5DD3-4871-AB8A-EE90C8E65C5A}"/>
-                </a:ext>
-              </a:extLst>
-            </p:cNvPr>
-            <p:cNvSpPr/>
-            <p:nvPr/>
-          </p:nvSpPr>
-          <p:spPr>
-            <a:xfrm>
-              <a:off x="9695991" y="2855799"/>
-              <a:ext cx="2189018" cy="536067"/>
-            </a:xfrm>
-            <a:prstGeom prst="rect">
-              <a:avLst/>
-            </a:prstGeom>
-            <a:noFill/>
-            <a:ln w="12700">
-              <a:solidFill>
-                <a:schemeClr val="accent1"/>
-              </a:solidFill>
-              <a:prstDash val="dash"/>
-            </a:ln>
-          </p:spPr>
-          <p:style>
-            <a:lnRef idx="2">
-              <a:schemeClr val="accent1">
-                <a:shade val="50000"/>
-              </a:schemeClr>
-            </a:lnRef>
-            <a:fillRef idx="1">
-              <a:schemeClr val="accent1"/>
-            </a:fillRef>
-            <a:effectRef idx="0">
-              <a:schemeClr val="accent1"/>
-            </a:effectRef>
-            <a:fontRef idx="minor">
-              <a:schemeClr val="lt1"/>
-            </a:fontRef>
-          </p:style>
-          <p:txBody>
-            <a:bodyPr rtlCol="0" anchor="ctr"/>
-            <a:lstStyle/>
-            <a:p>
-              <a:pPr algn="ctr"/>
-              <a:r>
-                <a:rPr lang="en-US" altLang="zh-TW" sz="1000" dirty="0">
-                  <a:solidFill>
-                    <a:schemeClr val="tx1"/>
-                  </a:solidFill>
-                </a:rPr>
-                <a:t>Record graphics API for buffer copying and then submit to queue. </a:t>
-              </a:r>
-            </a:p>
-          </p:txBody>
-        </p:sp>
-        <p:sp>
-          <p:nvSpPr>
-            <p:cNvPr id="67" name="矩形 66">
-              <a:extLst>
-                <a:ext uri="{FF2B5EF4-FFF2-40B4-BE49-F238E27FC236}">
-                  <a16:creationId xmlns:a16="http://schemas.microsoft.com/office/drawing/2014/main" id="{5A4154BA-927A-4FCE-BEF1-7619FA4F7BD5}"/>
-                </a:ext>
-              </a:extLst>
-            </p:cNvPr>
-            <p:cNvSpPr/>
-            <p:nvPr/>
-          </p:nvSpPr>
-          <p:spPr>
-            <a:xfrm>
-              <a:off x="8425990" y="1508306"/>
-              <a:ext cx="2189018" cy="536067"/>
-            </a:xfrm>
-            <a:prstGeom prst="rect">
-              <a:avLst/>
-            </a:prstGeom>
-            <a:noFill/>
-            <a:ln w="12700">
-              <a:solidFill>
-                <a:schemeClr val="accent1"/>
-              </a:solidFill>
-              <a:prstDash val="dash"/>
-            </a:ln>
-          </p:spPr>
-          <p:style>
-            <a:lnRef idx="2">
-              <a:schemeClr val="accent1">
-                <a:shade val="50000"/>
-              </a:schemeClr>
-            </a:lnRef>
-            <a:fillRef idx="1">
-              <a:schemeClr val="accent1"/>
-            </a:fillRef>
-            <a:effectRef idx="0">
-              <a:schemeClr val="accent1"/>
-            </a:effectRef>
-            <a:fontRef idx="minor">
-              <a:schemeClr val="lt1"/>
-            </a:fontRef>
-          </p:style>
-          <p:txBody>
-            <a:bodyPr rtlCol="0" anchor="ctr"/>
-            <a:lstStyle/>
-            <a:p>
-              <a:pPr algn="ctr"/>
-              <a:r>
-                <a:rPr lang="en-US" altLang="zh-TW" sz="1000" dirty="0">
-                  <a:solidFill>
-                    <a:schemeClr val="tx1"/>
-                  </a:solidFill>
-                </a:rPr>
-                <a:t>Allocate system memory(host visible memory) with target size and map it for get address.</a:t>
-              </a:r>
-            </a:p>
-          </p:txBody>
-        </p:sp>
-        <p:cxnSp>
-          <p:nvCxnSpPr>
-            <p:cNvPr id="68" name="直線單箭頭接點 67">
-              <a:extLst>
-                <a:ext uri="{FF2B5EF4-FFF2-40B4-BE49-F238E27FC236}">
-                  <a16:creationId xmlns:a16="http://schemas.microsoft.com/office/drawing/2014/main" id="{733D9AB1-9CAB-44AB-9427-9B8AF8BBE6DD}"/>
-                </a:ext>
-              </a:extLst>
-            </p:cNvPr>
-            <p:cNvCxnSpPr>
-              <a:cxnSpLocks/>
-              <a:stCxn id="67" idx="2"/>
-            </p:cNvCxnSpPr>
-            <p:nvPr/>
-          </p:nvCxnSpPr>
-          <p:spPr>
-            <a:xfrm flipH="1">
-              <a:off x="8667255" y="2044373"/>
-              <a:ext cx="853244" cy="713837"/>
-            </a:xfrm>
-            <a:prstGeom prst="straightConnector1">
-              <a:avLst/>
-            </a:prstGeom>
-            <a:ln w="9525">
-              <a:solidFill>
-                <a:schemeClr val="tx1"/>
-              </a:solidFill>
-              <a:prstDash val="sysDash"/>
               <a:tailEnd type="triangle"/>
             </a:ln>
           </p:spPr>

</xml_diff>

<commit_message>
[add] Add how to allocate device memory in Vulkan.
</commit_message>
<xml_diff>
--- a/Doc/Note/Vulkan/Vulkan-Photo.pptx
+++ b/Doc/Note/Vulkan/Vulkan-Photo.pptx
@@ -106,7 +106,7 @@
   </p:defaultTextStyle>
   <p:extLst>
     <p:ext uri="{EFAFB233-063F-42B5-8137-9DF3F51BA10A}">
-      <p15:sldGuideLst xmlns:p15="http://schemas.microsoft.com/office/powerpoint/2012/main"/>
+      <p15:sldGuideLst xmlns:p15="http://schemas.microsoft.com/office/powerpoint/2012/main" xmlns=""/>
     </p:ext>
   </p:extLst>
 </p:presentation>
@@ -134,7 +134,7 @@
           <p:cNvPr id="2" name="標題 1">
             <a:extLst>
               <a:ext uri="{FF2B5EF4-FFF2-40B4-BE49-F238E27FC236}">
-                <a16:creationId xmlns:a16="http://schemas.microsoft.com/office/drawing/2014/main" id="{311B1383-A7D8-4AB3-956F-86C97BAEE751}"/>
+                <a16:creationId xmlns:a16="http://schemas.microsoft.com/office/drawing/2014/main" xmlns="" id="{311B1383-A7D8-4AB3-956F-86C97BAEE751}"/>
               </a:ext>
             </a:extLst>
           </p:cNvPr>
@@ -171,7 +171,7 @@
           <p:cNvPr id="3" name="副標題 2">
             <a:extLst>
               <a:ext uri="{FF2B5EF4-FFF2-40B4-BE49-F238E27FC236}">
-                <a16:creationId xmlns:a16="http://schemas.microsoft.com/office/drawing/2014/main" id="{8E3B9273-BAB4-47A3-A8D4-9B4D0363B8B3}"/>
+                <a16:creationId xmlns:a16="http://schemas.microsoft.com/office/drawing/2014/main" xmlns="" id="{8E3B9273-BAB4-47A3-A8D4-9B4D0363B8B3}"/>
               </a:ext>
             </a:extLst>
           </p:cNvPr>
@@ -241,7 +241,7 @@
           <p:cNvPr id="4" name="日期版面配置區 3">
             <a:extLst>
               <a:ext uri="{FF2B5EF4-FFF2-40B4-BE49-F238E27FC236}">
-                <a16:creationId xmlns:a16="http://schemas.microsoft.com/office/drawing/2014/main" id="{A07F0EB5-201F-4429-A784-C2675FA2C401}"/>
+                <a16:creationId xmlns:a16="http://schemas.microsoft.com/office/drawing/2014/main" xmlns="" id="{A07F0EB5-201F-4429-A784-C2675FA2C401}"/>
               </a:ext>
             </a:extLst>
           </p:cNvPr>
@@ -259,7 +259,7 @@
           <a:p>
             <a:fld id="{B89D0E2C-28B2-4FE5-AFE8-C384F27AF9B3}" type="datetimeFigureOut">
               <a:rPr lang="zh-TW" altLang="en-US" smtClean="0"/>
-              <a:t>2019/7/15</a:t>
+              <a:t>2019/8/10</a:t>
             </a:fld>
             <a:endParaRPr lang="zh-TW" altLang="en-US"/>
           </a:p>
@@ -270,7 +270,7 @@
           <p:cNvPr id="5" name="頁尾版面配置區 4">
             <a:extLst>
               <a:ext uri="{FF2B5EF4-FFF2-40B4-BE49-F238E27FC236}">
-                <a16:creationId xmlns:a16="http://schemas.microsoft.com/office/drawing/2014/main" id="{FAAD6437-C21D-41A2-BA48-E70E52F13522}"/>
+                <a16:creationId xmlns:a16="http://schemas.microsoft.com/office/drawing/2014/main" xmlns="" id="{FAAD6437-C21D-41A2-BA48-E70E52F13522}"/>
               </a:ext>
             </a:extLst>
           </p:cNvPr>
@@ -295,7 +295,7 @@
           <p:cNvPr id="6" name="投影片編號版面配置區 5">
             <a:extLst>
               <a:ext uri="{FF2B5EF4-FFF2-40B4-BE49-F238E27FC236}">
-                <a16:creationId xmlns:a16="http://schemas.microsoft.com/office/drawing/2014/main" id="{E554F14F-902D-4281-A804-3EED544D2F04}"/>
+                <a16:creationId xmlns:a16="http://schemas.microsoft.com/office/drawing/2014/main" xmlns="" id="{E554F14F-902D-4281-A804-3EED544D2F04}"/>
               </a:ext>
             </a:extLst>
           </p:cNvPr>
@@ -354,7 +354,7 @@
           <p:cNvPr id="2" name="標題 1">
             <a:extLst>
               <a:ext uri="{FF2B5EF4-FFF2-40B4-BE49-F238E27FC236}">
-                <a16:creationId xmlns:a16="http://schemas.microsoft.com/office/drawing/2014/main" id="{4A64F9CF-5F7C-4696-B365-7394AED6AFCA}"/>
+                <a16:creationId xmlns:a16="http://schemas.microsoft.com/office/drawing/2014/main" xmlns="" id="{4A64F9CF-5F7C-4696-B365-7394AED6AFCA}"/>
               </a:ext>
             </a:extLst>
           </p:cNvPr>
@@ -382,7 +382,7 @@
           <p:cNvPr id="3" name="直排文字版面配置區 2">
             <a:extLst>
               <a:ext uri="{FF2B5EF4-FFF2-40B4-BE49-F238E27FC236}">
-                <a16:creationId xmlns:a16="http://schemas.microsoft.com/office/drawing/2014/main" id="{3316FEBA-6CAF-4132-8334-C05F9E9EA9A2}"/>
+                <a16:creationId xmlns:a16="http://schemas.microsoft.com/office/drawing/2014/main" xmlns="" id="{3316FEBA-6CAF-4132-8334-C05F9E9EA9A2}"/>
               </a:ext>
             </a:extLst>
           </p:cNvPr>
@@ -439,7 +439,7 @@
           <p:cNvPr id="4" name="日期版面配置區 3">
             <a:extLst>
               <a:ext uri="{FF2B5EF4-FFF2-40B4-BE49-F238E27FC236}">
-                <a16:creationId xmlns:a16="http://schemas.microsoft.com/office/drawing/2014/main" id="{895271DF-6EFF-4037-A8BE-179C061EF3A0}"/>
+                <a16:creationId xmlns:a16="http://schemas.microsoft.com/office/drawing/2014/main" xmlns="" id="{895271DF-6EFF-4037-A8BE-179C061EF3A0}"/>
               </a:ext>
             </a:extLst>
           </p:cNvPr>
@@ -457,7 +457,7 @@
           <a:p>
             <a:fld id="{B89D0E2C-28B2-4FE5-AFE8-C384F27AF9B3}" type="datetimeFigureOut">
               <a:rPr lang="zh-TW" altLang="en-US" smtClean="0"/>
-              <a:t>2019/7/15</a:t>
+              <a:t>2019/8/10</a:t>
             </a:fld>
             <a:endParaRPr lang="zh-TW" altLang="en-US"/>
           </a:p>
@@ -468,7 +468,7 @@
           <p:cNvPr id="5" name="頁尾版面配置區 4">
             <a:extLst>
               <a:ext uri="{FF2B5EF4-FFF2-40B4-BE49-F238E27FC236}">
-                <a16:creationId xmlns:a16="http://schemas.microsoft.com/office/drawing/2014/main" id="{DACB8C74-0E76-4B67-9FCA-ECF5643168F8}"/>
+                <a16:creationId xmlns:a16="http://schemas.microsoft.com/office/drawing/2014/main" xmlns="" id="{DACB8C74-0E76-4B67-9FCA-ECF5643168F8}"/>
               </a:ext>
             </a:extLst>
           </p:cNvPr>
@@ -493,7 +493,7 @@
           <p:cNvPr id="6" name="投影片編號版面配置區 5">
             <a:extLst>
               <a:ext uri="{FF2B5EF4-FFF2-40B4-BE49-F238E27FC236}">
-                <a16:creationId xmlns:a16="http://schemas.microsoft.com/office/drawing/2014/main" id="{E610A6D2-DCA4-49E0-90E5-7B777A54E291}"/>
+                <a16:creationId xmlns:a16="http://schemas.microsoft.com/office/drawing/2014/main" xmlns="" id="{E610A6D2-DCA4-49E0-90E5-7B777A54E291}"/>
               </a:ext>
             </a:extLst>
           </p:cNvPr>
@@ -552,7 +552,7 @@
           <p:cNvPr id="2" name="直排標題 1">
             <a:extLst>
               <a:ext uri="{FF2B5EF4-FFF2-40B4-BE49-F238E27FC236}">
-                <a16:creationId xmlns:a16="http://schemas.microsoft.com/office/drawing/2014/main" id="{697E33A6-420B-4559-A136-C3F080F34AA8}"/>
+                <a16:creationId xmlns:a16="http://schemas.microsoft.com/office/drawing/2014/main" xmlns="" id="{697E33A6-420B-4559-A136-C3F080F34AA8}"/>
               </a:ext>
             </a:extLst>
           </p:cNvPr>
@@ -585,7 +585,7 @@
           <p:cNvPr id="3" name="直排文字版面配置區 2">
             <a:extLst>
               <a:ext uri="{FF2B5EF4-FFF2-40B4-BE49-F238E27FC236}">
-                <a16:creationId xmlns:a16="http://schemas.microsoft.com/office/drawing/2014/main" id="{827BD893-83E7-4546-AACE-9363AB044793}"/>
+                <a16:creationId xmlns:a16="http://schemas.microsoft.com/office/drawing/2014/main" xmlns="" id="{827BD893-83E7-4546-AACE-9363AB044793}"/>
               </a:ext>
             </a:extLst>
           </p:cNvPr>
@@ -647,7 +647,7 @@
           <p:cNvPr id="4" name="日期版面配置區 3">
             <a:extLst>
               <a:ext uri="{FF2B5EF4-FFF2-40B4-BE49-F238E27FC236}">
-                <a16:creationId xmlns:a16="http://schemas.microsoft.com/office/drawing/2014/main" id="{D30160C8-1C56-4E4C-A37C-ACD44AB39785}"/>
+                <a16:creationId xmlns:a16="http://schemas.microsoft.com/office/drawing/2014/main" xmlns="" id="{D30160C8-1C56-4E4C-A37C-ACD44AB39785}"/>
               </a:ext>
             </a:extLst>
           </p:cNvPr>
@@ -665,7 +665,7 @@
           <a:p>
             <a:fld id="{B89D0E2C-28B2-4FE5-AFE8-C384F27AF9B3}" type="datetimeFigureOut">
               <a:rPr lang="zh-TW" altLang="en-US" smtClean="0"/>
-              <a:t>2019/7/15</a:t>
+              <a:t>2019/8/10</a:t>
             </a:fld>
             <a:endParaRPr lang="zh-TW" altLang="en-US"/>
           </a:p>
@@ -676,7 +676,7 @@
           <p:cNvPr id="5" name="頁尾版面配置區 4">
             <a:extLst>
               <a:ext uri="{FF2B5EF4-FFF2-40B4-BE49-F238E27FC236}">
-                <a16:creationId xmlns:a16="http://schemas.microsoft.com/office/drawing/2014/main" id="{A7B49DE8-1F3D-4887-9558-560EB37B607B}"/>
+                <a16:creationId xmlns:a16="http://schemas.microsoft.com/office/drawing/2014/main" xmlns="" id="{A7B49DE8-1F3D-4887-9558-560EB37B607B}"/>
               </a:ext>
             </a:extLst>
           </p:cNvPr>
@@ -701,7 +701,7 @@
           <p:cNvPr id="6" name="投影片編號版面配置區 5">
             <a:extLst>
               <a:ext uri="{FF2B5EF4-FFF2-40B4-BE49-F238E27FC236}">
-                <a16:creationId xmlns:a16="http://schemas.microsoft.com/office/drawing/2014/main" id="{62BDAD08-B060-47FF-8B8A-5445A8FC44B8}"/>
+                <a16:creationId xmlns:a16="http://schemas.microsoft.com/office/drawing/2014/main" xmlns="" id="{62BDAD08-B060-47FF-8B8A-5445A8FC44B8}"/>
               </a:ext>
             </a:extLst>
           </p:cNvPr>
@@ -760,7 +760,7 @@
           <p:cNvPr id="2" name="標題 1">
             <a:extLst>
               <a:ext uri="{FF2B5EF4-FFF2-40B4-BE49-F238E27FC236}">
-                <a16:creationId xmlns:a16="http://schemas.microsoft.com/office/drawing/2014/main" id="{40408BEC-C8A5-4C9F-AB5E-50E88F6145BC}"/>
+                <a16:creationId xmlns:a16="http://schemas.microsoft.com/office/drawing/2014/main" xmlns="" id="{40408BEC-C8A5-4C9F-AB5E-50E88F6145BC}"/>
               </a:ext>
             </a:extLst>
           </p:cNvPr>
@@ -788,7 +788,7 @@
           <p:cNvPr id="3" name="內容版面配置區 2">
             <a:extLst>
               <a:ext uri="{FF2B5EF4-FFF2-40B4-BE49-F238E27FC236}">
-                <a16:creationId xmlns:a16="http://schemas.microsoft.com/office/drawing/2014/main" id="{1488C00B-FF7B-45DA-99DC-BDFC18219745}"/>
+                <a16:creationId xmlns:a16="http://schemas.microsoft.com/office/drawing/2014/main" xmlns="" id="{1488C00B-FF7B-45DA-99DC-BDFC18219745}"/>
               </a:ext>
             </a:extLst>
           </p:cNvPr>
@@ -845,7 +845,7 @@
           <p:cNvPr id="4" name="日期版面配置區 3">
             <a:extLst>
               <a:ext uri="{FF2B5EF4-FFF2-40B4-BE49-F238E27FC236}">
-                <a16:creationId xmlns:a16="http://schemas.microsoft.com/office/drawing/2014/main" id="{2C8EC046-8FB2-4EA9-95FE-2F436F29B5A7}"/>
+                <a16:creationId xmlns:a16="http://schemas.microsoft.com/office/drawing/2014/main" xmlns="" id="{2C8EC046-8FB2-4EA9-95FE-2F436F29B5A7}"/>
               </a:ext>
             </a:extLst>
           </p:cNvPr>
@@ -863,7 +863,7 @@
           <a:p>
             <a:fld id="{B89D0E2C-28B2-4FE5-AFE8-C384F27AF9B3}" type="datetimeFigureOut">
               <a:rPr lang="zh-TW" altLang="en-US" smtClean="0"/>
-              <a:t>2019/7/15</a:t>
+              <a:t>2019/8/10</a:t>
             </a:fld>
             <a:endParaRPr lang="zh-TW" altLang="en-US"/>
           </a:p>
@@ -874,7 +874,7 @@
           <p:cNvPr id="5" name="頁尾版面配置區 4">
             <a:extLst>
               <a:ext uri="{FF2B5EF4-FFF2-40B4-BE49-F238E27FC236}">
-                <a16:creationId xmlns:a16="http://schemas.microsoft.com/office/drawing/2014/main" id="{F5774A71-1DD8-4F1D-A472-02D95FD0381B}"/>
+                <a16:creationId xmlns:a16="http://schemas.microsoft.com/office/drawing/2014/main" xmlns="" id="{F5774A71-1DD8-4F1D-A472-02D95FD0381B}"/>
               </a:ext>
             </a:extLst>
           </p:cNvPr>
@@ -899,7 +899,7 @@
           <p:cNvPr id="6" name="投影片編號版面配置區 5">
             <a:extLst>
               <a:ext uri="{FF2B5EF4-FFF2-40B4-BE49-F238E27FC236}">
-                <a16:creationId xmlns:a16="http://schemas.microsoft.com/office/drawing/2014/main" id="{13241669-06C3-4029-BA28-6BE0AA2AE243}"/>
+                <a16:creationId xmlns:a16="http://schemas.microsoft.com/office/drawing/2014/main" xmlns="" id="{13241669-06C3-4029-BA28-6BE0AA2AE243}"/>
               </a:ext>
             </a:extLst>
           </p:cNvPr>
@@ -958,7 +958,7 @@
           <p:cNvPr id="2" name="標題 1">
             <a:extLst>
               <a:ext uri="{FF2B5EF4-FFF2-40B4-BE49-F238E27FC236}">
-                <a16:creationId xmlns:a16="http://schemas.microsoft.com/office/drawing/2014/main" id="{F6E97D57-C09C-4EAC-B49E-5E0FA0982764}"/>
+                <a16:creationId xmlns:a16="http://schemas.microsoft.com/office/drawing/2014/main" xmlns="" id="{F6E97D57-C09C-4EAC-B49E-5E0FA0982764}"/>
               </a:ext>
             </a:extLst>
           </p:cNvPr>
@@ -995,7 +995,7 @@
           <p:cNvPr id="3" name="文字版面配置區 2">
             <a:extLst>
               <a:ext uri="{FF2B5EF4-FFF2-40B4-BE49-F238E27FC236}">
-                <a16:creationId xmlns:a16="http://schemas.microsoft.com/office/drawing/2014/main" id="{0F1DB626-4391-4EB1-9348-23728C5F4871}"/>
+                <a16:creationId xmlns:a16="http://schemas.microsoft.com/office/drawing/2014/main" xmlns="" id="{0F1DB626-4391-4EB1-9348-23728C5F4871}"/>
               </a:ext>
             </a:extLst>
           </p:cNvPr>
@@ -1120,7 +1120,7 @@
           <p:cNvPr id="4" name="日期版面配置區 3">
             <a:extLst>
               <a:ext uri="{FF2B5EF4-FFF2-40B4-BE49-F238E27FC236}">
-                <a16:creationId xmlns:a16="http://schemas.microsoft.com/office/drawing/2014/main" id="{AB21693E-9FBA-42CF-A984-23B8F93F1236}"/>
+                <a16:creationId xmlns:a16="http://schemas.microsoft.com/office/drawing/2014/main" xmlns="" id="{AB21693E-9FBA-42CF-A984-23B8F93F1236}"/>
               </a:ext>
             </a:extLst>
           </p:cNvPr>
@@ -1138,7 +1138,7 @@
           <a:p>
             <a:fld id="{B89D0E2C-28B2-4FE5-AFE8-C384F27AF9B3}" type="datetimeFigureOut">
               <a:rPr lang="zh-TW" altLang="en-US" smtClean="0"/>
-              <a:t>2019/7/15</a:t>
+              <a:t>2019/8/10</a:t>
             </a:fld>
             <a:endParaRPr lang="zh-TW" altLang="en-US"/>
           </a:p>
@@ -1149,7 +1149,7 @@
           <p:cNvPr id="5" name="頁尾版面配置區 4">
             <a:extLst>
               <a:ext uri="{FF2B5EF4-FFF2-40B4-BE49-F238E27FC236}">
-                <a16:creationId xmlns:a16="http://schemas.microsoft.com/office/drawing/2014/main" id="{F3F81DD8-08ED-4BD4-8419-8D742ED71A45}"/>
+                <a16:creationId xmlns:a16="http://schemas.microsoft.com/office/drawing/2014/main" xmlns="" id="{F3F81DD8-08ED-4BD4-8419-8D742ED71A45}"/>
               </a:ext>
             </a:extLst>
           </p:cNvPr>
@@ -1174,7 +1174,7 @@
           <p:cNvPr id="6" name="投影片編號版面配置區 5">
             <a:extLst>
               <a:ext uri="{FF2B5EF4-FFF2-40B4-BE49-F238E27FC236}">
-                <a16:creationId xmlns:a16="http://schemas.microsoft.com/office/drawing/2014/main" id="{FEC9D02A-93FC-456F-B262-A75B7E38E643}"/>
+                <a16:creationId xmlns:a16="http://schemas.microsoft.com/office/drawing/2014/main" xmlns="" id="{FEC9D02A-93FC-456F-B262-A75B7E38E643}"/>
               </a:ext>
             </a:extLst>
           </p:cNvPr>
@@ -1233,7 +1233,7 @@
           <p:cNvPr id="2" name="標題 1">
             <a:extLst>
               <a:ext uri="{FF2B5EF4-FFF2-40B4-BE49-F238E27FC236}">
-                <a16:creationId xmlns:a16="http://schemas.microsoft.com/office/drawing/2014/main" id="{67253480-D141-42E5-92D9-E0FFB6A79F85}"/>
+                <a16:creationId xmlns:a16="http://schemas.microsoft.com/office/drawing/2014/main" xmlns="" id="{67253480-D141-42E5-92D9-E0FFB6A79F85}"/>
               </a:ext>
             </a:extLst>
           </p:cNvPr>
@@ -1261,7 +1261,7 @@
           <p:cNvPr id="3" name="內容版面配置區 2">
             <a:extLst>
               <a:ext uri="{FF2B5EF4-FFF2-40B4-BE49-F238E27FC236}">
-                <a16:creationId xmlns:a16="http://schemas.microsoft.com/office/drawing/2014/main" id="{B0E05BFD-60A1-4CFB-9D54-3F80F17B2C9D}"/>
+                <a16:creationId xmlns:a16="http://schemas.microsoft.com/office/drawing/2014/main" xmlns="" id="{B0E05BFD-60A1-4CFB-9D54-3F80F17B2C9D}"/>
               </a:ext>
             </a:extLst>
           </p:cNvPr>
@@ -1323,7 +1323,7 @@
           <p:cNvPr id="4" name="內容版面配置區 3">
             <a:extLst>
               <a:ext uri="{FF2B5EF4-FFF2-40B4-BE49-F238E27FC236}">
-                <a16:creationId xmlns:a16="http://schemas.microsoft.com/office/drawing/2014/main" id="{EAE75711-D639-4C0F-96E6-7AE2917EF184}"/>
+                <a16:creationId xmlns:a16="http://schemas.microsoft.com/office/drawing/2014/main" xmlns="" id="{EAE75711-D639-4C0F-96E6-7AE2917EF184}"/>
               </a:ext>
             </a:extLst>
           </p:cNvPr>
@@ -1385,7 +1385,7 @@
           <p:cNvPr id="5" name="日期版面配置區 4">
             <a:extLst>
               <a:ext uri="{FF2B5EF4-FFF2-40B4-BE49-F238E27FC236}">
-                <a16:creationId xmlns:a16="http://schemas.microsoft.com/office/drawing/2014/main" id="{E7DBB00E-F367-45EA-9065-A93E3FD00916}"/>
+                <a16:creationId xmlns:a16="http://schemas.microsoft.com/office/drawing/2014/main" xmlns="" id="{E7DBB00E-F367-45EA-9065-A93E3FD00916}"/>
               </a:ext>
             </a:extLst>
           </p:cNvPr>
@@ -1403,7 +1403,7 @@
           <a:p>
             <a:fld id="{B89D0E2C-28B2-4FE5-AFE8-C384F27AF9B3}" type="datetimeFigureOut">
               <a:rPr lang="zh-TW" altLang="en-US" smtClean="0"/>
-              <a:t>2019/7/15</a:t>
+              <a:t>2019/8/10</a:t>
             </a:fld>
             <a:endParaRPr lang="zh-TW" altLang="en-US"/>
           </a:p>
@@ -1414,7 +1414,7 @@
           <p:cNvPr id="6" name="頁尾版面配置區 5">
             <a:extLst>
               <a:ext uri="{FF2B5EF4-FFF2-40B4-BE49-F238E27FC236}">
-                <a16:creationId xmlns:a16="http://schemas.microsoft.com/office/drawing/2014/main" id="{E92A5A13-369E-40E4-A601-4DB38C22D9AD}"/>
+                <a16:creationId xmlns:a16="http://schemas.microsoft.com/office/drawing/2014/main" xmlns="" id="{E92A5A13-369E-40E4-A601-4DB38C22D9AD}"/>
               </a:ext>
             </a:extLst>
           </p:cNvPr>
@@ -1439,7 +1439,7 @@
           <p:cNvPr id="7" name="投影片編號版面配置區 6">
             <a:extLst>
               <a:ext uri="{FF2B5EF4-FFF2-40B4-BE49-F238E27FC236}">
-                <a16:creationId xmlns:a16="http://schemas.microsoft.com/office/drawing/2014/main" id="{F0F661DD-2384-4CBF-A1AB-AE356F75AA2A}"/>
+                <a16:creationId xmlns:a16="http://schemas.microsoft.com/office/drawing/2014/main" xmlns="" id="{F0F661DD-2384-4CBF-A1AB-AE356F75AA2A}"/>
               </a:ext>
             </a:extLst>
           </p:cNvPr>
@@ -1498,7 +1498,7 @@
           <p:cNvPr id="2" name="標題 1">
             <a:extLst>
               <a:ext uri="{FF2B5EF4-FFF2-40B4-BE49-F238E27FC236}">
-                <a16:creationId xmlns:a16="http://schemas.microsoft.com/office/drawing/2014/main" id="{7239A9B2-02C9-483B-9188-848F7A0CEE4F}"/>
+                <a16:creationId xmlns:a16="http://schemas.microsoft.com/office/drawing/2014/main" xmlns="" id="{7239A9B2-02C9-483B-9188-848F7A0CEE4F}"/>
               </a:ext>
             </a:extLst>
           </p:cNvPr>
@@ -1531,7 +1531,7 @@
           <p:cNvPr id="3" name="文字版面配置區 2">
             <a:extLst>
               <a:ext uri="{FF2B5EF4-FFF2-40B4-BE49-F238E27FC236}">
-                <a16:creationId xmlns:a16="http://schemas.microsoft.com/office/drawing/2014/main" id="{836EAF21-8AF1-4F14-9175-BBD03EBADE5F}"/>
+                <a16:creationId xmlns:a16="http://schemas.microsoft.com/office/drawing/2014/main" xmlns="" id="{836EAF21-8AF1-4F14-9175-BBD03EBADE5F}"/>
               </a:ext>
             </a:extLst>
           </p:cNvPr>
@@ -1602,7 +1602,7 @@
           <p:cNvPr id="4" name="內容版面配置區 3">
             <a:extLst>
               <a:ext uri="{FF2B5EF4-FFF2-40B4-BE49-F238E27FC236}">
-                <a16:creationId xmlns:a16="http://schemas.microsoft.com/office/drawing/2014/main" id="{07829071-2A11-4789-97A2-767B2CAA27E5}"/>
+                <a16:creationId xmlns:a16="http://schemas.microsoft.com/office/drawing/2014/main" xmlns="" id="{07829071-2A11-4789-97A2-767B2CAA27E5}"/>
               </a:ext>
             </a:extLst>
           </p:cNvPr>
@@ -1664,7 +1664,7 @@
           <p:cNvPr id="5" name="文字版面配置區 4">
             <a:extLst>
               <a:ext uri="{FF2B5EF4-FFF2-40B4-BE49-F238E27FC236}">
-                <a16:creationId xmlns:a16="http://schemas.microsoft.com/office/drawing/2014/main" id="{E6DA7494-7A92-4DA1-8CBB-642128311403}"/>
+                <a16:creationId xmlns:a16="http://schemas.microsoft.com/office/drawing/2014/main" xmlns="" id="{E6DA7494-7A92-4DA1-8CBB-642128311403}"/>
               </a:ext>
             </a:extLst>
           </p:cNvPr>
@@ -1735,7 +1735,7 @@
           <p:cNvPr id="6" name="內容版面配置區 5">
             <a:extLst>
               <a:ext uri="{FF2B5EF4-FFF2-40B4-BE49-F238E27FC236}">
-                <a16:creationId xmlns:a16="http://schemas.microsoft.com/office/drawing/2014/main" id="{E60C341C-188E-48A9-8AF8-9DA3BFB85BCF}"/>
+                <a16:creationId xmlns:a16="http://schemas.microsoft.com/office/drawing/2014/main" xmlns="" id="{E60C341C-188E-48A9-8AF8-9DA3BFB85BCF}"/>
               </a:ext>
             </a:extLst>
           </p:cNvPr>
@@ -1797,7 +1797,7 @@
           <p:cNvPr id="7" name="日期版面配置區 6">
             <a:extLst>
               <a:ext uri="{FF2B5EF4-FFF2-40B4-BE49-F238E27FC236}">
-                <a16:creationId xmlns:a16="http://schemas.microsoft.com/office/drawing/2014/main" id="{619A99C9-3AA0-488D-8C81-FEBAA22DABEB}"/>
+                <a16:creationId xmlns:a16="http://schemas.microsoft.com/office/drawing/2014/main" xmlns="" id="{619A99C9-3AA0-488D-8C81-FEBAA22DABEB}"/>
               </a:ext>
             </a:extLst>
           </p:cNvPr>
@@ -1815,7 +1815,7 @@
           <a:p>
             <a:fld id="{B89D0E2C-28B2-4FE5-AFE8-C384F27AF9B3}" type="datetimeFigureOut">
               <a:rPr lang="zh-TW" altLang="en-US" smtClean="0"/>
-              <a:t>2019/7/15</a:t>
+              <a:t>2019/8/10</a:t>
             </a:fld>
             <a:endParaRPr lang="zh-TW" altLang="en-US"/>
           </a:p>
@@ -1826,7 +1826,7 @@
           <p:cNvPr id="8" name="頁尾版面配置區 7">
             <a:extLst>
               <a:ext uri="{FF2B5EF4-FFF2-40B4-BE49-F238E27FC236}">
-                <a16:creationId xmlns:a16="http://schemas.microsoft.com/office/drawing/2014/main" id="{67A8C58F-1149-4BFF-95CB-34BDDDA6F7E6}"/>
+                <a16:creationId xmlns:a16="http://schemas.microsoft.com/office/drawing/2014/main" xmlns="" id="{67A8C58F-1149-4BFF-95CB-34BDDDA6F7E6}"/>
               </a:ext>
             </a:extLst>
           </p:cNvPr>
@@ -1851,7 +1851,7 @@
           <p:cNvPr id="9" name="投影片編號版面配置區 8">
             <a:extLst>
               <a:ext uri="{FF2B5EF4-FFF2-40B4-BE49-F238E27FC236}">
-                <a16:creationId xmlns:a16="http://schemas.microsoft.com/office/drawing/2014/main" id="{44A4C613-B2AB-45FA-B1E5-4AA36DDC03CC}"/>
+                <a16:creationId xmlns:a16="http://schemas.microsoft.com/office/drawing/2014/main" xmlns="" id="{44A4C613-B2AB-45FA-B1E5-4AA36DDC03CC}"/>
               </a:ext>
             </a:extLst>
           </p:cNvPr>
@@ -1910,7 +1910,7 @@
           <p:cNvPr id="2" name="標題 1">
             <a:extLst>
               <a:ext uri="{FF2B5EF4-FFF2-40B4-BE49-F238E27FC236}">
-                <a16:creationId xmlns:a16="http://schemas.microsoft.com/office/drawing/2014/main" id="{405D467A-90BC-4A1A-8629-48F2C75AEC3F}"/>
+                <a16:creationId xmlns:a16="http://schemas.microsoft.com/office/drawing/2014/main" xmlns="" id="{405D467A-90BC-4A1A-8629-48F2C75AEC3F}"/>
               </a:ext>
             </a:extLst>
           </p:cNvPr>
@@ -1938,7 +1938,7 @@
           <p:cNvPr id="3" name="日期版面配置區 2">
             <a:extLst>
               <a:ext uri="{FF2B5EF4-FFF2-40B4-BE49-F238E27FC236}">
-                <a16:creationId xmlns:a16="http://schemas.microsoft.com/office/drawing/2014/main" id="{73C34F2A-0B59-4B68-8A23-00B875A4D4F6}"/>
+                <a16:creationId xmlns:a16="http://schemas.microsoft.com/office/drawing/2014/main" xmlns="" id="{73C34F2A-0B59-4B68-8A23-00B875A4D4F6}"/>
               </a:ext>
             </a:extLst>
           </p:cNvPr>
@@ -1956,7 +1956,7 @@
           <a:p>
             <a:fld id="{B89D0E2C-28B2-4FE5-AFE8-C384F27AF9B3}" type="datetimeFigureOut">
               <a:rPr lang="zh-TW" altLang="en-US" smtClean="0"/>
-              <a:t>2019/7/15</a:t>
+              <a:t>2019/8/10</a:t>
             </a:fld>
             <a:endParaRPr lang="zh-TW" altLang="en-US"/>
           </a:p>
@@ -1967,7 +1967,7 @@
           <p:cNvPr id="4" name="頁尾版面配置區 3">
             <a:extLst>
               <a:ext uri="{FF2B5EF4-FFF2-40B4-BE49-F238E27FC236}">
-                <a16:creationId xmlns:a16="http://schemas.microsoft.com/office/drawing/2014/main" id="{0F8F4CF6-674E-40BF-804E-3F11BB198EE3}"/>
+                <a16:creationId xmlns:a16="http://schemas.microsoft.com/office/drawing/2014/main" xmlns="" id="{0F8F4CF6-674E-40BF-804E-3F11BB198EE3}"/>
               </a:ext>
             </a:extLst>
           </p:cNvPr>
@@ -1992,7 +1992,7 @@
           <p:cNvPr id="5" name="投影片編號版面配置區 4">
             <a:extLst>
               <a:ext uri="{FF2B5EF4-FFF2-40B4-BE49-F238E27FC236}">
-                <a16:creationId xmlns:a16="http://schemas.microsoft.com/office/drawing/2014/main" id="{6F131451-0FAA-4EFD-ABF3-7F9BFD04D7EB}"/>
+                <a16:creationId xmlns:a16="http://schemas.microsoft.com/office/drawing/2014/main" xmlns="" id="{6F131451-0FAA-4EFD-ABF3-7F9BFD04D7EB}"/>
               </a:ext>
             </a:extLst>
           </p:cNvPr>
@@ -2051,7 +2051,7 @@
           <p:cNvPr id="2" name="日期版面配置區 1">
             <a:extLst>
               <a:ext uri="{FF2B5EF4-FFF2-40B4-BE49-F238E27FC236}">
-                <a16:creationId xmlns:a16="http://schemas.microsoft.com/office/drawing/2014/main" id="{2EB2E748-0F44-411C-8645-8F8296BC8C59}"/>
+                <a16:creationId xmlns:a16="http://schemas.microsoft.com/office/drawing/2014/main" xmlns="" id="{2EB2E748-0F44-411C-8645-8F8296BC8C59}"/>
               </a:ext>
             </a:extLst>
           </p:cNvPr>
@@ -2069,7 +2069,7 @@
           <a:p>
             <a:fld id="{B89D0E2C-28B2-4FE5-AFE8-C384F27AF9B3}" type="datetimeFigureOut">
               <a:rPr lang="zh-TW" altLang="en-US" smtClean="0"/>
-              <a:t>2019/7/15</a:t>
+              <a:t>2019/8/10</a:t>
             </a:fld>
             <a:endParaRPr lang="zh-TW" altLang="en-US"/>
           </a:p>
@@ -2080,7 +2080,7 @@
           <p:cNvPr id="3" name="頁尾版面配置區 2">
             <a:extLst>
               <a:ext uri="{FF2B5EF4-FFF2-40B4-BE49-F238E27FC236}">
-                <a16:creationId xmlns:a16="http://schemas.microsoft.com/office/drawing/2014/main" id="{77A76D3D-E273-46B1-8AEC-2437D6380ABB}"/>
+                <a16:creationId xmlns:a16="http://schemas.microsoft.com/office/drawing/2014/main" xmlns="" id="{77A76D3D-E273-46B1-8AEC-2437D6380ABB}"/>
               </a:ext>
             </a:extLst>
           </p:cNvPr>
@@ -2105,7 +2105,7 @@
           <p:cNvPr id="4" name="投影片編號版面配置區 3">
             <a:extLst>
               <a:ext uri="{FF2B5EF4-FFF2-40B4-BE49-F238E27FC236}">
-                <a16:creationId xmlns:a16="http://schemas.microsoft.com/office/drawing/2014/main" id="{58B96B31-4457-45B5-B0FE-956BB408B3A3}"/>
+                <a16:creationId xmlns:a16="http://schemas.microsoft.com/office/drawing/2014/main" xmlns="" id="{58B96B31-4457-45B5-B0FE-956BB408B3A3}"/>
               </a:ext>
             </a:extLst>
           </p:cNvPr>
@@ -2164,7 +2164,7 @@
           <p:cNvPr id="2" name="標題 1">
             <a:extLst>
               <a:ext uri="{FF2B5EF4-FFF2-40B4-BE49-F238E27FC236}">
-                <a16:creationId xmlns:a16="http://schemas.microsoft.com/office/drawing/2014/main" id="{4E93977A-DD97-43AA-941D-4B77D2AC0FB4}"/>
+                <a16:creationId xmlns:a16="http://schemas.microsoft.com/office/drawing/2014/main" xmlns="" id="{4E93977A-DD97-43AA-941D-4B77D2AC0FB4}"/>
               </a:ext>
             </a:extLst>
           </p:cNvPr>
@@ -2201,7 +2201,7 @@
           <p:cNvPr id="3" name="內容版面配置區 2">
             <a:extLst>
               <a:ext uri="{FF2B5EF4-FFF2-40B4-BE49-F238E27FC236}">
-                <a16:creationId xmlns:a16="http://schemas.microsoft.com/office/drawing/2014/main" id="{0885AB7E-A6CC-449A-9D93-5AF4CE2A16C8}"/>
+                <a16:creationId xmlns:a16="http://schemas.microsoft.com/office/drawing/2014/main" xmlns="" id="{0885AB7E-A6CC-449A-9D93-5AF4CE2A16C8}"/>
               </a:ext>
             </a:extLst>
           </p:cNvPr>
@@ -2291,7 +2291,7 @@
           <p:cNvPr id="4" name="文字版面配置區 3">
             <a:extLst>
               <a:ext uri="{FF2B5EF4-FFF2-40B4-BE49-F238E27FC236}">
-                <a16:creationId xmlns:a16="http://schemas.microsoft.com/office/drawing/2014/main" id="{4BAD7186-4915-4E2B-9F6F-292D6156FFAD}"/>
+                <a16:creationId xmlns:a16="http://schemas.microsoft.com/office/drawing/2014/main" xmlns="" id="{4BAD7186-4915-4E2B-9F6F-292D6156FFAD}"/>
               </a:ext>
             </a:extLst>
           </p:cNvPr>
@@ -2362,7 +2362,7 @@
           <p:cNvPr id="5" name="日期版面配置區 4">
             <a:extLst>
               <a:ext uri="{FF2B5EF4-FFF2-40B4-BE49-F238E27FC236}">
-                <a16:creationId xmlns:a16="http://schemas.microsoft.com/office/drawing/2014/main" id="{378EF6EC-17A2-4F77-B669-4C272F382A90}"/>
+                <a16:creationId xmlns:a16="http://schemas.microsoft.com/office/drawing/2014/main" xmlns="" id="{378EF6EC-17A2-4F77-B669-4C272F382A90}"/>
               </a:ext>
             </a:extLst>
           </p:cNvPr>
@@ -2380,7 +2380,7 @@
           <a:p>
             <a:fld id="{B89D0E2C-28B2-4FE5-AFE8-C384F27AF9B3}" type="datetimeFigureOut">
               <a:rPr lang="zh-TW" altLang="en-US" smtClean="0"/>
-              <a:t>2019/7/15</a:t>
+              <a:t>2019/8/10</a:t>
             </a:fld>
             <a:endParaRPr lang="zh-TW" altLang="en-US"/>
           </a:p>
@@ -2391,7 +2391,7 @@
           <p:cNvPr id="6" name="頁尾版面配置區 5">
             <a:extLst>
               <a:ext uri="{FF2B5EF4-FFF2-40B4-BE49-F238E27FC236}">
-                <a16:creationId xmlns:a16="http://schemas.microsoft.com/office/drawing/2014/main" id="{5942D683-9541-4227-8F67-36790DDF1328}"/>
+                <a16:creationId xmlns:a16="http://schemas.microsoft.com/office/drawing/2014/main" xmlns="" id="{5942D683-9541-4227-8F67-36790DDF1328}"/>
               </a:ext>
             </a:extLst>
           </p:cNvPr>
@@ -2416,7 +2416,7 @@
           <p:cNvPr id="7" name="投影片編號版面配置區 6">
             <a:extLst>
               <a:ext uri="{FF2B5EF4-FFF2-40B4-BE49-F238E27FC236}">
-                <a16:creationId xmlns:a16="http://schemas.microsoft.com/office/drawing/2014/main" id="{956084A5-6853-4FDF-A1C2-B9B53E8039B9}"/>
+                <a16:creationId xmlns:a16="http://schemas.microsoft.com/office/drawing/2014/main" xmlns="" id="{956084A5-6853-4FDF-A1C2-B9B53E8039B9}"/>
               </a:ext>
             </a:extLst>
           </p:cNvPr>
@@ -2475,7 +2475,7 @@
           <p:cNvPr id="2" name="標題 1">
             <a:extLst>
               <a:ext uri="{FF2B5EF4-FFF2-40B4-BE49-F238E27FC236}">
-                <a16:creationId xmlns:a16="http://schemas.microsoft.com/office/drawing/2014/main" id="{3B91DC65-EE7C-4991-A767-FD631B03D50F}"/>
+                <a16:creationId xmlns:a16="http://schemas.microsoft.com/office/drawing/2014/main" xmlns="" id="{3B91DC65-EE7C-4991-A767-FD631B03D50F}"/>
               </a:ext>
             </a:extLst>
           </p:cNvPr>
@@ -2512,7 +2512,7 @@
           <p:cNvPr id="3" name="圖片版面配置區 2">
             <a:extLst>
               <a:ext uri="{FF2B5EF4-FFF2-40B4-BE49-F238E27FC236}">
-                <a16:creationId xmlns:a16="http://schemas.microsoft.com/office/drawing/2014/main" id="{284EC244-2E1F-4EC5-A127-399C66968BC0}"/>
+                <a16:creationId xmlns:a16="http://schemas.microsoft.com/office/drawing/2014/main" xmlns="" id="{284EC244-2E1F-4EC5-A127-399C66968BC0}"/>
               </a:ext>
             </a:extLst>
           </p:cNvPr>
@@ -2579,7 +2579,7 @@
           <p:cNvPr id="4" name="文字版面配置區 3">
             <a:extLst>
               <a:ext uri="{FF2B5EF4-FFF2-40B4-BE49-F238E27FC236}">
-                <a16:creationId xmlns:a16="http://schemas.microsoft.com/office/drawing/2014/main" id="{73657D2C-30BC-46D6-AFA9-56E918E3D97C}"/>
+                <a16:creationId xmlns:a16="http://schemas.microsoft.com/office/drawing/2014/main" xmlns="" id="{73657D2C-30BC-46D6-AFA9-56E918E3D97C}"/>
               </a:ext>
             </a:extLst>
           </p:cNvPr>
@@ -2650,7 +2650,7 @@
           <p:cNvPr id="5" name="日期版面配置區 4">
             <a:extLst>
               <a:ext uri="{FF2B5EF4-FFF2-40B4-BE49-F238E27FC236}">
-                <a16:creationId xmlns:a16="http://schemas.microsoft.com/office/drawing/2014/main" id="{8F3C2AED-6466-40C3-AAD0-ABA4565E72C3}"/>
+                <a16:creationId xmlns:a16="http://schemas.microsoft.com/office/drawing/2014/main" xmlns="" id="{8F3C2AED-6466-40C3-AAD0-ABA4565E72C3}"/>
               </a:ext>
             </a:extLst>
           </p:cNvPr>
@@ -2668,7 +2668,7 @@
           <a:p>
             <a:fld id="{B89D0E2C-28B2-4FE5-AFE8-C384F27AF9B3}" type="datetimeFigureOut">
               <a:rPr lang="zh-TW" altLang="en-US" smtClean="0"/>
-              <a:t>2019/7/15</a:t>
+              <a:t>2019/8/10</a:t>
             </a:fld>
             <a:endParaRPr lang="zh-TW" altLang="en-US"/>
           </a:p>
@@ -2679,7 +2679,7 @@
           <p:cNvPr id="6" name="頁尾版面配置區 5">
             <a:extLst>
               <a:ext uri="{FF2B5EF4-FFF2-40B4-BE49-F238E27FC236}">
-                <a16:creationId xmlns:a16="http://schemas.microsoft.com/office/drawing/2014/main" id="{B9E166F8-8A0F-40C6-ABEE-94E42B021833}"/>
+                <a16:creationId xmlns:a16="http://schemas.microsoft.com/office/drawing/2014/main" xmlns="" id="{B9E166F8-8A0F-40C6-ABEE-94E42B021833}"/>
               </a:ext>
             </a:extLst>
           </p:cNvPr>
@@ -2704,7 +2704,7 @@
           <p:cNvPr id="7" name="投影片編號版面配置區 6">
             <a:extLst>
               <a:ext uri="{FF2B5EF4-FFF2-40B4-BE49-F238E27FC236}">
-                <a16:creationId xmlns:a16="http://schemas.microsoft.com/office/drawing/2014/main" id="{AE87B306-D995-4661-85F7-7EBE0C45FD13}"/>
+                <a16:creationId xmlns:a16="http://schemas.microsoft.com/office/drawing/2014/main" xmlns="" id="{AE87B306-D995-4661-85F7-7EBE0C45FD13}"/>
               </a:ext>
             </a:extLst>
           </p:cNvPr>
@@ -2768,7 +2768,7 @@
           <p:cNvPr id="2" name="標題版面配置區 1">
             <a:extLst>
               <a:ext uri="{FF2B5EF4-FFF2-40B4-BE49-F238E27FC236}">
-                <a16:creationId xmlns:a16="http://schemas.microsoft.com/office/drawing/2014/main" id="{37F60A5C-9EE1-40C1-9E1F-2B8EE829DA9A}"/>
+                <a16:creationId xmlns:a16="http://schemas.microsoft.com/office/drawing/2014/main" xmlns="" id="{37F60A5C-9EE1-40C1-9E1F-2B8EE829DA9A}"/>
               </a:ext>
             </a:extLst>
           </p:cNvPr>
@@ -2806,7 +2806,7 @@
           <p:cNvPr id="3" name="文字版面配置區 2">
             <a:extLst>
               <a:ext uri="{FF2B5EF4-FFF2-40B4-BE49-F238E27FC236}">
-                <a16:creationId xmlns:a16="http://schemas.microsoft.com/office/drawing/2014/main" id="{CA88352C-234C-48D4-A2A3-F43024F12E6F}"/>
+                <a16:creationId xmlns:a16="http://schemas.microsoft.com/office/drawing/2014/main" xmlns="" id="{CA88352C-234C-48D4-A2A3-F43024F12E6F}"/>
               </a:ext>
             </a:extLst>
           </p:cNvPr>
@@ -2873,7 +2873,7 @@
           <p:cNvPr id="4" name="日期版面配置區 3">
             <a:extLst>
               <a:ext uri="{FF2B5EF4-FFF2-40B4-BE49-F238E27FC236}">
-                <a16:creationId xmlns:a16="http://schemas.microsoft.com/office/drawing/2014/main" id="{BF0C46DC-618E-4608-A36B-E1215CB36E1C}"/>
+                <a16:creationId xmlns:a16="http://schemas.microsoft.com/office/drawing/2014/main" xmlns="" id="{BF0C46DC-618E-4608-A36B-E1215CB36E1C}"/>
               </a:ext>
             </a:extLst>
           </p:cNvPr>
@@ -2909,7 +2909,7 @@
           <a:p>
             <a:fld id="{B89D0E2C-28B2-4FE5-AFE8-C384F27AF9B3}" type="datetimeFigureOut">
               <a:rPr lang="zh-TW" altLang="en-US" smtClean="0"/>
-              <a:t>2019/7/15</a:t>
+              <a:t>2019/8/10</a:t>
             </a:fld>
             <a:endParaRPr lang="zh-TW" altLang="en-US"/>
           </a:p>
@@ -2920,7 +2920,7 @@
           <p:cNvPr id="5" name="頁尾版面配置區 4">
             <a:extLst>
               <a:ext uri="{FF2B5EF4-FFF2-40B4-BE49-F238E27FC236}">
-                <a16:creationId xmlns:a16="http://schemas.microsoft.com/office/drawing/2014/main" id="{56527769-65A1-4DC6-BA0C-5BDE43BD030C}"/>
+                <a16:creationId xmlns:a16="http://schemas.microsoft.com/office/drawing/2014/main" xmlns="" id="{56527769-65A1-4DC6-BA0C-5BDE43BD030C}"/>
               </a:ext>
             </a:extLst>
           </p:cNvPr>
@@ -2963,7 +2963,7 @@
           <p:cNvPr id="6" name="投影片編號版面配置區 5">
             <a:extLst>
               <a:ext uri="{FF2B5EF4-FFF2-40B4-BE49-F238E27FC236}">
-                <a16:creationId xmlns:a16="http://schemas.microsoft.com/office/drawing/2014/main" id="{38F4FA4D-274A-4F3A-A611-F44CDAD6C5EB}"/>
+                <a16:creationId xmlns:a16="http://schemas.microsoft.com/office/drawing/2014/main" xmlns="" id="{38F4FA4D-274A-4F3A-A611-F44CDAD6C5EB}"/>
               </a:ext>
             </a:extLst>
           </p:cNvPr>
@@ -3328,10 +3328,10 @@
       </p:grpSpPr>
       <p:grpSp>
         <p:nvGrpSpPr>
-          <p:cNvPr id="22" name="群組 21">
+          <p:cNvPr id="53" name="群組 52">
             <a:extLst>
               <a:ext uri="{FF2B5EF4-FFF2-40B4-BE49-F238E27FC236}">
-                <a16:creationId xmlns:a16="http://schemas.microsoft.com/office/drawing/2014/main" id="{677AD761-E075-4096-9A7A-93B7989C7AA3}"/>
+                <a16:creationId xmlns:a16="http://schemas.microsoft.com/office/drawing/2014/main" xmlns="" id="{3F9229ED-E6CA-4C68-9E82-33D5CE399050}"/>
               </a:ext>
             </a:extLst>
           </p:cNvPr>
@@ -3340,817 +3340,10 @@
         </p:nvGrpSpPr>
         <p:grpSpPr>
           <a:xfrm>
-            <a:off x="0" y="99054"/>
-            <a:ext cx="5803900" cy="2769235"/>
-            <a:chOff x="-40581" y="-138538"/>
-            <a:chExt cx="5803914" cy="2769235"/>
-          </a:xfrm>
-        </p:grpSpPr>
-        <p:sp>
-          <p:nvSpPr>
-            <p:cNvPr id="23" name="矩形 22">
-              <a:extLst>
-                <a:ext uri="{FF2B5EF4-FFF2-40B4-BE49-F238E27FC236}">
-                  <a16:creationId xmlns:a16="http://schemas.microsoft.com/office/drawing/2014/main" id="{1CD22B56-A701-46FD-8B8F-E879DE675A1A}"/>
-                </a:ext>
-              </a:extLst>
-            </p:cNvPr>
-            <p:cNvSpPr/>
-            <p:nvPr/>
-          </p:nvSpPr>
-          <p:spPr>
-            <a:xfrm>
-              <a:off x="-13" y="-124884"/>
-              <a:ext cx="2881717" cy="2755303"/>
-            </a:xfrm>
-            <a:prstGeom prst="rect">
-              <a:avLst/>
-            </a:prstGeom>
-            <a:noFill/>
-            <a:ln w="38100">
-              <a:solidFill>
-                <a:schemeClr val="tx1"/>
-              </a:solidFill>
-            </a:ln>
-          </p:spPr>
-          <p:style>
-            <a:lnRef idx="2">
-              <a:schemeClr val="accent1">
-                <a:shade val="50000"/>
-              </a:schemeClr>
-            </a:lnRef>
-            <a:fillRef idx="1">
-              <a:schemeClr val="accent1"/>
-            </a:fillRef>
-            <a:effectRef idx="0">
-              <a:schemeClr val="accent1"/>
-            </a:effectRef>
-            <a:fontRef idx="minor">
-              <a:schemeClr val="lt1"/>
-            </a:fontRef>
-          </p:style>
-          <p:txBody>
-            <a:bodyPr rot="0" spcFirstLastPara="0" vert="horz" wrap="square" lIns="91440" tIns="45720" rIns="91440" bIns="45720" numCol="1" spcCol="0" rtlCol="0" fromWordArt="0" anchor="ctr" anchorCtr="0" forceAA="0" compatLnSpc="1">
-              <a:prstTxWarp prst="textNoShape">
-                <a:avLst/>
-              </a:prstTxWarp>
-              <a:noAutofit/>
-            </a:bodyPr>
-            <a:lstStyle/>
-            <a:p>
-              <a:endParaRPr lang="zh-TW" altLang="en-US"/>
-            </a:p>
-          </p:txBody>
-        </p:sp>
-        <p:sp>
-          <p:nvSpPr>
-            <p:cNvPr id="24" name="矩形 23">
-              <a:extLst>
-                <a:ext uri="{FF2B5EF4-FFF2-40B4-BE49-F238E27FC236}">
-                  <a16:creationId xmlns:a16="http://schemas.microsoft.com/office/drawing/2014/main" id="{C655E111-7F70-481E-98E9-3C70B39E015F}"/>
-                </a:ext>
-              </a:extLst>
-            </p:cNvPr>
-            <p:cNvSpPr/>
-            <p:nvPr/>
-          </p:nvSpPr>
-          <p:spPr>
-            <a:xfrm>
-              <a:off x="2881616" y="-124886"/>
-              <a:ext cx="2881717" cy="2755583"/>
-            </a:xfrm>
-            <a:prstGeom prst="rect">
-              <a:avLst/>
-            </a:prstGeom>
-            <a:noFill/>
-            <a:ln w="38100">
-              <a:solidFill>
-                <a:schemeClr val="tx1"/>
-              </a:solidFill>
-            </a:ln>
-          </p:spPr>
-          <p:style>
-            <a:lnRef idx="2">
-              <a:schemeClr val="accent1">
-                <a:shade val="50000"/>
-              </a:schemeClr>
-            </a:lnRef>
-            <a:fillRef idx="1">
-              <a:schemeClr val="accent1"/>
-            </a:fillRef>
-            <a:effectRef idx="0">
-              <a:schemeClr val="accent1"/>
-            </a:effectRef>
-            <a:fontRef idx="minor">
-              <a:schemeClr val="lt1"/>
-            </a:fontRef>
-          </p:style>
-          <p:txBody>
-            <a:bodyPr rot="0" spcFirstLastPara="0" vert="horz" wrap="square" lIns="91440" tIns="45720" rIns="91440" bIns="45720" numCol="1" spcCol="0" rtlCol="0" fromWordArt="0" anchor="ctr" anchorCtr="0" forceAA="0" compatLnSpc="1">
-              <a:prstTxWarp prst="textNoShape">
-                <a:avLst/>
-              </a:prstTxWarp>
-              <a:noAutofit/>
-            </a:bodyPr>
-            <a:lstStyle/>
-            <a:p>
-              <a:endParaRPr lang="zh-TW" altLang="en-US"/>
-            </a:p>
-          </p:txBody>
-        </p:sp>
-        <p:sp>
-          <p:nvSpPr>
-            <p:cNvPr id="25" name="文字方塊 35">
-              <a:extLst>
-                <a:ext uri="{FF2B5EF4-FFF2-40B4-BE49-F238E27FC236}">
-                  <a16:creationId xmlns:a16="http://schemas.microsoft.com/office/drawing/2014/main" id="{D5E20F62-7539-4C18-9DAE-556FFB155982}"/>
-                </a:ext>
-              </a:extLst>
-            </p:cNvPr>
-            <p:cNvSpPr txBox="1"/>
-            <p:nvPr/>
-          </p:nvSpPr>
-          <p:spPr>
-            <a:xfrm>
-              <a:off x="-40581" y="-138538"/>
-              <a:ext cx="818515" cy="320040"/>
-            </a:xfrm>
-            <a:prstGeom prst="rect">
-              <a:avLst/>
-            </a:prstGeom>
-            <a:noFill/>
-          </p:spPr>
-          <p:txBody>
-            <a:bodyPr wrap="square" rtlCol="0">
-              <a:spAutoFit/>
-            </a:bodyPr>
-            <a:lstStyle/>
-            <a:p>
-              <a:pPr algn="ctr">
-                <a:spcAft>
-                  <a:spcPts val="0"/>
-                </a:spcAft>
-              </a:pPr>
-              <a:r>
-                <a:rPr lang="en-US" sz="1000" kern="1200">
-                  <a:solidFill>
-                    <a:srgbClr val="000000"/>
-                  </a:solidFill>
-                  <a:effectLst/>
-                  <a:latin typeface="Calibri" panose="020F0502020204030204" pitchFamily="34" charset="0"/>
-                  <a:ea typeface="新細明體" panose="02020500000000000000" pitchFamily="18" charset="-120"/>
-                  <a:cs typeface="Times New Roman" panose="02020603050405020304" pitchFamily="18" charset="0"/>
-                </a:rPr>
-                <a:t>App Control</a:t>
-              </a:r>
-              <a:endParaRPr lang="zh-TW" sz="1200" kern="100">
-                <a:effectLst/>
-                <a:latin typeface="Calibri" panose="020F0502020204030204" pitchFamily="34" charset="0"/>
-                <a:ea typeface="新細明體" panose="02020500000000000000" pitchFamily="18" charset="-120"/>
-                <a:cs typeface="Times New Roman" panose="02020603050405020304" pitchFamily="18" charset="0"/>
-              </a:endParaRPr>
-            </a:p>
-          </p:txBody>
-        </p:sp>
-        <p:sp>
-          <p:nvSpPr>
-            <p:cNvPr id="26" name="文字方塊 36">
-              <a:extLst>
-                <a:ext uri="{FF2B5EF4-FFF2-40B4-BE49-F238E27FC236}">
-                  <a16:creationId xmlns:a16="http://schemas.microsoft.com/office/drawing/2014/main" id="{08004940-6C7D-4954-BBCF-80D9E8EA0C67}"/>
-                </a:ext>
-              </a:extLst>
-            </p:cNvPr>
-            <p:cNvSpPr txBox="1"/>
-            <p:nvPr/>
-          </p:nvSpPr>
-          <p:spPr>
-            <a:xfrm>
-              <a:off x="2790115" y="-138532"/>
-              <a:ext cx="1126490" cy="320039"/>
-            </a:xfrm>
-            <a:prstGeom prst="rect">
-              <a:avLst/>
-            </a:prstGeom>
-            <a:noFill/>
-          </p:spPr>
-          <p:txBody>
-            <a:bodyPr wrap="square" rtlCol="0">
-              <a:spAutoFit/>
-            </a:bodyPr>
-            <a:lstStyle/>
-            <a:p>
-              <a:pPr algn="ctr">
-                <a:spcAft>
-                  <a:spcPts val="0"/>
-                </a:spcAft>
-              </a:pPr>
-              <a:r>
-                <a:rPr lang="en-US" sz="1000" kern="1200">
-                  <a:solidFill>
-                    <a:srgbClr val="000000"/>
-                  </a:solidFill>
-                  <a:effectLst/>
-                  <a:latin typeface="Calibri" panose="020F0502020204030204" pitchFamily="34" charset="0"/>
-                  <a:ea typeface="新細明體" panose="02020500000000000000" pitchFamily="18" charset="-120"/>
-                  <a:cs typeface="Times New Roman" panose="02020603050405020304" pitchFamily="18" charset="0"/>
-                </a:rPr>
-                <a:t>Driver Control</a:t>
-              </a:r>
-              <a:endParaRPr lang="zh-TW" sz="1200" kern="100">
-                <a:effectLst/>
-                <a:latin typeface="Calibri" panose="020F0502020204030204" pitchFamily="34" charset="0"/>
-                <a:ea typeface="新細明體" panose="02020500000000000000" pitchFamily="18" charset="-120"/>
-                <a:cs typeface="Times New Roman" panose="02020603050405020304" pitchFamily="18" charset="0"/>
-              </a:endParaRPr>
-            </a:p>
-          </p:txBody>
-        </p:sp>
-        <p:sp>
-          <p:nvSpPr>
-            <p:cNvPr id="27" name="矩形 26">
-              <a:extLst>
-                <a:ext uri="{FF2B5EF4-FFF2-40B4-BE49-F238E27FC236}">
-                  <a16:creationId xmlns:a16="http://schemas.microsoft.com/office/drawing/2014/main" id="{593B1AC8-2BA4-4629-A20F-3D317229169E}"/>
-                </a:ext>
-              </a:extLst>
-            </p:cNvPr>
-            <p:cNvSpPr/>
-            <p:nvPr/>
-          </p:nvSpPr>
-          <p:spPr>
-            <a:xfrm>
-              <a:off x="3519005" y="944052"/>
-              <a:ext cx="1680001" cy="598056"/>
-            </a:xfrm>
-            <a:prstGeom prst="rect">
-              <a:avLst/>
-            </a:prstGeom>
-            <a:ln>
-              <a:noFill/>
-            </a:ln>
-          </p:spPr>
-          <p:style>
-            <a:lnRef idx="2">
-              <a:schemeClr val="accent1">
-                <a:shade val="50000"/>
-              </a:schemeClr>
-            </a:lnRef>
-            <a:fillRef idx="1">
-              <a:schemeClr val="accent1"/>
-            </a:fillRef>
-            <a:effectRef idx="0">
-              <a:schemeClr val="accent1"/>
-            </a:effectRef>
-            <a:fontRef idx="minor">
-              <a:schemeClr val="lt1"/>
-            </a:fontRef>
-          </p:style>
-          <p:txBody>
-            <a:bodyPr rot="0" spcFirstLastPara="0" vert="horz" wrap="square" lIns="91440" tIns="45720" rIns="91440" bIns="45720" numCol="1" spcCol="0" rtlCol="0" fromWordArt="0" anchor="ctr" anchorCtr="0" forceAA="0" compatLnSpc="1">
-              <a:prstTxWarp prst="textNoShape">
-                <a:avLst/>
-              </a:prstTxWarp>
-              <a:noAutofit/>
-            </a:bodyPr>
-            <a:lstStyle/>
-            <a:p>
-              <a:pPr algn="ctr">
-                <a:spcAft>
-                  <a:spcPts val="0"/>
-                </a:spcAft>
-              </a:pPr>
-              <a:r>
-                <a:rPr lang="en-US" sz="1000" kern="1200">
-                  <a:solidFill>
-                    <a:srgbClr val="000000"/>
-                  </a:solidFill>
-                  <a:effectLst/>
-                  <a:ea typeface="新細明體" panose="02020500000000000000" pitchFamily="18" charset="-120"/>
-                  <a:cs typeface="Times New Roman" panose="02020603050405020304" pitchFamily="18" charset="0"/>
-                </a:rPr>
-                <a:t>System Memory</a:t>
-              </a:r>
-              <a:endParaRPr lang="zh-TW" sz="1200" kern="100">
-                <a:effectLst/>
-                <a:ea typeface="新細明體" panose="02020500000000000000" pitchFamily="18" charset="-120"/>
-                <a:cs typeface="Times New Roman" panose="02020603050405020304" pitchFamily="18" charset="0"/>
-              </a:endParaRPr>
-            </a:p>
-          </p:txBody>
-        </p:sp>
-        <p:sp>
-          <p:nvSpPr>
-            <p:cNvPr id="28" name="矩形 27">
-              <a:extLst>
-                <a:ext uri="{FF2B5EF4-FFF2-40B4-BE49-F238E27FC236}">
-                  <a16:creationId xmlns:a16="http://schemas.microsoft.com/office/drawing/2014/main" id="{705CFAEE-D37B-4CEA-942C-262BAC9CA5AD}"/>
-                </a:ext>
-              </a:extLst>
-            </p:cNvPr>
-            <p:cNvSpPr/>
-            <p:nvPr/>
-          </p:nvSpPr>
-          <p:spPr>
-            <a:xfrm>
-              <a:off x="3529398" y="1764304"/>
-              <a:ext cx="1669621" cy="598056"/>
-            </a:xfrm>
-            <a:prstGeom prst="rect">
-              <a:avLst/>
-            </a:prstGeom>
-            <a:solidFill>
-              <a:schemeClr val="accent2"/>
-            </a:solidFill>
-            <a:ln>
-              <a:noFill/>
-            </a:ln>
-          </p:spPr>
-          <p:style>
-            <a:lnRef idx="2">
-              <a:schemeClr val="accent1">
-                <a:shade val="50000"/>
-              </a:schemeClr>
-            </a:lnRef>
-            <a:fillRef idx="1">
-              <a:schemeClr val="accent1"/>
-            </a:fillRef>
-            <a:effectRef idx="0">
-              <a:schemeClr val="accent1"/>
-            </a:effectRef>
-            <a:fontRef idx="minor">
-              <a:schemeClr val="lt1"/>
-            </a:fontRef>
-          </p:style>
-          <p:txBody>
-            <a:bodyPr rot="0" spcFirstLastPara="0" vert="horz" wrap="square" lIns="91440" tIns="45720" rIns="91440" bIns="45720" numCol="1" spcCol="0" rtlCol="0" fromWordArt="0" anchor="ctr" anchorCtr="0" forceAA="0" compatLnSpc="1">
-              <a:prstTxWarp prst="textNoShape">
-                <a:avLst/>
-              </a:prstTxWarp>
-              <a:noAutofit/>
-            </a:bodyPr>
-            <a:lstStyle/>
-            <a:p>
-              <a:pPr algn="ctr">
-                <a:spcAft>
-                  <a:spcPts val="0"/>
-                </a:spcAft>
-              </a:pPr>
-              <a:r>
-                <a:rPr lang="en-US" sz="1000" kern="1200">
-                  <a:solidFill>
-                    <a:srgbClr val="000000"/>
-                  </a:solidFill>
-                  <a:effectLst/>
-                  <a:ea typeface="新細明體" panose="02020500000000000000" pitchFamily="18" charset="-120"/>
-                  <a:cs typeface="Times New Roman" panose="02020603050405020304" pitchFamily="18" charset="0"/>
-                </a:rPr>
-                <a:t> Local Video Memory</a:t>
-              </a:r>
-              <a:endParaRPr lang="zh-TW" sz="1200" kern="100">
-                <a:effectLst/>
-                <a:ea typeface="新細明體" panose="02020500000000000000" pitchFamily="18" charset="-120"/>
-                <a:cs typeface="Times New Roman" panose="02020603050405020304" pitchFamily="18" charset="0"/>
-              </a:endParaRPr>
-            </a:p>
-          </p:txBody>
-        </p:sp>
-        <p:cxnSp>
-          <p:nvCxnSpPr>
-            <p:cNvPr id="29" name="直線單箭頭接點 28">
-              <a:extLst>
-                <a:ext uri="{FF2B5EF4-FFF2-40B4-BE49-F238E27FC236}">
-                  <a16:creationId xmlns:a16="http://schemas.microsoft.com/office/drawing/2014/main" id="{62222B00-4E84-4A90-BEA4-9AB53E4FF512}"/>
-                </a:ext>
-              </a:extLst>
-            </p:cNvPr>
-            <p:cNvCxnSpPr>
-              <a:cxnSpLocks/>
-              <a:stCxn id="27" idx="2"/>
-              <a:endCxn id="28" idx="0"/>
-            </p:cNvCxnSpPr>
-            <p:nvPr/>
-          </p:nvCxnSpPr>
-          <p:spPr>
-            <a:xfrm>
-              <a:off x="4359006" y="1542108"/>
-              <a:ext cx="5203" cy="222196"/>
-            </a:xfrm>
-            <a:prstGeom prst="straightConnector1">
-              <a:avLst/>
-            </a:prstGeom>
-            <a:ln w="25400">
-              <a:solidFill>
-                <a:schemeClr val="tx1"/>
-              </a:solidFill>
-              <a:tailEnd type="triangle"/>
-            </a:ln>
-          </p:spPr>
-          <p:style>
-            <a:lnRef idx="1">
-              <a:schemeClr val="accent1"/>
-            </a:lnRef>
-            <a:fillRef idx="0">
-              <a:schemeClr val="accent1"/>
-            </a:fillRef>
-            <a:effectRef idx="0">
-              <a:schemeClr val="accent1"/>
-            </a:effectRef>
-            <a:fontRef idx="minor">
-              <a:schemeClr val="tx1"/>
-            </a:fontRef>
-          </p:style>
-        </p:cxnSp>
-        <p:sp>
-          <p:nvSpPr>
-            <p:cNvPr id="30" name="矩形 29">
-              <a:extLst>
-                <a:ext uri="{FF2B5EF4-FFF2-40B4-BE49-F238E27FC236}">
-                  <a16:creationId xmlns:a16="http://schemas.microsoft.com/office/drawing/2014/main" id="{F5049C11-3FFC-4708-A425-6AAD08EE0A1B}"/>
-                </a:ext>
-              </a:extLst>
-            </p:cNvPr>
-            <p:cNvSpPr/>
-            <p:nvPr/>
-          </p:nvSpPr>
-          <p:spPr>
-            <a:xfrm>
-              <a:off x="415888" y="1052248"/>
-              <a:ext cx="2189018" cy="536067"/>
-            </a:xfrm>
-            <a:prstGeom prst="rect">
-              <a:avLst/>
-            </a:prstGeom>
-            <a:noFill/>
-            <a:ln w="12700">
-              <a:solidFill>
-                <a:schemeClr val="accent1"/>
-              </a:solidFill>
-              <a:prstDash val="dash"/>
-            </a:ln>
-          </p:spPr>
-          <p:style>
-            <a:lnRef idx="2">
-              <a:schemeClr val="accent1">
-                <a:shade val="50000"/>
-              </a:schemeClr>
-            </a:lnRef>
-            <a:fillRef idx="1">
-              <a:schemeClr val="accent1"/>
-            </a:fillRef>
-            <a:effectRef idx="0">
-              <a:schemeClr val="accent1"/>
-            </a:effectRef>
-            <a:fontRef idx="minor">
-              <a:schemeClr val="lt1"/>
-            </a:fontRef>
-          </p:style>
-          <p:txBody>
-            <a:bodyPr rot="0" spcFirstLastPara="0" vert="horz" wrap="square" lIns="91440" tIns="45720" rIns="91440" bIns="45720" numCol="1" spcCol="0" rtlCol="0" fromWordArt="0" anchor="ctr" anchorCtr="0" forceAA="0" compatLnSpc="1">
-              <a:prstTxWarp prst="textNoShape">
-                <a:avLst/>
-              </a:prstTxWarp>
-              <a:noAutofit/>
-            </a:bodyPr>
-            <a:lstStyle/>
-            <a:p>
-              <a:pPr algn="ctr">
-                <a:spcAft>
-                  <a:spcPts val="0"/>
-                </a:spcAft>
-              </a:pPr>
-              <a:r>
-                <a:rPr lang="en-US" sz="1000" kern="1200">
-                  <a:solidFill>
-                    <a:srgbClr val="000000"/>
-                  </a:solidFill>
-                  <a:effectLst/>
-                  <a:ea typeface="新細明體" panose="02020500000000000000" pitchFamily="18" charset="-120"/>
-                  <a:cs typeface="Times New Roman" panose="02020603050405020304" pitchFamily="18" charset="0"/>
-                </a:rPr>
-                <a:t>Parse or prepare data and save it at the allocated space.</a:t>
-              </a:r>
-              <a:endParaRPr lang="zh-TW" sz="1200" kern="100">
-                <a:effectLst/>
-                <a:ea typeface="新細明體" panose="02020500000000000000" pitchFamily="18" charset="-120"/>
-                <a:cs typeface="Times New Roman" panose="02020603050405020304" pitchFamily="18" charset="0"/>
-              </a:endParaRPr>
-            </a:p>
-          </p:txBody>
-        </p:sp>
-        <p:cxnSp>
-          <p:nvCxnSpPr>
-            <p:cNvPr id="33" name="直線單箭頭接點 32">
-              <a:extLst>
-                <a:ext uri="{FF2B5EF4-FFF2-40B4-BE49-F238E27FC236}">
-                  <a16:creationId xmlns:a16="http://schemas.microsoft.com/office/drawing/2014/main" id="{98D0467B-CEFB-4ED9-B899-1F0C3D522951}"/>
-                </a:ext>
-              </a:extLst>
-            </p:cNvPr>
-            <p:cNvCxnSpPr>
-              <a:cxnSpLocks/>
-              <a:stCxn id="30" idx="3"/>
-              <a:endCxn id="27" idx="1"/>
-            </p:cNvCxnSpPr>
-            <p:nvPr/>
-          </p:nvCxnSpPr>
-          <p:spPr>
-            <a:xfrm flipV="1">
-              <a:off x="2604906" y="1243080"/>
-              <a:ext cx="914099" cy="77202"/>
-            </a:xfrm>
-            <a:prstGeom prst="straightConnector1">
-              <a:avLst/>
-            </a:prstGeom>
-            <a:ln w="9525">
-              <a:solidFill>
-                <a:schemeClr val="tx1"/>
-              </a:solidFill>
-              <a:prstDash val="sysDash"/>
-              <a:tailEnd type="triangle"/>
-            </a:ln>
-          </p:spPr>
-          <p:style>
-            <a:lnRef idx="1">
-              <a:schemeClr val="accent1"/>
-            </a:lnRef>
-            <a:fillRef idx="0">
-              <a:schemeClr val="accent1"/>
-            </a:fillRef>
-            <a:effectRef idx="0">
-              <a:schemeClr val="accent1"/>
-            </a:effectRef>
-            <a:fontRef idx="minor">
-              <a:schemeClr val="tx1"/>
-            </a:fontRef>
-          </p:style>
-        </p:cxnSp>
-        <p:cxnSp>
-          <p:nvCxnSpPr>
-            <p:cNvPr id="35" name="直線單箭頭接點 34">
-              <a:extLst>
-                <a:ext uri="{FF2B5EF4-FFF2-40B4-BE49-F238E27FC236}">
-                  <a16:creationId xmlns:a16="http://schemas.microsoft.com/office/drawing/2014/main" id="{E0DA3599-A8A0-45E6-BF24-273411760A07}"/>
-                </a:ext>
-              </a:extLst>
-            </p:cNvPr>
-            <p:cNvCxnSpPr>
-              <a:cxnSpLocks/>
-              <a:stCxn id="40" idx="3"/>
-            </p:cNvCxnSpPr>
-            <p:nvPr/>
-          </p:nvCxnSpPr>
-          <p:spPr>
-            <a:xfrm flipV="1">
-              <a:off x="2604900" y="1628847"/>
-              <a:ext cx="1728626" cy="363050"/>
-            </a:xfrm>
-            <a:prstGeom prst="straightConnector1">
-              <a:avLst/>
-            </a:prstGeom>
-            <a:ln w="9525">
-              <a:solidFill>
-                <a:schemeClr val="tx1"/>
-              </a:solidFill>
-              <a:prstDash val="sysDash"/>
-              <a:tailEnd type="triangle"/>
-            </a:ln>
-          </p:spPr>
-          <p:style>
-            <a:lnRef idx="1">
-              <a:schemeClr val="accent1"/>
-            </a:lnRef>
-            <a:fillRef idx="0">
-              <a:schemeClr val="accent1"/>
-            </a:fillRef>
-            <a:effectRef idx="0">
-              <a:schemeClr val="accent1"/>
-            </a:effectRef>
-            <a:fontRef idx="minor">
-              <a:schemeClr val="tx1"/>
-            </a:fontRef>
-          </p:style>
-        </p:cxnSp>
-        <p:sp>
-          <p:nvSpPr>
-            <p:cNvPr id="40" name="矩形 39">
-              <a:extLst>
-                <a:ext uri="{FF2B5EF4-FFF2-40B4-BE49-F238E27FC236}">
-                  <a16:creationId xmlns:a16="http://schemas.microsoft.com/office/drawing/2014/main" id="{EC452C01-5DD3-4871-AB8A-EE90C8E65C5A}"/>
-                </a:ext>
-              </a:extLst>
-            </p:cNvPr>
-            <p:cNvSpPr/>
-            <p:nvPr/>
-          </p:nvSpPr>
-          <p:spPr>
-            <a:xfrm>
-              <a:off x="415888" y="1723863"/>
-              <a:ext cx="2189018" cy="536067"/>
-            </a:xfrm>
-            <a:prstGeom prst="rect">
-              <a:avLst/>
-            </a:prstGeom>
-            <a:noFill/>
-            <a:ln w="12700">
-              <a:solidFill>
-                <a:schemeClr val="accent1"/>
-              </a:solidFill>
-              <a:prstDash val="dash"/>
-            </a:ln>
-          </p:spPr>
-          <p:style>
-            <a:lnRef idx="2">
-              <a:schemeClr val="accent1">
-                <a:shade val="50000"/>
-              </a:schemeClr>
-            </a:lnRef>
-            <a:fillRef idx="1">
-              <a:schemeClr val="accent1"/>
-            </a:fillRef>
-            <a:effectRef idx="0">
-              <a:schemeClr val="accent1"/>
-            </a:effectRef>
-            <a:fontRef idx="minor">
-              <a:schemeClr val="lt1"/>
-            </a:fontRef>
-          </p:style>
-          <p:txBody>
-            <a:bodyPr rot="0" spcFirstLastPara="0" vert="horz" wrap="square" lIns="91440" tIns="45720" rIns="91440" bIns="45720" numCol="1" spcCol="0" rtlCol="0" fromWordArt="0" anchor="ctr" anchorCtr="0" forceAA="0" compatLnSpc="1">
-              <a:prstTxWarp prst="textNoShape">
-                <a:avLst/>
-              </a:prstTxWarp>
-              <a:noAutofit/>
-            </a:bodyPr>
-            <a:lstStyle/>
-            <a:p>
-              <a:pPr algn="ctr">
-                <a:spcAft>
-                  <a:spcPts val="0"/>
-                </a:spcAft>
-              </a:pPr>
-              <a:r>
-                <a:rPr lang="en-US" sz="1000" kern="1200">
-                  <a:solidFill>
-                    <a:srgbClr val="000000"/>
-                  </a:solidFill>
-                  <a:effectLst/>
-                  <a:ea typeface="新細明體" panose="02020500000000000000" pitchFamily="18" charset="-120"/>
-                  <a:cs typeface="Times New Roman" panose="02020603050405020304" pitchFamily="18" charset="0"/>
-                </a:rPr>
-                <a:t>Record graphics API for buffer copying and then submit to queue. </a:t>
-              </a:r>
-              <a:endParaRPr lang="zh-TW" sz="1200" kern="100">
-                <a:effectLst/>
-                <a:ea typeface="新細明體" panose="02020500000000000000" pitchFamily="18" charset="-120"/>
-                <a:cs typeface="Times New Roman" panose="02020603050405020304" pitchFamily="18" charset="0"/>
-              </a:endParaRPr>
-            </a:p>
-          </p:txBody>
-        </p:sp>
-        <p:sp>
-          <p:nvSpPr>
-            <p:cNvPr id="42" name="矩形 41">
-              <a:extLst>
-                <a:ext uri="{FF2B5EF4-FFF2-40B4-BE49-F238E27FC236}">
-                  <a16:creationId xmlns:a16="http://schemas.microsoft.com/office/drawing/2014/main" id="{5A4154BA-927A-4FCE-BEF1-7619FA4F7BD5}"/>
-                </a:ext>
-              </a:extLst>
-            </p:cNvPr>
-            <p:cNvSpPr/>
-            <p:nvPr/>
-          </p:nvSpPr>
-          <p:spPr>
-            <a:xfrm>
-              <a:off x="442424" y="361667"/>
-              <a:ext cx="2189018" cy="536067"/>
-            </a:xfrm>
-            <a:prstGeom prst="rect">
-              <a:avLst/>
-            </a:prstGeom>
-            <a:noFill/>
-            <a:ln w="12700">
-              <a:solidFill>
-                <a:schemeClr val="accent1"/>
-              </a:solidFill>
-              <a:prstDash val="dash"/>
-            </a:ln>
-          </p:spPr>
-          <p:style>
-            <a:lnRef idx="2">
-              <a:schemeClr val="accent1">
-                <a:shade val="50000"/>
-              </a:schemeClr>
-            </a:lnRef>
-            <a:fillRef idx="1">
-              <a:schemeClr val="accent1"/>
-            </a:fillRef>
-            <a:effectRef idx="0">
-              <a:schemeClr val="accent1"/>
-            </a:effectRef>
-            <a:fontRef idx="minor">
-              <a:schemeClr val="lt1"/>
-            </a:fontRef>
-          </p:style>
-          <p:txBody>
-            <a:bodyPr rot="0" spcFirstLastPara="0" vert="horz" wrap="square" lIns="91440" tIns="45720" rIns="91440" bIns="45720" numCol="1" spcCol="0" rtlCol="0" fromWordArt="0" anchor="ctr" anchorCtr="0" forceAA="0" compatLnSpc="1">
-              <a:prstTxWarp prst="textNoShape">
-                <a:avLst/>
-              </a:prstTxWarp>
-              <a:noAutofit/>
-            </a:bodyPr>
-            <a:lstStyle/>
-            <a:p>
-              <a:pPr algn="ctr">
-                <a:spcAft>
-                  <a:spcPts val="0"/>
-                </a:spcAft>
-              </a:pPr>
-              <a:r>
-                <a:rPr lang="en-US" sz="1000" kern="1200">
-                  <a:solidFill>
-                    <a:srgbClr val="000000"/>
-                  </a:solidFill>
-                  <a:effectLst/>
-                  <a:ea typeface="新細明體" panose="02020500000000000000" pitchFamily="18" charset="-120"/>
-                  <a:cs typeface="Times New Roman" panose="02020603050405020304" pitchFamily="18" charset="0"/>
-                </a:rPr>
-                <a:t>Allocate system memory(host visible memory) with target size and map it for get address.</a:t>
-              </a:r>
-              <a:endParaRPr lang="zh-TW" sz="1200" kern="100">
-                <a:effectLst/>
-                <a:ea typeface="新細明體" panose="02020500000000000000" pitchFamily="18" charset="-120"/>
-                <a:cs typeface="Times New Roman" panose="02020603050405020304" pitchFamily="18" charset="0"/>
-              </a:endParaRPr>
-            </a:p>
-          </p:txBody>
-        </p:sp>
-        <p:cxnSp>
-          <p:nvCxnSpPr>
-            <p:cNvPr id="43" name="直線單箭頭接點 42">
-              <a:extLst>
-                <a:ext uri="{FF2B5EF4-FFF2-40B4-BE49-F238E27FC236}">
-                  <a16:creationId xmlns:a16="http://schemas.microsoft.com/office/drawing/2014/main" id="{733D9AB1-9CAB-44AB-9427-9B8AF8BBE6DD}"/>
-                </a:ext>
-              </a:extLst>
-            </p:cNvPr>
-            <p:cNvCxnSpPr>
-              <a:cxnSpLocks/>
-              <a:stCxn id="42" idx="3"/>
-              <a:endCxn id="27" idx="1"/>
-            </p:cNvCxnSpPr>
-            <p:nvPr/>
-          </p:nvCxnSpPr>
-          <p:spPr>
-            <a:xfrm>
-              <a:off x="2631442" y="629701"/>
-              <a:ext cx="887563" cy="613379"/>
-            </a:xfrm>
-            <a:prstGeom prst="straightConnector1">
-              <a:avLst/>
-            </a:prstGeom>
-            <a:ln w="9525">
-              <a:solidFill>
-                <a:schemeClr val="tx1"/>
-              </a:solidFill>
-              <a:prstDash val="sysDash"/>
-              <a:tailEnd type="triangle"/>
-            </a:ln>
-          </p:spPr>
-          <p:style>
-            <a:lnRef idx="1">
-              <a:schemeClr val="accent1"/>
-            </a:lnRef>
-            <a:fillRef idx="0">
-              <a:schemeClr val="accent1"/>
-            </a:fillRef>
-            <a:effectRef idx="0">
-              <a:schemeClr val="accent1"/>
-            </a:effectRef>
-            <a:fontRef idx="minor">
-              <a:schemeClr val="tx1"/>
-            </a:fontRef>
-          </p:style>
-        </p:cxnSp>
-      </p:grpSp>
-      <p:grpSp>
-        <p:nvGrpSpPr>
-          <p:cNvPr id="53" name="群組 52">
-            <a:extLst>
-              <a:ext uri="{FF2B5EF4-FFF2-40B4-BE49-F238E27FC236}">
-                <a16:creationId xmlns:a16="http://schemas.microsoft.com/office/drawing/2014/main" id="{3F9229ED-E6CA-4C68-9E82-33D5CE399050}"/>
-              </a:ext>
-            </a:extLst>
-          </p:cNvPr>
-          <p:cNvGrpSpPr/>
-          <p:nvPr/>
-        </p:nvGrpSpPr>
-        <p:grpSpPr>
-          <a:xfrm>
-            <a:off x="4307626" y="4039340"/>
-            <a:ext cx="5519955" cy="1649537"/>
-            <a:chOff x="4307626" y="4039340"/>
-            <a:chExt cx="5519955" cy="1649537"/>
+            <a:off x="283946" y="3627382"/>
+            <a:ext cx="5519954" cy="1649537"/>
+            <a:chOff x="4307627" y="4039340"/>
+            <a:chExt cx="5519954" cy="1649537"/>
           </a:xfrm>
         </p:grpSpPr>
         <p:sp>
@@ -4158,7 +3351,7 @@
             <p:cNvPr id="3" name="矩形 2">
               <a:extLst>
                 <a:ext uri="{FF2B5EF4-FFF2-40B4-BE49-F238E27FC236}">
-                  <a16:creationId xmlns:a16="http://schemas.microsoft.com/office/drawing/2014/main" id="{FFDD7E79-4AC5-45B9-B2E6-2ACC5D7A8074}"/>
+                  <a16:creationId xmlns:a16="http://schemas.microsoft.com/office/drawing/2014/main" xmlns="" id="{FFDD7E79-4AC5-45B9-B2E6-2ACC5D7A8074}"/>
                 </a:ext>
               </a:extLst>
             </p:cNvPr>
@@ -4222,7 +3415,7 @@
             <p:cNvPr id="45" name="矩形 44">
               <a:extLst>
                 <a:ext uri="{FF2B5EF4-FFF2-40B4-BE49-F238E27FC236}">
-                  <a16:creationId xmlns:a16="http://schemas.microsoft.com/office/drawing/2014/main" id="{BE163FF4-991D-4E9C-9D2D-EAC7802627B6}"/>
+                  <a16:creationId xmlns:a16="http://schemas.microsoft.com/office/drawing/2014/main" xmlns="" id="{BE163FF4-991D-4E9C-9D2D-EAC7802627B6}"/>
                 </a:ext>
               </a:extLst>
             </p:cNvPr>
@@ -4296,6 +3489,14 @@
                   </a:solidFill>
                 </a:rPr>
                 <a:t> </a:t>
+              </a:r>
+              <a:r>
+                <a:rPr lang="en-US" altLang="zh-TW" sz="1000" dirty="0">
+                  <a:solidFill>
+                    <a:schemeClr val="tx1"/>
+                  </a:solidFill>
+                </a:rPr>
+                <a:t/>
               </a:r>
               <a:br>
                 <a:rPr lang="en-US" altLang="zh-TW" sz="1000" dirty="0">
@@ -4340,7 +3541,7 @@
             <p:cNvPr id="46" name="矩形 45">
               <a:extLst>
                 <a:ext uri="{FF2B5EF4-FFF2-40B4-BE49-F238E27FC236}">
-                  <a16:creationId xmlns:a16="http://schemas.microsoft.com/office/drawing/2014/main" id="{ACAFE331-13B1-46A3-B028-E50B95D89D18}"/>
+                  <a16:creationId xmlns:a16="http://schemas.microsoft.com/office/drawing/2014/main" xmlns="" id="{ACAFE331-13B1-46A3-B028-E50B95D89D18}"/>
                 </a:ext>
               </a:extLst>
             </p:cNvPr>
@@ -4404,7 +3605,7 @@
             <p:cNvPr id="50" name="矩形 49">
               <a:extLst>
                 <a:ext uri="{FF2B5EF4-FFF2-40B4-BE49-F238E27FC236}">
-                  <a16:creationId xmlns:a16="http://schemas.microsoft.com/office/drawing/2014/main" id="{BB66F52D-598F-4FB3-838D-E9AA82574BC9}"/>
+                  <a16:creationId xmlns:a16="http://schemas.microsoft.com/office/drawing/2014/main" xmlns="" id="{BB66F52D-598F-4FB3-838D-E9AA82574BC9}"/>
                 </a:ext>
               </a:extLst>
             </p:cNvPr>
@@ -4413,7 +3614,7 @@
           </p:nvSpPr>
           <p:spPr>
             <a:xfrm>
-              <a:off x="4307627" y="4314547"/>
+              <a:off x="4307627" y="4057906"/>
               <a:ext cx="2674013" cy="550415"/>
             </a:xfrm>
             <a:prstGeom prst="rect">
@@ -4463,33 +3664,20 @@
                 </a:rPr>
               </a:br>
               <a:r>
-                <a:rPr lang="en-US" altLang="zh-TW" sz="1000" dirty="0">
+                <a:rPr lang="en-US" altLang="zh-TW" sz="1000" dirty="0" smtClean="0">
                   <a:solidFill>
                     <a:srgbClr val="000000"/>
                   </a:solidFill>
                   <a:ea typeface="細明體" panose="02020509000000000000" pitchFamily="49" charset="-120"/>
                   <a:cs typeface="Consolas" panose="020B0609020204030204" pitchFamily="49" charset="0"/>
                 </a:rPr>
-                <a:t>V</a:t>
+                <a:t>Video memory</a:t>
               </a:r>
-              <a:r>
-                <a:rPr lang="en-US" altLang="zh-TW" sz="1000" dirty="0" bmk="">
-                  <a:solidFill>
-                    <a:srgbClr val="000000"/>
-                  </a:solidFill>
-                  <a:ea typeface="細明體" panose="02020509000000000000" pitchFamily="49" charset="-120"/>
-                  <a:cs typeface="Consolas" panose="020B0609020204030204" pitchFamily="49" charset="0"/>
-                </a:rPr>
-                <a:t>K_MEMORY_HEAP_DEVICE_LOCAL_BIT</a:t>
-              </a:r>
-              <a:r>
-                <a:rPr lang="en-US" altLang="zh-TW" sz="1000" dirty="0">
-                  <a:solidFill>
-                    <a:schemeClr val="tx1"/>
-                  </a:solidFill>
-                </a:rPr>
-                <a:t> </a:t>
-              </a:r>
+              <a:endParaRPr lang="en-US" altLang="zh-TW" sz="1000" dirty="0">
+                <a:solidFill>
+                  <a:schemeClr val="tx1"/>
+                </a:solidFill>
+              </a:endParaRPr>
             </a:p>
           </p:txBody>
         </p:sp>
@@ -4498,7 +3686,7 @@
             <p:cNvPr id="51" name="矩形 50">
               <a:extLst>
                 <a:ext uri="{FF2B5EF4-FFF2-40B4-BE49-F238E27FC236}">
-                  <a16:creationId xmlns:a16="http://schemas.microsoft.com/office/drawing/2014/main" id="{9012951A-550E-478F-9464-8759AEB1E55A}"/>
+                  <a16:creationId xmlns:a16="http://schemas.microsoft.com/office/drawing/2014/main" xmlns="" id="{9012951A-550E-478F-9464-8759AEB1E55A}"/>
                 </a:ext>
               </a:extLst>
             </p:cNvPr>
@@ -4507,7 +3695,7 @@
           </p:nvSpPr>
           <p:spPr>
             <a:xfrm>
-              <a:off x="4307626" y="5125941"/>
+              <a:off x="4307627" y="4850733"/>
               <a:ext cx="2674013" cy="550415"/>
             </a:xfrm>
             <a:prstGeom prst="rect">
@@ -4557,13 +3745,13 @@
                 </a:rPr>
               </a:br>
               <a:r>
-                <a:rPr lang="en-US" altLang="zh-TW" sz="1000" dirty="0">
+                <a:rPr lang="en-US" altLang="zh-TW" sz="1000" dirty="0" smtClean="0">
                   <a:solidFill>
                     <a:srgbClr val="000000"/>
                   </a:solidFill>
                   <a:ea typeface="細明體" panose="02020509000000000000" pitchFamily="49" charset="-120"/>
                 </a:rPr>
-                <a:t>0</a:t>
+                <a:t>System memory</a:t>
               </a:r>
               <a:endParaRPr lang="en-US" altLang="zh-TW" sz="1000" dirty="0">
                 <a:solidFill>
@@ -4578,7 +3766,7 @@
             <p:cNvPr id="14" name="直線單箭頭接點 13">
               <a:extLst>
                 <a:ext uri="{FF2B5EF4-FFF2-40B4-BE49-F238E27FC236}">
-                  <a16:creationId xmlns:a16="http://schemas.microsoft.com/office/drawing/2014/main" id="{4FB8EBAA-F4EC-47ED-9056-64D509A67100}"/>
+                  <a16:creationId xmlns:a16="http://schemas.microsoft.com/office/drawing/2014/main" xmlns="" id="{4FB8EBAA-F4EC-47ED-9056-64D509A67100}"/>
                 </a:ext>
               </a:extLst>
             </p:cNvPr>
@@ -4591,7 +3779,7 @@
           <p:spPr>
             <a:xfrm flipH="1">
               <a:off x="6981640" y="4314548"/>
-              <a:ext cx="1017051" cy="275207"/>
+              <a:ext cx="1017051" cy="18566"/>
             </a:xfrm>
             <a:prstGeom prst="straightConnector1">
               <a:avLst/>
@@ -4623,7 +3811,7 @@
             <p:cNvPr id="52" name="直線單箭頭接點 51">
               <a:extLst>
                 <a:ext uri="{FF2B5EF4-FFF2-40B4-BE49-F238E27FC236}">
-                  <a16:creationId xmlns:a16="http://schemas.microsoft.com/office/drawing/2014/main" id="{01E2454F-6E6F-4E77-AFB0-DAC5B803692F}"/>
+                  <a16:creationId xmlns:a16="http://schemas.microsoft.com/office/drawing/2014/main" xmlns="" id="{01E2454F-6E6F-4E77-AFB0-DAC5B803692F}"/>
                 </a:ext>
               </a:extLst>
             </p:cNvPr>
@@ -4636,8 +3824,8 @@
           </p:nvCxnSpPr>
           <p:spPr>
             <a:xfrm flipH="1">
-              <a:off x="6981639" y="4864109"/>
-              <a:ext cx="1012435" cy="537040"/>
+              <a:off x="6981640" y="4864109"/>
+              <a:ext cx="1012434" cy="261832"/>
             </a:xfrm>
             <a:prstGeom prst="straightConnector1">
               <a:avLst/>
@@ -4669,7 +3857,7 @@
             <p:cNvPr id="54" name="直線單箭頭接點 53">
               <a:extLst>
                 <a:ext uri="{FF2B5EF4-FFF2-40B4-BE49-F238E27FC236}">
-                  <a16:creationId xmlns:a16="http://schemas.microsoft.com/office/drawing/2014/main" id="{4E4F9EA3-FFA4-47AF-9F8A-31D32D675499}"/>
+                  <a16:creationId xmlns:a16="http://schemas.microsoft.com/office/drawing/2014/main" xmlns="" id="{4E4F9EA3-FFA4-47AF-9F8A-31D32D675499}"/>
                 </a:ext>
               </a:extLst>
             </p:cNvPr>
@@ -4682,8 +3870,8 @@
           </p:nvCxnSpPr>
           <p:spPr>
             <a:xfrm flipH="1" flipV="1">
-              <a:off x="6981639" y="5401149"/>
-              <a:ext cx="1017050" cy="12521"/>
+              <a:off x="6981640" y="5125941"/>
+              <a:ext cx="1017049" cy="287729"/>
             </a:xfrm>
             <a:prstGeom prst="straightConnector1">
               <a:avLst/>
@@ -4710,6 +3898,2137 @@
             </a:fontRef>
           </p:style>
         </p:cxnSp>
+      </p:grpSp>
+      <p:grpSp>
+        <p:nvGrpSpPr>
+          <p:cNvPr id="9" name="群組 8"/>
+          <p:cNvGrpSpPr/>
+          <p:nvPr/>
+        </p:nvGrpSpPr>
+        <p:grpSpPr>
+          <a:xfrm>
+            <a:off x="0" y="99054"/>
+            <a:ext cx="5803900" cy="2769235"/>
+            <a:chOff x="0" y="99054"/>
+            <a:chExt cx="5803900" cy="2769235"/>
+          </a:xfrm>
+        </p:grpSpPr>
+        <p:sp>
+          <p:nvSpPr>
+            <p:cNvPr id="23" name="矩形 22">
+              <a:extLst>
+                <a:ext uri="{FF2B5EF4-FFF2-40B4-BE49-F238E27FC236}">
+                  <a16:creationId xmlns:a16="http://schemas.microsoft.com/office/drawing/2014/main" xmlns="" id="{1CD22B56-A701-46FD-8B8F-E879DE675A1A}"/>
+                </a:ext>
+              </a:extLst>
+            </p:cNvPr>
+            <p:cNvSpPr/>
+            <p:nvPr/>
+          </p:nvSpPr>
+          <p:spPr>
+            <a:xfrm>
+              <a:off x="40568" y="112708"/>
+              <a:ext cx="2881710" cy="2755303"/>
+            </a:xfrm>
+            <a:prstGeom prst="rect">
+              <a:avLst/>
+            </a:prstGeom>
+            <a:noFill/>
+            <a:ln w="38100">
+              <a:solidFill>
+                <a:schemeClr val="tx1"/>
+              </a:solidFill>
+            </a:ln>
+          </p:spPr>
+          <p:style>
+            <a:lnRef idx="2">
+              <a:schemeClr val="accent1">
+                <a:shade val="50000"/>
+              </a:schemeClr>
+            </a:lnRef>
+            <a:fillRef idx="1">
+              <a:schemeClr val="accent1"/>
+            </a:fillRef>
+            <a:effectRef idx="0">
+              <a:schemeClr val="accent1"/>
+            </a:effectRef>
+            <a:fontRef idx="minor">
+              <a:schemeClr val="lt1"/>
+            </a:fontRef>
+          </p:style>
+          <p:txBody>
+            <a:bodyPr rot="0" spcFirstLastPara="0" vert="horz" wrap="square" lIns="91440" tIns="45720" rIns="91440" bIns="45720" numCol="1" spcCol="0" rtlCol="0" fromWordArt="0" anchor="ctr" anchorCtr="0" forceAA="0" compatLnSpc="1">
+              <a:prstTxWarp prst="textNoShape">
+                <a:avLst/>
+              </a:prstTxWarp>
+              <a:noAutofit/>
+            </a:bodyPr>
+            <a:lstStyle/>
+            <a:p>
+              <a:endParaRPr lang="zh-TW" altLang="en-US"/>
+            </a:p>
+          </p:txBody>
+        </p:sp>
+        <p:sp>
+          <p:nvSpPr>
+            <p:cNvPr id="24" name="矩形 23">
+              <a:extLst>
+                <a:ext uri="{FF2B5EF4-FFF2-40B4-BE49-F238E27FC236}">
+                  <a16:creationId xmlns:a16="http://schemas.microsoft.com/office/drawing/2014/main" xmlns="" id="{C655E111-7F70-481E-98E9-3C70B39E015F}"/>
+                </a:ext>
+              </a:extLst>
+            </p:cNvPr>
+            <p:cNvSpPr/>
+            <p:nvPr/>
+          </p:nvSpPr>
+          <p:spPr>
+            <a:xfrm>
+              <a:off x="2922190" y="112706"/>
+              <a:ext cx="2881710" cy="2755583"/>
+            </a:xfrm>
+            <a:prstGeom prst="rect">
+              <a:avLst/>
+            </a:prstGeom>
+            <a:noFill/>
+            <a:ln w="38100">
+              <a:solidFill>
+                <a:schemeClr val="tx1"/>
+              </a:solidFill>
+            </a:ln>
+          </p:spPr>
+          <p:style>
+            <a:lnRef idx="2">
+              <a:schemeClr val="accent1">
+                <a:shade val="50000"/>
+              </a:schemeClr>
+            </a:lnRef>
+            <a:fillRef idx="1">
+              <a:schemeClr val="accent1"/>
+            </a:fillRef>
+            <a:effectRef idx="0">
+              <a:schemeClr val="accent1"/>
+            </a:effectRef>
+            <a:fontRef idx="minor">
+              <a:schemeClr val="lt1"/>
+            </a:fontRef>
+          </p:style>
+          <p:txBody>
+            <a:bodyPr rot="0" spcFirstLastPara="0" vert="horz" wrap="square" lIns="91440" tIns="45720" rIns="91440" bIns="45720" numCol="1" spcCol="0" rtlCol="0" fromWordArt="0" anchor="ctr" anchorCtr="0" forceAA="0" compatLnSpc="1">
+              <a:prstTxWarp prst="textNoShape">
+                <a:avLst/>
+              </a:prstTxWarp>
+              <a:noAutofit/>
+            </a:bodyPr>
+            <a:lstStyle/>
+            <a:p>
+              <a:endParaRPr lang="zh-TW" altLang="en-US"/>
+            </a:p>
+          </p:txBody>
+        </p:sp>
+        <p:sp>
+          <p:nvSpPr>
+            <p:cNvPr id="25" name="文字方塊 35">
+              <a:extLst>
+                <a:ext uri="{FF2B5EF4-FFF2-40B4-BE49-F238E27FC236}">
+                  <a16:creationId xmlns:a16="http://schemas.microsoft.com/office/drawing/2014/main" xmlns="" id="{D5E20F62-7539-4C18-9DAE-556FFB155982}"/>
+                </a:ext>
+              </a:extLst>
+            </p:cNvPr>
+            <p:cNvSpPr txBox="1"/>
+            <p:nvPr/>
+          </p:nvSpPr>
+          <p:spPr>
+            <a:xfrm>
+              <a:off x="0" y="99054"/>
+              <a:ext cx="818513" cy="320040"/>
+            </a:xfrm>
+            <a:prstGeom prst="rect">
+              <a:avLst/>
+            </a:prstGeom>
+            <a:noFill/>
+          </p:spPr>
+          <p:txBody>
+            <a:bodyPr wrap="square" rtlCol="0">
+              <a:spAutoFit/>
+            </a:bodyPr>
+            <a:lstStyle/>
+            <a:p>
+              <a:pPr algn="ctr">
+                <a:spcAft>
+                  <a:spcPts val="0"/>
+                </a:spcAft>
+              </a:pPr>
+              <a:r>
+                <a:rPr lang="en-US" sz="1000" kern="1200">
+                  <a:solidFill>
+                    <a:srgbClr val="000000"/>
+                  </a:solidFill>
+                  <a:effectLst/>
+                  <a:latin typeface="Calibri" panose="020F0502020204030204" pitchFamily="34" charset="0"/>
+                  <a:ea typeface="新細明體" panose="02020500000000000000" pitchFamily="18" charset="-120"/>
+                  <a:cs typeface="Times New Roman" panose="02020603050405020304" pitchFamily="18" charset="0"/>
+                </a:rPr>
+                <a:t>App Control</a:t>
+              </a:r>
+              <a:endParaRPr lang="zh-TW" sz="1200" kern="100">
+                <a:effectLst/>
+                <a:latin typeface="Calibri" panose="020F0502020204030204" pitchFamily="34" charset="0"/>
+                <a:ea typeface="新細明體" panose="02020500000000000000" pitchFamily="18" charset="-120"/>
+                <a:cs typeface="Times New Roman" panose="02020603050405020304" pitchFamily="18" charset="0"/>
+              </a:endParaRPr>
+            </a:p>
+          </p:txBody>
+        </p:sp>
+        <p:sp>
+          <p:nvSpPr>
+            <p:cNvPr id="26" name="文字方塊 36">
+              <a:extLst>
+                <a:ext uri="{FF2B5EF4-FFF2-40B4-BE49-F238E27FC236}">
+                  <a16:creationId xmlns:a16="http://schemas.microsoft.com/office/drawing/2014/main" xmlns="" id="{08004940-6C7D-4954-BBCF-80D9E8EA0C67}"/>
+                </a:ext>
+              </a:extLst>
+            </p:cNvPr>
+            <p:cNvSpPr txBox="1"/>
+            <p:nvPr/>
+          </p:nvSpPr>
+          <p:spPr>
+            <a:xfrm>
+              <a:off x="2830689" y="99060"/>
+              <a:ext cx="1126487" cy="320039"/>
+            </a:xfrm>
+            <a:prstGeom prst="rect">
+              <a:avLst/>
+            </a:prstGeom>
+            <a:noFill/>
+          </p:spPr>
+          <p:txBody>
+            <a:bodyPr wrap="square" rtlCol="0">
+              <a:spAutoFit/>
+            </a:bodyPr>
+            <a:lstStyle/>
+            <a:p>
+              <a:pPr algn="ctr">
+                <a:spcAft>
+                  <a:spcPts val="0"/>
+                </a:spcAft>
+              </a:pPr>
+              <a:r>
+                <a:rPr lang="en-US" sz="1000" kern="1200" dirty="0">
+                  <a:solidFill>
+                    <a:srgbClr val="000000"/>
+                  </a:solidFill>
+                  <a:effectLst/>
+                  <a:latin typeface="Calibri" panose="020F0502020204030204" pitchFamily="34" charset="0"/>
+                  <a:ea typeface="新細明體" panose="02020500000000000000" pitchFamily="18" charset="-120"/>
+                  <a:cs typeface="Times New Roman" panose="02020603050405020304" pitchFamily="18" charset="0"/>
+                </a:rPr>
+                <a:t>Driver Control</a:t>
+              </a:r>
+              <a:endParaRPr lang="zh-TW" sz="1200" kern="100" dirty="0">
+                <a:effectLst/>
+                <a:latin typeface="Calibri" panose="020F0502020204030204" pitchFamily="34" charset="0"/>
+                <a:ea typeface="新細明體" panose="02020500000000000000" pitchFamily="18" charset="-120"/>
+                <a:cs typeface="Times New Roman" panose="02020603050405020304" pitchFamily="18" charset="0"/>
+              </a:endParaRPr>
+            </a:p>
+          </p:txBody>
+        </p:sp>
+        <p:sp>
+          <p:nvSpPr>
+            <p:cNvPr id="27" name="矩形 26">
+              <a:extLst>
+                <a:ext uri="{FF2B5EF4-FFF2-40B4-BE49-F238E27FC236}">
+                  <a16:creationId xmlns:a16="http://schemas.microsoft.com/office/drawing/2014/main" xmlns="" id="{593B1AC8-2BA4-4629-A20F-3D317229169E}"/>
+                </a:ext>
+              </a:extLst>
+            </p:cNvPr>
+            <p:cNvSpPr/>
+            <p:nvPr/>
+          </p:nvSpPr>
+          <p:spPr>
+            <a:xfrm>
+              <a:off x="3569970" y="587829"/>
+              <a:ext cx="1679997" cy="598056"/>
+            </a:xfrm>
+            <a:prstGeom prst="rect">
+              <a:avLst/>
+            </a:prstGeom>
+            <a:ln>
+              <a:noFill/>
+            </a:ln>
+          </p:spPr>
+          <p:style>
+            <a:lnRef idx="2">
+              <a:schemeClr val="accent1">
+                <a:shade val="50000"/>
+              </a:schemeClr>
+            </a:lnRef>
+            <a:fillRef idx="1">
+              <a:schemeClr val="accent1"/>
+            </a:fillRef>
+            <a:effectRef idx="0">
+              <a:schemeClr val="accent1"/>
+            </a:effectRef>
+            <a:fontRef idx="minor">
+              <a:schemeClr val="lt1"/>
+            </a:fontRef>
+          </p:style>
+          <p:txBody>
+            <a:bodyPr rot="0" spcFirstLastPara="0" vert="horz" wrap="square" lIns="91440" tIns="45720" rIns="91440" bIns="45720" numCol="1" spcCol="0" rtlCol="0" fromWordArt="0" anchor="ctr" anchorCtr="0" forceAA="0" compatLnSpc="1">
+              <a:prstTxWarp prst="textNoShape">
+                <a:avLst/>
+              </a:prstTxWarp>
+              <a:noAutofit/>
+            </a:bodyPr>
+            <a:lstStyle/>
+            <a:p>
+              <a:pPr algn="ctr">
+                <a:spcAft>
+                  <a:spcPts val="0"/>
+                </a:spcAft>
+              </a:pPr>
+              <a:r>
+                <a:rPr lang="en-US" sz="1000" kern="1200">
+                  <a:solidFill>
+                    <a:srgbClr val="000000"/>
+                  </a:solidFill>
+                  <a:effectLst/>
+                  <a:ea typeface="新細明體" panose="02020500000000000000" pitchFamily="18" charset="-120"/>
+                  <a:cs typeface="Times New Roman" panose="02020603050405020304" pitchFamily="18" charset="0"/>
+                </a:rPr>
+                <a:t>System Memory</a:t>
+              </a:r>
+              <a:endParaRPr lang="zh-TW" sz="1200" kern="100">
+                <a:effectLst/>
+                <a:ea typeface="新細明體" panose="02020500000000000000" pitchFamily="18" charset="-120"/>
+                <a:cs typeface="Times New Roman" panose="02020603050405020304" pitchFamily="18" charset="0"/>
+              </a:endParaRPr>
+            </a:p>
+          </p:txBody>
+        </p:sp>
+        <p:sp>
+          <p:nvSpPr>
+            <p:cNvPr id="28" name="矩形 27">
+              <a:extLst>
+                <a:ext uri="{FF2B5EF4-FFF2-40B4-BE49-F238E27FC236}">
+                  <a16:creationId xmlns:a16="http://schemas.microsoft.com/office/drawing/2014/main" xmlns="" id="{705CFAEE-D37B-4CEA-942C-262BAC9CA5AD}"/>
+                </a:ext>
+              </a:extLst>
+            </p:cNvPr>
+            <p:cNvSpPr/>
+            <p:nvPr/>
+          </p:nvSpPr>
+          <p:spPr>
+            <a:xfrm>
+              <a:off x="3569970" y="1899466"/>
+              <a:ext cx="1669617" cy="598056"/>
+            </a:xfrm>
+            <a:prstGeom prst="rect">
+              <a:avLst/>
+            </a:prstGeom>
+            <a:solidFill>
+              <a:schemeClr val="accent2"/>
+            </a:solidFill>
+            <a:ln>
+              <a:noFill/>
+            </a:ln>
+          </p:spPr>
+          <p:style>
+            <a:lnRef idx="2">
+              <a:schemeClr val="accent1">
+                <a:shade val="50000"/>
+              </a:schemeClr>
+            </a:lnRef>
+            <a:fillRef idx="1">
+              <a:schemeClr val="accent1"/>
+            </a:fillRef>
+            <a:effectRef idx="0">
+              <a:schemeClr val="accent1"/>
+            </a:effectRef>
+            <a:fontRef idx="minor">
+              <a:schemeClr val="lt1"/>
+            </a:fontRef>
+          </p:style>
+          <p:txBody>
+            <a:bodyPr rot="0" spcFirstLastPara="0" vert="horz" wrap="square" lIns="91440" tIns="45720" rIns="91440" bIns="45720" numCol="1" spcCol="0" rtlCol="0" fromWordArt="0" anchor="ctr" anchorCtr="0" forceAA="0" compatLnSpc="1">
+              <a:prstTxWarp prst="textNoShape">
+                <a:avLst/>
+              </a:prstTxWarp>
+              <a:noAutofit/>
+            </a:bodyPr>
+            <a:lstStyle/>
+            <a:p>
+              <a:pPr algn="ctr">
+                <a:spcAft>
+                  <a:spcPts val="0"/>
+                </a:spcAft>
+              </a:pPr>
+              <a:r>
+                <a:rPr lang="en-US" sz="1000" kern="1200" dirty="0" smtClean="0">
+                  <a:solidFill>
+                    <a:srgbClr val="000000"/>
+                  </a:solidFill>
+                  <a:effectLst/>
+                  <a:ea typeface="新細明體" panose="02020500000000000000" pitchFamily="18" charset="-120"/>
+                  <a:cs typeface="Times New Roman" panose="02020603050405020304" pitchFamily="18" charset="0"/>
+                </a:rPr>
+                <a:t>Video </a:t>
+              </a:r>
+              <a:r>
+                <a:rPr lang="en-US" sz="1000" kern="1200" dirty="0">
+                  <a:solidFill>
+                    <a:srgbClr val="000000"/>
+                  </a:solidFill>
+                  <a:effectLst/>
+                  <a:ea typeface="新細明體" panose="02020500000000000000" pitchFamily="18" charset="-120"/>
+                  <a:cs typeface="Times New Roman" panose="02020603050405020304" pitchFamily="18" charset="0"/>
+                </a:rPr>
+                <a:t>Memory</a:t>
+              </a:r>
+              <a:endParaRPr lang="zh-TW" sz="1200" kern="100" dirty="0">
+                <a:effectLst/>
+                <a:ea typeface="新細明體" panose="02020500000000000000" pitchFamily="18" charset="-120"/>
+                <a:cs typeface="Times New Roman" panose="02020603050405020304" pitchFamily="18" charset="0"/>
+              </a:endParaRPr>
+            </a:p>
+          </p:txBody>
+        </p:sp>
+        <p:cxnSp>
+          <p:nvCxnSpPr>
+            <p:cNvPr id="29" name="直線單箭頭接點 28">
+              <a:extLst>
+                <a:ext uri="{FF2B5EF4-FFF2-40B4-BE49-F238E27FC236}">
+                  <a16:creationId xmlns:a16="http://schemas.microsoft.com/office/drawing/2014/main" xmlns="" id="{62222B00-4E84-4A90-BEA4-9AB53E4FF512}"/>
+                </a:ext>
+              </a:extLst>
+            </p:cNvPr>
+            <p:cNvCxnSpPr>
+              <a:cxnSpLocks/>
+              <a:stCxn id="27" idx="2"/>
+              <a:endCxn id="28" idx="0"/>
+            </p:cNvCxnSpPr>
+            <p:nvPr/>
+          </p:nvCxnSpPr>
+          <p:spPr>
+            <a:xfrm flipH="1">
+              <a:off x="4404779" y="1185885"/>
+              <a:ext cx="5190" cy="713581"/>
+            </a:xfrm>
+            <a:prstGeom prst="straightConnector1">
+              <a:avLst/>
+            </a:prstGeom>
+            <a:ln w="25400">
+              <a:solidFill>
+                <a:schemeClr val="tx1"/>
+              </a:solidFill>
+              <a:tailEnd type="triangle"/>
+            </a:ln>
+          </p:spPr>
+          <p:style>
+            <a:lnRef idx="1">
+              <a:schemeClr val="accent1"/>
+            </a:lnRef>
+            <a:fillRef idx="0">
+              <a:schemeClr val="accent1"/>
+            </a:fillRef>
+            <a:effectRef idx="0">
+              <a:schemeClr val="accent1"/>
+            </a:effectRef>
+            <a:fontRef idx="minor">
+              <a:schemeClr val="tx1"/>
+            </a:fontRef>
+          </p:style>
+        </p:cxnSp>
+        <p:sp>
+          <p:nvSpPr>
+            <p:cNvPr id="30" name="矩形 29">
+              <a:extLst>
+                <a:ext uri="{FF2B5EF4-FFF2-40B4-BE49-F238E27FC236}">
+                  <a16:creationId xmlns:a16="http://schemas.microsoft.com/office/drawing/2014/main" xmlns="" id="{F5049C11-3FFC-4708-A425-6AAD08EE0A1B}"/>
+                </a:ext>
+              </a:extLst>
+            </p:cNvPr>
+            <p:cNvSpPr/>
+            <p:nvPr/>
+          </p:nvSpPr>
+          <p:spPr>
+            <a:xfrm>
+              <a:off x="456468" y="1289840"/>
+              <a:ext cx="2189013" cy="536067"/>
+            </a:xfrm>
+            <a:prstGeom prst="rect">
+              <a:avLst/>
+            </a:prstGeom>
+            <a:noFill/>
+            <a:ln w="12700">
+              <a:solidFill>
+                <a:schemeClr val="accent1"/>
+              </a:solidFill>
+              <a:prstDash val="dash"/>
+            </a:ln>
+          </p:spPr>
+          <p:style>
+            <a:lnRef idx="2">
+              <a:schemeClr val="accent1">
+                <a:shade val="50000"/>
+              </a:schemeClr>
+            </a:lnRef>
+            <a:fillRef idx="1">
+              <a:schemeClr val="accent1"/>
+            </a:fillRef>
+            <a:effectRef idx="0">
+              <a:schemeClr val="accent1"/>
+            </a:effectRef>
+            <a:fontRef idx="minor">
+              <a:schemeClr val="lt1"/>
+            </a:fontRef>
+          </p:style>
+          <p:txBody>
+            <a:bodyPr rot="0" spcFirstLastPara="0" vert="horz" wrap="square" lIns="91440" tIns="45720" rIns="91440" bIns="45720" numCol="1" spcCol="0" rtlCol="0" fromWordArt="0" anchor="ctr" anchorCtr="0" forceAA="0" compatLnSpc="1">
+              <a:prstTxWarp prst="textNoShape">
+                <a:avLst/>
+              </a:prstTxWarp>
+              <a:noAutofit/>
+            </a:bodyPr>
+            <a:lstStyle/>
+            <a:p>
+              <a:pPr algn="ctr">
+                <a:spcAft>
+                  <a:spcPts val="0"/>
+                </a:spcAft>
+              </a:pPr>
+              <a:r>
+                <a:rPr lang="en-US" sz="1000" kern="1200">
+                  <a:solidFill>
+                    <a:srgbClr val="000000"/>
+                  </a:solidFill>
+                  <a:effectLst/>
+                  <a:ea typeface="新細明體" panose="02020500000000000000" pitchFamily="18" charset="-120"/>
+                  <a:cs typeface="Times New Roman" panose="02020603050405020304" pitchFamily="18" charset="0"/>
+                </a:rPr>
+                <a:t>Parse or prepare data and save it at the allocated space.</a:t>
+              </a:r>
+              <a:endParaRPr lang="zh-TW" sz="1200" kern="100">
+                <a:effectLst/>
+                <a:ea typeface="新細明體" panose="02020500000000000000" pitchFamily="18" charset="-120"/>
+                <a:cs typeface="Times New Roman" panose="02020603050405020304" pitchFamily="18" charset="0"/>
+              </a:endParaRPr>
+            </a:p>
+          </p:txBody>
+        </p:sp>
+        <p:cxnSp>
+          <p:nvCxnSpPr>
+            <p:cNvPr id="33" name="直線單箭頭接點 32">
+              <a:extLst>
+                <a:ext uri="{FF2B5EF4-FFF2-40B4-BE49-F238E27FC236}">
+                  <a16:creationId xmlns:a16="http://schemas.microsoft.com/office/drawing/2014/main" xmlns="" id="{98D0467B-CEFB-4ED9-B899-1F0C3D522951}"/>
+                </a:ext>
+              </a:extLst>
+            </p:cNvPr>
+            <p:cNvCxnSpPr>
+              <a:cxnSpLocks/>
+              <a:stCxn id="30" idx="3"/>
+              <a:endCxn id="27" idx="1"/>
+            </p:cNvCxnSpPr>
+            <p:nvPr/>
+          </p:nvCxnSpPr>
+          <p:spPr>
+            <a:xfrm flipV="1">
+              <a:off x="2645481" y="886857"/>
+              <a:ext cx="924489" cy="671017"/>
+            </a:xfrm>
+            <a:prstGeom prst="straightConnector1">
+              <a:avLst/>
+            </a:prstGeom>
+            <a:ln w="9525">
+              <a:solidFill>
+                <a:schemeClr val="tx1"/>
+              </a:solidFill>
+              <a:prstDash val="sysDash"/>
+              <a:tailEnd type="triangle"/>
+            </a:ln>
+          </p:spPr>
+          <p:style>
+            <a:lnRef idx="1">
+              <a:schemeClr val="accent1"/>
+            </a:lnRef>
+            <a:fillRef idx="0">
+              <a:schemeClr val="accent1"/>
+            </a:fillRef>
+            <a:effectRef idx="0">
+              <a:schemeClr val="accent1"/>
+            </a:effectRef>
+            <a:fontRef idx="minor">
+              <a:schemeClr val="tx1"/>
+            </a:fontRef>
+          </p:style>
+        </p:cxnSp>
+        <p:cxnSp>
+          <p:nvCxnSpPr>
+            <p:cNvPr id="35" name="直線單箭頭接點 34">
+              <a:extLst>
+                <a:ext uri="{FF2B5EF4-FFF2-40B4-BE49-F238E27FC236}">
+                  <a16:creationId xmlns:a16="http://schemas.microsoft.com/office/drawing/2014/main" xmlns="" id="{E0DA3599-A8A0-45E6-BF24-273411760A07}"/>
+                </a:ext>
+              </a:extLst>
+            </p:cNvPr>
+            <p:cNvCxnSpPr>
+              <a:cxnSpLocks/>
+              <a:stCxn id="40" idx="3"/>
+            </p:cNvCxnSpPr>
+            <p:nvPr/>
+          </p:nvCxnSpPr>
+          <p:spPr>
+            <a:xfrm flipV="1">
+              <a:off x="2645481" y="1536416"/>
+              <a:ext cx="1788800" cy="693073"/>
+            </a:xfrm>
+            <a:prstGeom prst="straightConnector1">
+              <a:avLst/>
+            </a:prstGeom>
+            <a:ln w="9525">
+              <a:solidFill>
+                <a:schemeClr val="tx1"/>
+              </a:solidFill>
+              <a:prstDash val="sysDash"/>
+              <a:tailEnd type="triangle"/>
+            </a:ln>
+          </p:spPr>
+          <p:style>
+            <a:lnRef idx="1">
+              <a:schemeClr val="accent1"/>
+            </a:lnRef>
+            <a:fillRef idx="0">
+              <a:schemeClr val="accent1"/>
+            </a:fillRef>
+            <a:effectRef idx="0">
+              <a:schemeClr val="accent1"/>
+            </a:effectRef>
+            <a:fontRef idx="minor">
+              <a:schemeClr val="tx1"/>
+            </a:fontRef>
+          </p:style>
+        </p:cxnSp>
+        <p:sp>
+          <p:nvSpPr>
+            <p:cNvPr id="40" name="矩形 39">
+              <a:extLst>
+                <a:ext uri="{FF2B5EF4-FFF2-40B4-BE49-F238E27FC236}">
+                  <a16:creationId xmlns:a16="http://schemas.microsoft.com/office/drawing/2014/main" xmlns="" id="{EC452C01-5DD3-4871-AB8A-EE90C8E65C5A}"/>
+                </a:ext>
+              </a:extLst>
+            </p:cNvPr>
+            <p:cNvSpPr/>
+            <p:nvPr/>
+          </p:nvSpPr>
+          <p:spPr>
+            <a:xfrm>
+              <a:off x="456468" y="1961455"/>
+              <a:ext cx="2189013" cy="536067"/>
+            </a:xfrm>
+            <a:prstGeom prst="rect">
+              <a:avLst/>
+            </a:prstGeom>
+            <a:noFill/>
+            <a:ln w="12700">
+              <a:solidFill>
+                <a:schemeClr val="accent1"/>
+              </a:solidFill>
+              <a:prstDash val="dash"/>
+            </a:ln>
+          </p:spPr>
+          <p:style>
+            <a:lnRef idx="2">
+              <a:schemeClr val="accent1">
+                <a:shade val="50000"/>
+              </a:schemeClr>
+            </a:lnRef>
+            <a:fillRef idx="1">
+              <a:schemeClr val="accent1"/>
+            </a:fillRef>
+            <a:effectRef idx="0">
+              <a:schemeClr val="accent1"/>
+            </a:effectRef>
+            <a:fontRef idx="minor">
+              <a:schemeClr val="lt1"/>
+            </a:fontRef>
+          </p:style>
+          <p:txBody>
+            <a:bodyPr rot="0" spcFirstLastPara="0" vert="horz" wrap="square" lIns="91440" tIns="45720" rIns="91440" bIns="45720" numCol="1" spcCol="0" rtlCol="0" fromWordArt="0" anchor="ctr" anchorCtr="0" forceAA="0" compatLnSpc="1">
+              <a:prstTxWarp prst="textNoShape">
+                <a:avLst/>
+              </a:prstTxWarp>
+              <a:noAutofit/>
+            </a:bodyPr>
+            <a:lstStyle/>
+            <a:p>
+              <a:pPr algn="ctr">
+                <a:spcAft>
+                  <a:spcPts val="0"/>
+                </a:spcAft>
+              </a:pPr>
+              <a:r>
+                <a:rPr lang="en-US" sz="1000" kern="1200">
+                  <a:solidFill>
+                    <a:srgbClr val="000000"/>
+                  </a:solidFill>
+                  <a:effectLst/>
+                  <a:ea typeface="新細明體" panose="02020500000000000000" pitchFamily="18" charset="-120"/>
+                  <a:cs typeface="Times New Roman" panose="02020603050405020304" pitchFamily="18" charset="0"/>
+                </a:rPr>
+                <a:t>Record graphics API for buffer copying and then submit to queue. </a:t>
+              </a:r>
+              <a:endParaRPr lang="zh-TW" sz="1200" kern="100">
+                <a:effectLst/>
+                <a:ea typeface="新細明體" panose="02020500000000000000" pitchFamily="18" charset="-120"/>
+                <a:cs typeface="Times New Roman" panose="02020603050405020304" pitchFamily="18" charset="0"/>
+              </a:endParaRPr>
+            </a:p>
+          </p:txBody>
+        </p:sp>
+        <p:sp>
+          <p:nvSpPr>
+            <p:cNvPr id="42" name="矩形 41">
+              <a:extLst>
+                <a:ext uri="{FF2B5EF4-FFF2-40B4-BE49-F238E27FC236}">
+                  <a16:creationId xmlns:a16="http://schemas.microsoft.com/office/drawing/2014/main" xmlns="" id="{5A4154BA-927A-4FCE-BEF1-7619FA4F7BD5}"/>
+                </a:ext>
+              </a:extLst>
+            </p:cNvPr>
+            <p:cNvSpPr/>
+            <p:nvPr/>
+          </p:nvSpPr>
+          <p:spPr>
+            <a:xfrm>
+              <a:off x="483004" y="599259"/>
+              <a:ext cx="2189013" cy="536067"/>
+            </a:xfrm>
+            <a:prstGeom prst="rect">
+              <a:avLst/>
+            </a:prstGeom>
+            <a:noFill/>
+            <a:ln w="12700">
+              <a:solidFill>
+                <a:schemeClr val="accent1"/>
+              </a:solidFill>
+              <a:prstDash val="dash"/>
+            </a:ln>
+          </p:spPr>
+          <p:style>
+            <a:lnRef idx="2">
+              <a:schemeClr val="accent1">
+                <a:shade val="50000"/>
+              </a:schemeClr>
+            </a:lnRef>
+            <a:fillRef idx="1">
+              <a:schemeClr val="accent1"/>
+            </a:fillRef>
+            <a:effectRef idx="0">
+              <a:schemeClr val="accent1"/>
+            </a:effectRef>
+            <a:fontRef idx="minor">
+              <a:schemeClr val="lt1"/>
+            </a:fontRef>
+          </p:style>
+          <p:txBody>
+            <a:bodyPr rot="0" spcFirstLastPara="0" vert="horz" wrap="square" lIns="91440" tIns="45720" rIns="91440" bIns="45720" numCol="1" spcCol="0" rtlCol="0" fromWordArt="0" anchor="ctr" anchorCtr="0" forceAA="0" compatLnSpc="1">
+              <a:prstTxWarp prst="textNoShape">
+                <a:avLst/>
+              </a:prstTxWarp>
+              <a:noAutofit/>
+            </a:bodyPr>
+            <a:lstStyle/>
+            <a:p>
+              <a:pPr algn="ctr">
+                <a:spcAft>
+                  <a:spcPts val="0"/>
+                </a:spcAft>
+              </a:pPr>
+              <a:r>
+                <a:rPr lang="en-US" sz="1000" kern="1200">
+                  <a:solidFill>
+                    <a:srgbClr val="000000"/>
+                  </a:solidFill>
+                  <a:effectLst/>
+                  <a:ea typeface="新細明體" panose="02020500000000000000" pitchFamily="18" charset="-120"/>
+                  <a:cs typeface="Times New Roman" panose="02020603050405020304" pitchFamily="18" charset="0"/>
+                </a:rPr>
+                <a:t>Allocate system memory(host visible memory) with target size and map it for get address.</a:t>
+              </a:r>
+              <a:endParaRPr lang="zh-TW" sz="1200" kern="100">
+                <a:effectLst/>
+                <a:ea typeface="新細明體" panose="02020500000000000000" pitchFamily="18" charset="-120"/>
+                <a:cs typeface="Times New Roman" panose="02020603050405020304" pitchFamily="18" charset="0"/>
+              </a:endParaRPr>
+            </a:p>
+          </p:txBody>
+        </p:sp>
+        <p:cxnSp>
+          <p:nvCxnSpPr>
+            <p:cNvPr id="43" name="直線單箭頭接點 42">
+              <a:extLst>
+                <a:ext uri="{FF2B5EF4-FFF2-40B4-BE49-F238E27FC236}">
+                  <a16:creationId xmlns:a16="http://schemas.microsoft.com/office/drawing/2014/main" xmlns="" id="{733D9AB1-9CAB-44AB-9427-9B8AF8BBE6DD}"/>
+                </a:ext>
+              </a:extLst>
+            </p:cNvPr>
+            <p:cNvCxnSpPr>
+              <a:cxnSpLocks/>
+              <a:stCxn id="42" idx="3"/>
+              <a:endCxn id="27" idx="1"/>
+            </p:cNvCxnSpPr>
+            <p:nvPr/>
+          </p:nvCxnSpPr>
+          <p:spPr>
+            <a:xfrm>
+              <a:off x="2672017" y="867293"/>
+              <a:ext cx="897953" cy="19564"/>
+            </a:xfrm>
+            <a:prstGeom prst="straightConnector1">
+              <a:avLst/>
+            </a:prstGeom>
+            <a:ln w="9525">
+              <a:solidFill>
+                <a:schemeClr val="tx1"/>
+              </a:solidFill>
+              <a:prstDash val="sysDash"/>
+              <a:tailEnd type="triangle"/>
+            </a:ln>
+          </p:spPr>
+          <p:style>
+            <a:lnRef idx="1">
+              <a:schemeClr val="accent1"/>
+            </a:lnRef>
+            <a:fillRef idx="0">
+              <a:schemeClr val="accent1"/>
+            </a:fillRef>
+            <a:effectRef idx="0">
+              <a:schemeClr val="accent1"/>
+            </a:effectRef>
+            <a:fontRef idx="minor">
+              <a:schemeClr val="tx1"/>
+            </a:fontRef>
+          </p:style>
+        </p:cxnSp>
+        <p:sp>
+          <p:nvSpPr>
+            <p:cNvPr id="31" name="文字方塊 36">
+              <a:extLst>
+                <a:ext uri="{FF2B5EF4-FFF2-40B4-BE49-F238E27FC236}">
+                  <a16:creationId xmlns:a16="http://schemas.microsoft.com/office/drawing/2014/main" xmlns="" id="{08004940-6C7D-4954-BBCF-80D9E8EA0C67}"/>
+                </a:ext>
+              </a:extLst>
+            </p:cNvPr>
+            <p:cNvSpPr txBox="1"/>
+            <p:nvPr/>
+          </p:nvSpPr>
+          <p:spPr>
+            <a:xfrm>
+              <a:off x="4497079" y="1259417"/>
+              <a:ext cx="1126487" cy="553998"/>
+            </a:xfrm>
+            <a:prstGeom prst="rect">
+              <a:avLst/>
+            </a:prstGeom>
+            <a:noFill/>
+          </p:spPr>
+          <p:txBody>
+            <a:bodyPr wrap="square" rtlCol="0">
+              <a:spAutoFit/>
+            </a:bodyPr>
+            <a:lstStyle/>
+            <a:p>
+              <a:pPr algn="ctr">
+                <a:spcAft>
+                  <a:spcPts val="0"/>
+                </a:spcAft>
+              </a:pPr>
+              <a:r>
+                <a:rPr lang="en-US" altLang="zh-TW" sz="1000" dirty="0" smtClean="0">
+                  <a:solidFill>
+                    <a:srgbClr val="000000"/>
+                  </a:solidFill>
+                  <a:latin typeface="Calibri" panose="020F0502020204030204" pitchFamily="34" charset="0"/>
+                  <a:ea typeface="新細明體" panose="02020500000000000000" pitchFamily="18" charset="-120"/>
+                  <a:cs typeface="Times New Roman" panose="02020603050405020304" pitchFamily="18" charset="0"/>
+                </a:rPr>
+                <a:t>Execute buffer copying command</a:t>
+              </a:r>
+              <a:endParaRPr lang="zh-TW" sz="1200" kern="100" dirty="0">
+                <a:effectLst/>
+                <a:latin typeface="Calibri" panose="020F0502020204030204" pitchFamily="34" charset="0"/>
+                <a:ea typeface="新細明體" panose="02020500000000000000" pitchFamily="18" charset="-120"/>
+                <a:cs typeface="Times New Roman" panose="02020603050405020304" pitchFamily="18" charset="0"/>
+              </a:endParaRPr>
+            </a:p>
+          </p:txBody>
+        </p:sp>
+      </p:grpSp>
+      <p:grpSp>
+        <p:nvGrpSpPr>
+          <p:cNvPr id="121" name="群組 120"/>
+          <p:cNvGrpSpPr/>
+          <p:nvPr/>
+        </p:nvGrpSpPr>
+        <p:grpSpPr>
+          <a:xfrm>
+            <a:off x="7133243" y="794614"/>
+            <a:ext cx="4562369" cy="5571351"/>
+            <a:chOff x="7133243" y="794614"/>
+            <a:chExt cx="4562369" cy="5571351"/>
+          </a:xfrm>
+        </p:grpSpPr>
+        <p:sp>
+          <p:nvSpPr>
+            <p:cNvPr id="37" name="矩形 36">
+              <a:extLst>
+                <a:ext uri="{FF2B5EF4-FFF2-40B4-BE49-F238E27FC236}">
+                  <a16:creationId xmlns:a16="http://schemas.microsoft.com/office/drawing/2014/main" xmlns="" id="{BB66F52D-598F-4FB3-838D-E9AA82574BC9}"/>
+                </a:ext>
+              </a:extLst>
+            </p:cNvPr>
+            <p:cNvSpPr/>
+            <p:nvPr/>
+          </p:nvSpPr>
+          <p:spPr>
+            <a:xfrm>
+              <a:off x="7133243" y="794614"/>
+              <a:ext cx="4039854" cy="391272"/>
+            </a:xfrm>
+            <a:prstGeom prst="rect">
+              <a:avLst/>
+            </a:prstGeom>
+            <a:noFill/>
+            <a:ln w="38100">
+              <a:solidFill>
+                <a:schemeClr val="tx1"/>
+              </a:solidFill>
+            </a:ln>
+          </p:spPr>
+          <p:style>
+            <a:lnRef idx="2">
+              <a:schemeClr val="accent1">
+                <a:shade val="50000"/>
+              </a:schemeClr>
+            </a:lnRef>
+            <a:fillRef idx="1">
+              <a:schemeClr val="accent1"/>
+            </a:fillRef>
+            <a:effectRef idx="0">
+              <a:schemeClr val="accent1"/>
+            </a:effectRef>
+            <a:fontRef idx="minor">
+              <a:schemeClr val="lt1"/>
+            </a:fontRef>
+          </p:style>
+          <p:txBody>
+            <a:bodyPr rtlCol="0" anchor="ctr"/>
+            <a:lstStyle/>
+            <a:p>
+              <a:pPr algn="ctr"/>
+              <a:r>
+                <a:rPr lang="en-US" altLang="zh-TW" sz="1000" dirty="0" smtClean="0">
+                  <a:solidFill>
+                    <a:schemeClr val="tx1"/>
+                  </a:solidFill>
+                </a:rPr>
+                <a:t>Get physical device memory properties from device. </a:t>
+              </a:r>
+              <a:endParaRPr lang="en-US" altLang="zh-TW" sz="1000" dirty="0">
+                <a:solidFill>
+                  <a:schemeClr val="tx1"/>
+                </a:solidFill>
+              </a:endParaRPr>
+            </a:p>
+          </p:txBody>
+        </p:sp>
+        <p:sp>
+          <p:nvSpPr>
+            <p:cNvPr id="38" name="矩形 37">
+              <a:extLst>
+                <a:ext uri="{FF2B5EF4-FFF2-40B4-BE49-F238E27FC236}">
+                  <a16:creationId xmlns:a16="http://schemas.microsoft.com/office/drawing/2014/main" xmlns="" id="{BB66F52D-598F-4FB3-838D-E9AA82574BC9}"/>
+                </a:ext>
+              </a:extLst>
+            </p:cNvPr>
+            <p:cNvSpPr/>
+            <p:nvPr/>
+          </p:nvSpPr>
+          <p:spPr>
+            <a:xfrm>
+              <a:off x="7133243" y="1321501"/>
+              <a:ext cx="4039854" cy="391272"/>
+            </a:xfrm>
+            <a:prstGeom prst="rect">
+              <a:avLst/>
+            </a:prstGeom>
+            <a:noFill/>
+            <a:ln w="38100">
+              <a:solidFill>
+                <a:schemeClr val="tx1"/>
+              </a:solidFill>
+            </a:ln>
+          </p:spPr>
+          <p:style>
+            <a:lnRef idx="2">
+              <a:schemeClr val="accent1">
+                <a:shade val="50000"/>
+              </a:schemeClr>
+            </a:lnRef>
+            <a:fillRef idx="1">
+              <a:schemeClr val="accent1"/>
+            </a:fillRef>
+            <a:effectRef idx="0">
+              <a:schemeClr val="accent1"/>
+            </a:effectRef>
+            <a:fontRef idx="minor">
+              <a:schemeClr val="lt1"/>
+            </a:fontRef>
+          </p:style>
+          <p:txBody>
+            <a:bodyPr rtlCol="0" anchor="ctr"/>
+            <a:lstStyle/>
+            <a:p>
+              <a:pPr algn="ctr"/>
+              <a:r>
+                <a:rPr lang="en-US" altLang="zh-TW" sz="1000" dirty="0" smtClean="0">
+                  <a:solidFill>
+                    <a:schemeClr val="tx1"/>
+                  </a:solidFill>
+                </a:rPr>
+                <a:t>Get memory req</a:t>
+              </a:r>
+              <a:r>
+                <a:rPr lang="en-US" altLang="zh-TW" sz="1000" dirty="0" smtClean="0">
+                  <a:solidFill>
+                    <a:schemeClr val="tx1"/>
+                  </a:solidFill>
+                </a:rPr>
+                <a:t>uirement from </a:t>
+              </a:r>
+              <a:r>
+                <a:rPr lang="en-US" altLang="zh-TW" sz="1000" dirty="0" err="1" smtClean="0">
+                  <a:solidFill>
+                    <a:schemeClr val="tx1"/>
+                  </a:solidFill>
+                </a:rPr>
+                <a:t>VkBuffer</a:t>
+              </a:r>
+              <a:r>
+                <a:rPr lang="en-US" altLang="zh-TW" sz="1000" dirty="0" smtClean="0">
+                  <a:solidFill>
+                    <a:schemeClr val="tx1"/>
+                  </a:solidFill>
+                </a:rPr>
+                <a:t> or </a:t>
+              </a:r>
+              <a:r>
+                <a:rPr lang="en-US" altLang="zh-TW" sz="1000" dirty="0" err="1" smtClean="0">
+                  <a:solidFill>
+                    <a:schemeClr val="tx1"/>
+                  </a:solidFill>
+                </a:rPr>
+                <a:t>VkImage</a:t>
+              </a:r>
+              <a:r>
+                <a:rPr lang="en-US" altLang="zh-TW" sz="1000" dirty="0" smtClean="0">
+                  <a:solidFill>
+                    <a:schemeClr val="tx1"/>
+                  </a:solidFill>
+                </a:rPr>
+                <a:t> by </a:t>
+              </a:r>
+              <a:r>
+                <a:rPr lang="en-US" altLang="zh-TW" sz="1000" b="1" dirty="0" err="1" smtClean="0">
+                  <a:solidFill>
+                    <a:schemeClr val="accent6">
+                      <a:lumMod val="60000"/>
+                      <a:lumOff val="40000"/>
+                    </a:schemeClr>
+                  </a:solidFill>
+                </a:rPr>
+                <a:t>vkGet</a:t>
+              </a:r>
+              <a:r>
+                <a:rPr lang="en-US" altLang="zh-TW" sz="1000" b="1" dirty="0" smtClean="0">
+                  <a:solidFill>
+                    <a:schemeClr val="accent6">
+                      <a:lumMod val="60000"/>
+                      <a:lumOff val="40000"/>
+                    </a:schemeClr>
+                  </a:solidFill>
+                </a:rPr>
+                <a:t>[</a:t>
+              </a:r>
+              <a:r>
+                <a:rPr lang="en-US" altLang="zh-TW" sz="1000" b="1" dirty="0" err="1" smtClean="0">
+                  <a:solidFill>
+                    <a:schemeClr val="accent6">
+                      <a:lumMod val="60000"/>
+                      <a:lumOff val="40000"/>
+                    </a:schemeClr>
+                  </a:solidFill>
+                </a:rPr>
+                <a:t>Buffer|Image</a:t>
+              </a:r>
+              <a:r>
+                <a:rPr lang="en-US" altLang="zh-TW" sz="1000" b="1" dirty="0" smtClean="0">
+                  <a:solidFill>
+                    <a:schemeClr val="accent6">
+                      <a:lumMod val="60000"/>
+                      <a:lumOff val="40000"/>
+                    </a:schemeClr>
+                  </a:solidFill>
+                </a:rPr>
+                <a:t>]</a:t>
+              </a:r>
+              <a:r>
+                <a:rPr lang="en-US" altLang="zh-TW" sz="1000" b="1" dirty="0" err="1" smtClean="0">
+                  <a:solidFill>
+                    <a:schemeClr val="accent6">
+                      <a:lumMod val="60000"/>
+                      <a:lumOff val="40000"/>
+                    </a:schemeClr>
+                  </a:solidFill>
+                </a:rPr>
+                <a:t>MemoryRequirements</a:t>
+              </a:r>
+              <a:r>
+                <a:rPr lang="en-US" altLang="zh-TW" sz="1000" b="1" dirty="0" smtClean="0">
+                  <a:solidFill>
+                    <a:schemeClr val="tx1"/>
+                  </a:solidFill>
+                </a:rPr>
+                <a:t>.</a:t>
+              </a:r>
+              <a:endParaRPr lang="en-US" altLang="zh-TW" sz="1000" b="1" dirty="0">
+                <a:solidFill>
+                  <a:schemeClr val="tx1"/>
+                </a:solidFill>
+              </a:endParaRPr>
+            </a:p>
+          </p:txBody>
+        </p:sp>
+        <p:cxnSp>
+          <p:nvCxnSpPr>
+            <p:cNvPr id="44" name="直線單箭頭接點 43">
+              <a:extLst>
+                <a:ext uri="{FF2B5EF4-FFF2-40B4-BE49-F238E27FC236}">
+                  <a16:creationId xmlns:a16="http://schemas.microsoft.com/office/drawing/2014/main" xmlns="" id="{4FB8EBAA-F4EC-47ED-9056-64D509A67100}"/>
+                </a:ext>
+              </a:extLst>
+            </p:cNvPr>
+            <p:cNvCxnSpPr>
+              <a:stCxn id="37" idx="2"/>
+              <a:endCxn id="38" idx="0"/>
+            </p:cNvCxnSpPr>
+            <p:nvPr/>
+          </p:nvCxnSpPr>
+          <p:spPr>
+            <a:xfrm>
+              <a:off x="9153170" y="1185886"/>
+              <a:ext cx="0" cy="135615"/>
+            </a:xfrm>
+            <a:prstGeom prst="straightConnector1">
+              <a:avLst/>
+            </a:prstGeom>
+            <a:ln w="38100">
+              <a:solidFill>
+                <a:schemeClr val="tx1"/>
+              </a:solidFill>
+              <a:tailEnd type="triangle"/>
+            </a:ln>
+          </p:spPr>
+          <p:style>
+            <a:lnRef idx="1">
+              <a:schemeClr val="accent1"/>
+            </a:lnRef>
+            <a:fillRef idx="0">
+              <a:schemeClr val="accent1"/>
+            </a:fillRef>
+            <a:effectRef idx="0">
+              <a:schemeClr val="accent1"/>
+            </a:effectRef>
+            <a:fontRef idx="minor">
+              <a:schemeClr val="tx1"/>
+            </a:fontRef>
+          </p:style>
+        </p:cxnSp>
+        <p:cxnSp>
+          <p:nvCxnSpPr>
+            <p:cNvPr id="47" name="直線單箭頭接點 46">
+              <a:extLst>
+                <a:ext uri="{FF2B5EF4-FFF2-40B4-BE49-F238E27FC236}">
+                  <a16:creationId xmlns:a16="http://schemas.microsoft.com/office/drawing/2014/main" xmlns="" id="{4FB8EBAA-F4EC-47ED-9056-64D509A67100}"/>
+                </a:ext>
+              </a:extLst>
+            </p:cNvPr>
+            <p:cNvCxnSpPr>
+              <a:stCxn id="38" idx="2"/>
+              <a:endCxn id="55" idx="0"/>
+            </p:cNvCxnSpPr>
+            <p:nvPr/>
+          </p:nvCxnSpPr>
+          <p:spPr>
+            <a:xfrm>
+              <a:off x="9153170" y="1712773"/>
+              <a:ext cx="0" cy="148746"/>
+            </a:xfrm>
+            <a:prstGeom prst="straightConnector1">
+              <a:avLst/>
+            </a:prstGeom>
+            <a:ln w="38100">
+              <a:solidFill>
+                <a:schemeClr val="tx1"/>
+              </a:solidFill>
+              <a:tailEnd type="triangle"/>
+            </a:ln>
+          </p:spPr>
+          <p:style>
+            <a:lnRef idx="1">
+              <a:schemeClr val="accent1"/>
+            </a:lnRef>
+            <a:fillRef idx="0">
+              <a:schemeClr val="accent1"/>
+            </a:fillRef>
+            <a:effectRef idx="0">
+              <a:schemeClr val="accent1"/>
+            </a:effectRef>
+            <a:fontRef idx="minor">
+              <a:schemeClr val="tx1"/>
+            </a:fontRef>
+          </p:style>
+        </p:cxnSp>
+        <p:sp>
+          <p:nvSpPr>
+            <p:cNvPr id="55" name="矩形 54">
+              <a:extLst>
+                <a:ext uri="{FF2B5EF4-FFF2-40B4-BE49-F238E27FC236}">
+                  <a16:creationId xmlns:a16="http://schemas.microsoft.com/office/drawing/2014/main" xmlns="" id="{BB66F52D-598F-4FB3-838D-E9AA82574BC9}"/>
+                </a:ext>
+              </a:extLst>
+            </p:cNvPr>
+            <p:cNvSpPr/>
+            <p:nvPr/>
+          </p:nvSpPr>
+          <p:spPr>
+            <a:xfrm>
+              <a:off x="7133243" y="1861519"/>
+              <a:ext cx="4039854" cy="391272"/>
+            </a:xfrm>
+            <a:prstGeom prst="rect">
+              <a:avLst/>
+            </a:prstGeom>
+            <a:noFill/>
+            <a:ln w="38100">
+              <a:solidFill>
+                <a:schemeClr val="tx1"/>
+              </a:solidFill>
+            </a:ln>
+          </p:spPr>
+          <p:style>
+            <a:lnRef idx="2">
+              <a:schemeClr val="accent1">
+                <a:shade val="50000"/>
+              </a:schemeClr>
+            </a:lnRef>
+            <a:fillRef idx="1">
+              <a:schemeClr val="accent1"/>
+            </a:fillRef>
+            <a:effectRef idx="0">
+              <a:schemeClr val="accent1"/>
+            </a:effectRef>
+            <a:fontRef idx="minor">
+              <a:schemeClr val="lt1"/>
+            </a:fontRef>
+          </p:style>
+          <p:txBody>
+            <a:bodyPr rtlCol="0" anchor="ctr"/>
+            <a:lstStyle/>
+            <a:p>
+              <a:pPr algn="ctr"/>
+              <a:r>
+                <a:rPr lang="en-US" altLang="zh-TW" sz="1000" dirty="0" smtClean="0">
+                  <a:solidFill>
+                    <a:schemeClr val="tx1"/>
+                  </a:solidFill>
+                </a:rPr>
+                <a:t>Check all memory types recorded in physical device memory properties in this device.</a:t>
+              </a:r>
+              <a:endParaRPr lang="en-US" altLang="zh-TW" sz="1000" dirty="0">
+                <a:solidFill>
+                  <a:schemeClr val="tx1"/>
+                </a:solidFill>
+              </a:endParaRPr>
+            </a:p>
+          </p:txBody>
+        </p:sp>
+        <p:sp>
+          <p:nvSpPr>
+            <p:cNvPr id="56" name="菱形 55"/>
+            <p:cNvSpPr/>
+            <p:nvPr/>
+          </p:nvSpPr>
+          <p:spPr>
+            <a:xfrm>
+              <a:off x="8275781" y="2401728"/>
+              <a:ext cx="1754777" cy="733358"/>
+            </a:xfrm>
+            <a:prstGeom prst="diamond">
+              <a:avLst/>
+            </a:prstGeom>
+            <a:noFill/>
+            <a:ln w="38100">
+              <a:solidFill>
+                <a:schemeClr val="tx1"/>
+              </a:solidFill>
+            </a:ln>
+          </p:spPr>
+          <p:style>
+            <a:lnRef idx="2">
+              <a:schemeClr val="accent1">
+                <a:shade val="50000"/>
+              </a:schemeClr>
+            </a:lnRef>
+            <a:fillRef idx="1">
+              <a:schemeClr val="accent1"/>
+            </a:fillRef>
+            <a:effectRef idx="0">
+              <a:schemeClr val="accent1"/>
+            </a:effectRef>
+            <a:fontRef idx="minor">
+              <a:schemeClr val="lt1"/>
+            </a:fontRef>
+          </p:style>
+          <p:txBody>
+            <a:bodyPr rtlCol="0" anchor="ctr"/>
+            <a:lstStyle/>
+            <a:p>
+              <a:pPr algn="ctr"/>
+              <a:r>
+                <a:rPr lang="en-US" altLang="zh-TW" sz="1000" dirty="0" smtClean="0">
+                  <a:solidFill>
+                    <a:schemeClr val="tx1"/>
+                  </a:solidFill>
+                </a:rPr>
+                <a:t>Is all memory types checked ?</a:t>
+              </a:r>
+              <a:endParaRPr lang="zh-TW" altLang="en-US" sz="1000" dirty="0">
+                <a:solidFill>
+                  <a:schemeClr val="tx1"/>
+                </a:solidFill>
+              </a:endParaRPr>
+            </a:p>
+          </p:txBody>
+        </p:sp>
+        <p:cxnSp>
+          <p:nvCxnSpPr>
+            <p:cNvPr id="57" name="直線單箭頭接點 56">
+              <a:extLst>
+                <a:ext uri="{FF2B5EF4-FFF2-40B4-BE49-F238E27FC236}">
+                  <a16:creationId xmlns:a16="http://schemas.microsoft.com/office/drawing/2014/main" xmlns="" id="{4FB8EBAA-F4EC-47ED-9056-64D509A67100}"/>
+                </a:ext>
+              </a:extLst>
+            </p:cNvPr>
+            <p:cNvCxnSpPr>
+              <a:stCxn id="55" idx="2"/>
+              <a:endCxn id="56" idx="0"/>
+            </p:cNvCxnSpPr>
+            <p:nvPr/>
+          </p:nvCxnSpPr>
+          <p:spPr>
+            <a:xfrm>
+              <a:off x="9153170" y="2252791"/>
+              <a:ext cx="0" cy="148937"/>
+            </a:xfrm>
+            <a:prstGeom prst="straightConnector1">
+              <a:avLst/>
+            </a:prstGeom>
+            <a:ln w="38100">
+              <a:solidFill>
+                <a:schemeClr val="tx1"/>
+              </a:solidFill>
+              <a:tailEnd type="triangle"/>
+            </a:ln>
+          </p:spPr>
+          <p:style>
+            <a:lnRef idx="1">
+              <a:schemeClr val="accent1"/>
+            </a:lnRef>
+            <a:fillRef idx="0">
+              <a:schemeClr val="accent1"/>
+            </a:fillRef>
+            <a:effectRef idx="0">
+              <a:schemeClr val="accent1"/>
+            </a:effectRef>
+            <a:fontRef idx="minor">
+              <a:schemeClr val="tx1"/>
+            </a:fontRef>
+          </p:style>
+        </p:cxnSp>
+        <p:cxnSp>
+          <p:nvCxnSpPr>
+            <p:cNvPr id="60" name="肘形接點 59"/>
+            <p:cNvCxnSpPr>
+              <a:stCxn id="56" idx="1"/>
+            </p:cNvCxnSpPr>
+            <p:nvPr/>
+          </p:nvCxnSpPr>
+          <p:spPr>
+            <a:xfrm rot="10800000" flipV="1">
+              <a:off x="7410995" y="2768406"/>
+              <a:ext cx="864787" cy="3597559"/>
+            </a:xfrm>
+            <a:prstGeom prst="bentConnector2">
+              <a:avLst/>
+            </a:prstGeom>
+            <a:ln w="38100">
+              <a:solidFill>
+                <a:schemeClr val="tx1"/>
+              </a:solidFill>
+              <a:tailEnd type="arrow"/>
+            </a:ln>
+          </p:spPr>
+          <p:style>
+            <a:lnRef idx="1">
+              <a:schemeClr val="accent1"/>
+            </a:lnRef>
+            <a:fillRef idx="0">
+              <a:schemeClr val="accent1"/>
+            </a:fillRef>
+            <a:effectRef idx="0">
+              <a:schemeClr val="accent1"/>
+            </a:effectRef>
+            <a:fontRef idx="minor">
+              <a:schemeClr val="tx1"/>
+            </a:fontRef>
+          </p:style>
+        </p:cxnSp>
+        <p:sp>
+          <p:nvSpPr>
+            <p:cNvPr id="65" name="矩形 64">
+              <a:extLst>
+                <a:ext uri="{FF2B5EF4-FFF2-40B4-BE49-F238E27FC236}">
+                  <a16:creationId xmlns:a16="http://schemas.microsoft.com/office/drawing/2014/main" xmlns="" id="{BB66F52D-598F-4FB3-838D-E9AA82574BC9}"/>
+                </a:ext>
+              </a:extLst>
+            </p:cNvPr>
+            <p:cNvSpPr/>
+            <p:nvPr/>
+          </p:nvSpPr>
+          <p:spPr>
+            <a:xfrm>
+              <a:off x="7944657" y="3290113"/>
+              <a:ext cx="2417025" cy="685045"/>
+            </a:xfrm>
+            <a:prstGeom prst="rect">
+              <a:avLst/>
+            </a:prstGeom>
+            <a:noFill/>
+            <a:ln w="38100">
+              <a:solidFill>
+                <a:schemeClr val="tx1"/>
+              </a:solidFill>
+            </a:ln>
+          </p:spPr>
+          <p:style>
+            <a:lnRef idx="2">
+              <a:schemeClr val="accent1">
+                <a:shade val="50000"/>
+              </a:schemeClr>
+            </a:lnRef>
+            <a:fillRef idx="1">
+              <a:schemeClr val="accent1"/>
+            </a:fillRef>
+            <a:effectRef idx="0">
+              <a:schemeClr val="accent1"/>
+            </a:effectRef>
+            <a:fontRef idx="minor">
+              <a:schemeClr val="lt1"/>
+            </a:fontRef>
+          </p:style>
+          <p:txBody>
+            <a:bodyPr rtlCol="0" anchor="ctr"/>
+            <a:lstStyle/>
+            <a:p>
+              <a:pPr algn="ctr"/>
+              <a:r>
+                <a:rPr lang="en-US" altLang="zh-TW" sz="1000" dirty="0" smtClean="0">
+                  <a:solidFill>
+                    <a:schemeClr val="tx1"/>
+                  </a:solidFill>
+                </a:rPr>
+                <a:t>Check </a:t>
+              </a:r>
+              <a:r>
+                <a:rPr lang="en-US" altLang="zh-TW" sz="1000" b="1" dirty="0" err="1">
+                  <a:solidFill>
+                    <a:schemeClr val="accent6">
+                      <a:lumMod val="60000"/>
+                      <a:lumOff val="40000"/>
+                    </a:schemeClr>
+                  </a:solidFill>
+                </a:rPr>
+                <a:t>memoryTypeBits</a:t>
+              </a:r>
+              <a:r>
+                <a:rPr lang="en-US" altLang="zh-TW" sz="1000" b="1" dirty="0">
+                  <a:solidFill>
+                    <a:schemeClr val="accent6">
+                      <a:lumMod val="60000"/>
+                      <a:lumOff val="40000"/>
+                    </a:schemeClr>
+                  </a:solidFill>
+                </a:rPr>
+                <a:t> </a:t>
+              </a:r>
+              <a:r>
+                <a:rPr lang="en-US" altLang="zh-TW" sz="1000" b="1" dirty="0" smtClean="0">
+                  <a:solidFill>
+                    <a:schemeClr val="accent6">
+                      <a:lumMod val="60000"/>
+                      <a:lumOff val="40000"/>
+                    </a:schemeClr>
+                  </a:solidFill>
+                </a:rPr>
+                <a:t> </a:t>
+              </a:r>
+              <a:r>
+                <a:rPr lang="en-US" altLang="zh-TW" sz="1000" dirty="0" smtClean="0">
+                  <a:solidFill>
+                    <a:schemeClr val="tx1"/>
+                  </a:solidFill>
+                </a:rPr>
+                <a:t>of </a:t>
+              </a:r>
+              <a:r>
+                <a:rPr lang="en-US" altLang="zh-TW" sz="1000" b="1" dirty="0" smtClean="0">
+                  <a:solidFill>
+                    <a:schemeClr val="accent6">
+                      <a:lumMod val="60000"/>
+                      <a:lumOff val="40000"/>
+                    </a:schemeClr>
+                  </a:solidFill>
+                </a:rPr>
+                <a:t>requirement</a:t>
+              </a:r>
+              <a:r>
+                <a:rPr lang="en-US" altLang="zh-TW" sz="1000" dirty="0" smtClean="0">
+                  <a:solidFill>
+                    <a:schemeClr val="accent6">
+                      <a:lumMod val="60000"/>
+                      <a:lumOff val="40000"/>
+                    </a:schemeClr>
+                  </a:solidFill>
+                </a:rPr>
+                <a:t> </a:t>
+              </a:r>
+              <a:r>
+                <a:rPr lang="en-US" altLang="zh-TW" sz="1000" dirty="0" smtClean="0">
+                  <a:solidFill>
+                    <a:schemeClr val="tx1"/>
+                  </a:solidFill>
+                </a:rPr>
+                <a:t> contains this memory type and the memory props of this type contain our specified memory props. </a:t>
+              </a:r>
+              <a:endParaRPr lang="en-US" altLang="zh-TW" sz="1000" dirty="0">
+                <a:solidFill>
+                  <a:schemeClr val="tx1"/>
+                </a:solidFill>
+              </a:endParaRPr>
+            </a:p>
+          </p:txBody>
+        </p:sp>
+        <p:sp>
+          <p:nvSpPr>
+            <p:cNvPr id="66" name="菱形 65"/>
+            <p:cNvSpPr/>
+            <p:nvPr/>
+          </p:nvSpPr>
+          <p:spPr>
+            <a:xfrm>
+              <a:off x="8275782" y="4161070"/>
+              <a:ext cx="1754777" cy="733358"/>
+            </a:xfrm>
+            <a:prstGeom prst="diamond">
+              <a:avLst/>
+            </a:prstGeom>
+            <a:noFill/>
+            <a:ln w="38100">
+              <a:solidFill>
+                <a:schemeClr val="tx1"/>
+              </a:solidFill>
+            </a:ln>
+          </p:spPr>
+          <p:style>
+            <a:lnRef idx="2">
+              <a:schemeClr val="accent1">
+                <a:shade val="50000"/>
+              </a:schemeClr>
+            </a:lnRef>
+            <a:fillRef idx="1">
+              <a:schemeClr val="accent1"/>
+            </a:fillRef>
+            <a:effectRef idx="0">
+              <a:schemeClr val="accent1"/>
+            </a:effectRef>
+            <a:fontRef idx="minor">
+              <a:schemeClr val="lt1"/>
+            </a:fontRef>
+          </p:style>
+          <p:txBody>
+            <a:bodyPr rtlCol="0" anchor="ctr"/>
+            <a:lstStyle/>
+            <a:p>
+              <a:pPr algn="ctr"/>
+              <a:r>
+                <a:rPr lang="en-US" altLang="zh-TW" sz="1000" dirty="0" smtClean="0">
+                  <a:solidFill>
+                    <a:schemeClr val="tx1"/>
+                  </a:solidFill>
+                </a:rPr>
+                <a:t>Comply with both conditions ?</a:t>
+              </a:r>
+              <a:endParaRPr lang="zh-TW" altLang="en-US" sz="1000" dirty="0">
+                <a:solidFill>
+                  <a:schemeClr val="tx1"/>
+                </a:solidFill>
+              </a:endParaRPr>
+            </a:p>
+          </p:txBody>
+        </p:sp>
+        <p:cxnSp>
+          <p:nvCxnSpPr>
+            <p:cNvPr id="70" name="直線單箭頭接點 69">
+              <a:extLst>
+                <a:ext uri="{FF2B5EF4-FFF2-40B4-BE49-F238E27FC236}">
+                  <a16:creationId xmlns:a16="http://schemas.microsoft.com/office/drawing/2014/main" xmlns="" id="{4FB8EBAA-F4EC-47ED-9056-64D509A67100}"/>
+                </a:ext>
+              </a:extLst>
+            </p:cNvPr>
+            <p:cNvCxnSpPr>
+              <a:stCxn id="65" idx="2"/>
+              <a:endCxn id="66" idx="0"/>
+            </p:cNvCxnSpPr>
+            <p:nvPr/>
+          </p:nvCxnSpPr>
+          <p:spPr>
+            <a:xfrm>
+              <a:off x="9153170" y="3975158"/>
+              <a:ext cx="1" cy="185912"/>
+            </a:xfrm>
+            <a:prstGeom prst="straightConnector1">
+              <a:avLst/>
+            </a:prstGeom>
+            <a:ln w="38100">
+              <a:solidFill>
+                <a:schemeClr val="tx1"/>
+              </a:solidFill>
+              <a:tailEnd type="triangle"/>
+            </a:ln>
+          </p:spPr>
+          <p:style>
+            <a:lnRef idx="1">
+              <a:schemeClr val="accent1"/>
+            </a:lnRef>
+            <a:fillRef idx="0">
+              <a:schemeClr val="accent1"/>
+            </a:fillRef>
+            <a:effectRef idx="0">
+              <a:schemeClr val="accent1"/>
+            </a:effectRef>
+            <a:fontRef idx="minor">
+              <a:schemeClr val="tx1"/>
+            </a:fontRef>
+          </p:style>
+        </p:cxnSp>
+        <p:sp>
+          <p:nvSpPr>
+            <p:cNvPr id="90" name="矩形 89">
+              <a:extLst>
+                <a:ext uri="{FF2B5EF4-FFF2-40B4-BE49-F238E27FC236}">
+                  <a16:creationId xmlns:a16="http://schemas.microsoft.com/office/drawing/2014/main" xmlns="" id="{BB66F52D-598F-4FB3-838D-E9AA82574BC9}"/>
+                </a:ext>
+              </a:extLst>
+            </p:cNvPr>
+            <p:cNvSpPr/>
+            <p:nvPr/>
+          </p:nvSpPr>
+          <p:spPr>
+            <a:xfrm>
+              <a:off x="10506892" y="4343494"/>
+              <a:ext cx="1188720" cy="370489"/>
+            </a:xfrm>
+            <a:prstGeom prst="rect">
+              <a:avLst/>
+            </a:prstGeom>
+            <a:noFill/>
+            <a:ln w="38100">
+              <a:solidFill>
+                <a:schemeClr val="tx1"/>
+              </a:solidFill>
+            </a:ln>
+          </p:spPr>
+          <p:style>
+            <a:lnRef idx="2">
+              <a:schemeClr val="accent1">
+                <a:shade val="50000"/>
+              </a:schemeClr>
+            </a:lnRef>
+            <a:fillRef idx="1">
+              <a:schemeClr val="accent1"/>
+            </a:fillRef>
+            <a:effectRef idx="0">
+              <a:schemeClr val="accent1"/>
+            </a:effectRef>
+            <a:fontRef idx="minor">
+              <a:schemeClr val="lt1"/>
+            </a:fontRef>
+          </p:style>
+          <p:txBody>
+            <a:bodyPr rtlCol="0" anchor="ctr"/>
+            <a:lstStyle/>
+            <a:p>
+              <a:pPr algn="ctr"/>
+              <a:r>
+                <a:rPr lang="en-US" altLang="zh-TW" sz="1000" dirty="0" smtClean="0">
+                  <a:solidFill>
+                    <a:schemeClr val="tx1"/>
+                  </a:solidFill>
+                </a:rPr>
+                <a:t>To check next type.</a:t>
+              </a:r>
+              <a:endParaRPr lang="en-US" altLang="zh-TW" sz="1000" dirty="0">
+                <a:solidFill>
+                  <a:schemeClr val="tx1"/>
+                </a:solidFill>
+              </a:endParaRPr>
+            </a:p>
+          </p:txBody>
+        </p:sp>
+        <p:cxnSp>
+          <p:nvCxnSpPr>
+            <p:cNvPr id="93" name="直線單箭頭接點 92">
+              <a:extLst>
+                <a:ext uri="{FF2B5EF4-FFF2-40B4-BE49-F238E27FC236}">
+                  <a16:creationId xmlns:a16="http://schemas.microsoft.com/office/drawing/2014/main" xmlns="" id="{4FB8EBAA-F4EC-47ED-9056-64D509A67100}"/>
+                </a:ext>
+              </a:extLst>
+            </p:cNvPr>
+            <p:cNvCxnSpPr>
+              <a:stCxn id="56" idx="2"/>
+              <a:endCxn id="65" idx="0"/>
+            </p:cNvCxnSpPr>
+            <p:nvPr/>
+          </p:nvCxnSpPr>
+          <p:spPr>
+            <a:xfrm>
+              <a:off x="9153170" y="3135086"/>
+              <a:ext cx="0" cy="155027"/>
+            </a:xfrm>
+            <a:prstGeom prst="straightConnector1">
+              <a:avLst/>
+            </a:prstGeom>
+            <a:ln w="38100">
+              <a:solidFill>
+                <a:schemeClr val="tx1"/>
+              </a:solidFill>
+              <a:tailEnd type="triangle"/>
+            </a:ln>
+          </p:spPr>
+          <p:style>
+            <a:lnRef idx="1">
+              <a:schemeClr val="accent1"/>
+            </a:lnRef>
+            <a:fillRef idx="0">
+              <a:schemeClr val="accent1"/>
+            </a:fillRef>
+            <a:effectRef idx="0">
+              <a:schemeClr val="accent1"/>
+            </a:effectRef>
+            <a:fontRef idx="minor">
+              <a:schemeClr val="tx1"/>
+            </a:fontRef>
+          </p:style>
+        </p:cxnSp>
+        <p:cxnSp>
+          <p:nvCxnSpPr>
+            <p:cNvPr id="98" name="直線單箭頭接點 97">
+              <a:extLst>
+                <a:ext uri="{FF2B5EF4-FFF2-40B4-BE49-F238E27FC236}">
+                  <a16:creationId xmlns:a16="http://schemas.microsoft.com/office/drawing/2014/main" xmlns="" id="{4FB8EBAA-F4EC-47ED-9056-64D509A67100}"/>
+                </a:ext>
+              </a:extLst>
+            </p:cNvPr>
+            <p:cNvCxnSpPr>
+              <a:stCxn id="66" idx="3"/>
+              <a:endCxn id="90" idx="1"/>
+            </p:cNvCxnSpPr>
+            <p:nvPr/>
+          </p:nvCxnSpPr>
+          <p:spPr>
+            <a:xfrm>
+              <a:off x="10030559" y="4527749"/>
+              <a:ext cx="476333" cy="990"/>
+            </a:xfrm>
+            <a:prstGeom prst="straightConnector1">
+              <a:avLst/>
+            </a:prstGeom>
+            <a:ln w="38100">
+              <a:solidFill>
+                <a:schemeClr val="tx1"/>
+              </a:solidFill>
+              <a:tailEnd type="triangle"/>
+            </a:ln>
+          </p:spPr>
+          <p:style>
+            <a:lnRef idx="1">
+              <a:schemeClr val="accent1"/>
+            </a:lnRef>
+            <a:fillRef idx="0">
+              <a:schemeClr val="accent1"/>
+            </a:fillRef>
+            <a:effectRef idx="0">
+              <a:schemeClr val="accent1"/>
+            </a:effectRef>
+            <a:fontRef idx="minor">
+              <a:schemeClr val="tx1"/>
+            </a:fontRef>
+          </p:style>
+        </p:cxnSp>
+        <p:cxnSp>
+          <p:nvCxnSpPr>
+            <p:cNvPr id="102" name="肘形接點 101"/>
+            <p:cNvCxnSpPr>
+              <a:stCxn id="90" idx="0"/>
+              <a:endCxn id="56" idx="3"/>
+            </p:cNvCxnSpPr>
+            <p:nvPr/>
+          </p:nvCxnSpPr>
+          <p:spPr>
+            <a:xfrm rot="16200000" flipV="1">
+              <a:off x="9778362" y="3020604"/>
+              <a:ext cx="1575087" cy="1070694"/>
+            </a:xfrm>
+            <a:prstGeom prst="bentConnector2">
+              <a:avLst/>
+            </a:prstGeom>
+            <a:ln w="38100">
+              <a:solidFill>
+                <a:schemeClr val="tx1"/>
+              </a:solidFill>
+              <a:tailEnd type="arrow"/>
+            </a:ln>
+          </p:spPr>
+          <p:style>
+            <a:lnRef idx="1">
+              <a:schemeClr val="accent1"/>
+            </a:lnRef>
+            <a:fillRef idx="0">
+              <a:schemeClr val="accent1"/>
+            </a:fillRef>
+            <a:effectRef idx="0">
+              <a:schemeClr val="accent1"/>
+            </a:effectRef>
+            <a:fontRef idx="minor">
+              <a:schemeClr val="tx1"/>
+            </a:fontRef>
+          </p:style>
+        </p:cxnSp>
+        <p:sp>
+          <p:nvSpPr>
+            <p:cNvPr id="106" name="矩形 105">
+              <a:extLst>
+                <a:ext uri="{FF2B5EF4-FFF2-40B4-BE49-F238E27FC236}">
+                  <a16:creationId xmlns:a16="http://schemas.microsoft.com/office/drawing/2014/main" xmlns="" id="{BB66F52D-598F-4FB3-838D-E9AA82574BC9}"/>
+                </a:ext>
+              </a:extLst>
+            </p:cNvPr>
+            <p:cNvSpPr/>
+            <p:nvPr/>
+          </p:nvSpPr>
+          <p:spPr>
+            <a:xfrm>
+              <a:off x="7944658" y="5082656"/>
+              <a:ext cx="2417025" cy="685045"/>
+            </a:xfrm>
+            <a:prstGeom prst="rect">
+              <a:avLst/>
+            </a:prstGeom>
+            <a:noFill/>
+            <a:ln w="38100">
+              <a:solidFill>
+                <a:schemeClr val="tx1"/>
+              </a:solidFill>
+            </a:ln>
+          </p:spPr>
+          <p:style>
+            <a:lnRef idx="2">
+              <a:schemeClr val="accent1">
+                <a:shade val="50000"/>
+              </a:schemeClr>
+            </a:lnRef>
+            <a:fillRef idx="1">
+              <a:schemeClr val="accent1"/>
+            </a:fillRef>
+            <a:effectRef idx="0">
+              <a:schemeClr val="accent1"/>
+            </a:effectRef>
+            <a:fontRef idx="minor">
+              <a:schemeClr val="lt1"/>
+            </a:fontRef>
+          </p:style>
+          <p:txBody>
+            <a:bodyPr rtlCol="0" anchor="ctr"/>
+            <a:lstStyle/>
+            <a:p>
+              <a:pPr algn="ctr"/>
+              <a:r>
+                <a:rPr lang="en-US" altLang="zh-TW" sz="1000" dirty="0" smtClean="0">
+                  <a:solidFill>
+                    <a:schemeClr val="tx1"/>
+                  </a:solidFill>
+                </a:rPr>
+                <a:t>Allocate memory  with this memory type </a:t>
+              </a:r>
+              <a:r>
+                <a:rPr lang="en-US" altLang="zh-TW" sz="1000" dirty="0">
+                  <a:solidFill>
+                    <a:schemeClr val="tx1"/>
+                  </a:solidFill>
+                </a:rPr>
+                <a:t>by </a:t>
+              </a:r>
+              <a:r>
+                <a:rPr lang="en-US" altLang="zh-TW" sz="1000" b="1" dirty="0" err="1">
+                  <a:solidFill>
+                    <a:schemeClr val="accent6">
+                      <a:lumMod val="40000"/>
+                      <a:lumOff val="60000"/>
+                    </a:schemeClr>
+                  </a:solidFill>
+                </a:rPr>
+                <a:t>vkAllocateMemory</a:t>
+              </a:r>
+              <a:r>
+                <a:rPr lang="en-US" altLang="zh-TW" sz="1000" dirty="0" smtClean="0">
+                  <a:solidFill>
+                    <a:schemeClr val="tx1"/>
+                  </a:solidFill>
+                </a:rPr>
+                <a:t>.</a:t>
+              </a:r>
+              <a:endParaRPr lang="en-US" altLang="zh-TW" sz="1000" dirty="0">
+                <a:solidFill>
+                  <a:schemeClr val="tx1"/>
+                </a:solidFill>
+              </a:endParaRPr>
+            </a:p>
+          </p:txBody>
+        </p:sp>
+        <p:cxnSp>
+          <p:nvCxnSpPr>
+            <p:cNvPr id="107" name="直線單箭頭接點 106">
+              <a:extLst>
+                <a:ext uri="{FF2B5EF4-FFF2-40B4-BE49-F238E27FC236}">
+                  <a16:creationId xmlns:a16="http://schemas.microsoft.com/office/drawing/2014/main" xmlns="" id="{4FB8EBAA-F4EC-47ED-9056-64D509A67100}"/>
+                </a:ext>
+              </a:extLst>
+            </p:cNvPr>
+            <p:cNvCxnSpPr>
+              <a:stCxn id="66" idx="2"/>
+              <a:endCxn id="106" idx="0"/>
+            </p:cNvCxnSpPr>
+            <p:nvPr/>
+          </p:nvCxnSpPr>
+          <p:spPr>
+            <a:xfrm>
+              <a:off x="9153171" y="4894428"/>
+              <a:ext cx="0" cy="188228"/>
+            </a:xfrm>
+            <a:prstGeom prst="straightConnector1">
+              <a:avLst/>
+            </a:prstGeom>
+            <a:ln w="38100">
+              <a:solidFill>
+                <a:schemeClr val="tx1"/>
+              </a:solidFill>
+              <a:tailEnd type="triangle"/>
+            </a:ln>
+          </p:spPr>
+          <p:style>
+            <a:lnRef idx="1">
+              <a:schemeClr val="accent1"/>
+            </a:lnRef>
+            <a:fillRef idx="0">
+              <a:schemeClr val="accent1"/>
+            </a:fillRef>
+            <a:effectRef idx="0">
+              <a:schemeClr val="accent1"/>
+            </a:effectRef>
+            <a:fontRef idx="minor">
+              <a:schemeClr val="tx1"/>
+            </a:fontRef>
+          </p:style>
+        </p:cxnSp>
+        <p:cxnSp>
+          <p:nvCxnSpPr>
+            <p:cNvPr id="114" name="肘形接點 113"/>
+            <p:cNvCxnSpPr>
+              <a:stCxn id="106" idx="2"/>
+            </p:cNvCxnSpPr>
+            <p:nvPr/>
+          </p:nvCxnSpPr>
+          <p:spPr>
+            <a:xfrm rot="5400000">
+              <a:off x="8170185" y="5008511"/>
+              <a:ext cx="223796" cy="1742177"/>
+            </a:xfrm>
+            <a:prstGeom prst="bentConnector2">
+              <a:avLst/>
+            </a:prstGeom>
+            <a:ln w="38100">
+              <a:solidFill>
+                <a:schemeClr val="tx1"/>
+              </a:solidFill>
+              <a:tailEnd type="arrow"/>
+            </a:ln>
+          </p:spPr>
+          <p:style>
+            <a:lnRef idx="1">
+              <a:schemeClr val="accent1"/>
+            </a:lnRef>
+            <a:fillRef idx="0">
+              <a:schemeClr val="accent1"/>
+            </a:fillRef>
+            <a:effectRef idx="0">
+              <a:schemeClr val="accent1"/>
+            </a:effectRef>
+            <a:fontRef idx="minor">
+              <a:schemeClr val="tx1"/>
+            </a:fontRef>
+          </p:style>
+        </p:cxnSp>
+        <p:sp>
+          <p:nvSpPr>
+            <p:cNvPr id="117" name="文字方塊 116"/>
+            <p:cNvSpPr txBox="1"/>
+            <p:nvPr/>
+          </p:nvSpPr>
+          <p:spPr>
+            <a:xfrm>
+              <a:off x="7955806" y="2497522"/>
+              <a:ext cx="360086" cy="246221"/>
+            </a:xfrm>
+            <a:prstGeom prst="rect">
+              <a:avLst/>
+            </a:prstGeom>
+            <a:noFill/>
+          </p:spPr>
+          <p:txBody>
+            <a:bodyPr wrap="square" rtlCol="0">
+              <a:spAutoFit/>
+            </a:bodyPr>
+            <a:lstStyle/>
+            <a:p>
+              <a:r>
+                <a:rPr lang="en-US" altLang="zh-TW" sz="1000" dirty="0" smtClean="0"/>
+                <a:t>Yes</a:t>
+              </a:r>
+              <a:endParaRPr lang="zh-TW" altLang="en-US" sz="1000" dirty="0"/>
+            </a:p>
+          </p:txBody>
+        </p:sp>
+        <p:sp>
+          <p:nvSpPr>
+            <p:cNvPr id="118" name="文字方塊 117"/>
+            <p:cNvSpPr txBox="1"/>
+            <p:nvPr/>
+          </p:nvSpPr>
+          <p:spPr>
+            <a:xfrm>
+              <a:off x="9391203" y="3031939"/>
+              <a:ext cx="360086" cy="246221"/>
+            </a:xfrm>
+            <a:prstGeom prst="rect">
+              <a:avLst/>
+            </a:prstGeom>
+            <a:noFill/>
+          </p:spPr>
+          <p:txBody>
+            <a:bodyPr wrap="square" rtlCol="0">
+              <a:spAutoFit/>
+            </a:bodyPr>
+            <a:lstStyle/>
+            <a:p>
+              <a:r>
+                <a:rPr lang="en-US" altLang="zh-TW" sz="1000" dirty="0" smtClean="0"/>
+                <a:t>No</a:t>
+              </a:r>
+              <a:endParaRPr lang="zh-TW" altLang="en-US" sz="1000" dirty="0"/>
+            </a:p>
+          </p:txBody>
+        </p:sp>
+        <p:sp>
+          <p:nvSpPr>
+            <p:cNvPr id="119" name="文字方塊 118"/>
+            <p:cNvSpPr txBox="1"/>
+            <p:nvPr/>
+          </p:nvSpPr>
+          <p:spPr>
+            <a:xfrm>
+              <a:off x="9850516" y="4176943"/>
+              <a:ext cx="360086" cy="246221"/>
+            </a:xfrm>
+            <a:prstGeom prst="rect">
+              <a:avLst/>
+            </a:prstGeom>
+            <a:noFill/>
+          </p:spPr>
+          <p:txBody>
+            <a:bodyPr wrap="square" rtlCol="0">
+              <a:spAutoFit/>
+            </a:bodyPr>
+            <a:lstStyle/>
+            <a:p>
+              <a:r>
+                <a:rPr lang="en-US" altLang="zh-TW" sz="1000" dirty="0" smtClean="0"/>
+                <a:t>No</a:t>
+              </a:r>
+              <a:endParaRPr lang="zh-TW" altLang="en-US" sz="1000" dirty="0"/>
+            </a:p>
+          </p:txBody>
+        </p:sp>
+        <p:sp>
+          <p:nvSpPr>
+            <p:cNvPr id="120" name="文字方塊 119"/>
+            <p:cNvSpPr txBox="1"/>
+            <p:nvPr/>
+          </p:nvSpPr>
+          <p:spPr>
+            <a:xfrm>
+              <a:off x="8740038" y="4821534"/>
+              <a:ext cx="360086" cy="246221"/>
+            </a:xfrm>
+            <a:prstGeom prst="rect">
+              <a:avLst/>
+            </a:prstGeom>
+            <a:noFill/>
+          </p:spPr>
+          <p:txBody>
+            <a:bodyPr wrap="square" rtlCol="0">
+              <a:spAutoFit/>
+            </a:bodyPr>
+            <a:lstStyle/>
+            <a:p>
+              <a:r>
+                <a:rPr lang="en-US" altLang="zh-TW" sz="1000" dirty="0" smtClean="0"/>
+                <a:t>Yes</a:t>
+              </a:r>
+              <a:endParaRPr lang="zh-TW" altLang="en-US" sz="1000" dirty="0"/>
+            </a:p>
+          </p:txBody>
+        </p:sp>
       </p:grpSp>
     </p:spTree>
     <p:extLst>
@@ -4767,7 +6086,7 @@
     </a:clrScheme>
     <a:fontScheme name="Office">
       <a:majorFont>
-        <a:latin typeface="Calibri Light" panose="020F0302020204030204"/>
+        <a:latin typeface="Calibri Light"/>
         <a:ea typeface=""/>
         <a:cs typeface=""/>
         <a:font script="Jpan" typeface="游ゴシック Light"/>
@@ -4819,7 +6138,7 @@
         <a:font script="Tfng" typeface="Ebrima"/>
       </a:majorFont>
       <a:minorFont>
-        <a:latin typeface="Calibri" panose="020F0502020204030204"/>
+        <a:latin typeface="Calibri"/>
         <a:ea typeface=""/>
         <a:cs typeface=""/>
         <a:font script="Jpan" typeface="游ゴシック"/>
@@ -5013,7 +6332,7 @@
   <a:extraClrSchemeLst/>
   <a:extLst>
     <a:ext uri="{05A4C25C-085E-4340-85A3-A5531E510DB2}">
-      <thm15:themeFamily xmlns:thm15="http://schemas.microsoft.com/office/thememl/2012/main" name="Office Theme" id="{62F939B6-93AF-4DB8-9C6B-D6C7DFDC589F}" vid="{4A3C46E8-61CC-4603-A589-7422A47A8E4A}"/>
+      <thm15:themeFamily xmlns:thm15="http://schemas.microsoft.com/office/thememl/2012/main" xmlns="" name="Office Theme" id="{62F939B6-93AF-4DB8-9C6B-D6C7DFDC589F}" vid="{4A3C46E8-61CC-4603-A589-7422A47A8E4A}"/>
     </a:ext>
   </a:extLst>
 </a:theme>

</xml_diff>